<commit_message>
[2] Update Main and core README
</commit_message>
<xml_diff>
--- a/documentation/Hubfx Presentation.pptx
+++ b/documentation/Hubfx Presentation.pptx
@@ -13,6 +13,7 @@
     <p:sldId id="261" r:id="rId7"/>
     <p:sldId id="262" r:id="rId8"/>
     <p:sldId id="263" r:id="rId9"/>
+    <p:sldId id="264" r:id="rId10"/>
   </p:sldIdLst>
   <p:sldSz cx="12192000" cy="6858000"/>
   <p:notesSz cx="6858000" cy="9144000"/>
@@ -1794,7 +1795,7 @@
           <a:p>
             <a:fld id="{154F4BC5-C275-4A59-82DC-6AFC02DFC54D}" type="datetimeFigureOut">
               <a:rPr lang="en-CA" smtClean="0"/>
-              <a:t>2023-09-20</a:t>
+              <a:t>2023-09-23</a:t>
             </a:fld>
             <a:endParaRPr lang="en-CA"/>
           </a:p>
@@ -1994,7 +1995,7 @@
           <a:p>
             <a:fld id="{154F4BC5-C275-4A59-82DC-6AFC02DFC54D}" type="datetimeFigureOut">
               <a:rPr lang="en-CA" smtClean="0"/>
-              <a:t>2023-09-20</a:t>
+              <a:t>2023-09-23</a:t>
             </a:fld>
             <a:endParaRPr lang="en-CA"/>
           </a:p>
@@ -2204,7 +2205,7 @@
           <a:p>
             <a:fld id="{154F4BC5-C275-4A59-82DC-6AFC02DFC54D}" type="datetimeFigureOut">
               <a:rPr lang="en-CA" smtClean="0"/>
-              <a:t>2023-09-20</a:t>
+              <a:t>2023-09-23</a:t>
             </a:fld>
             <a:endParaRPr lang="en-CA"/>
           </a:p>
@@ -2404,7 +2405,7 @@
           <a:p>
             <a:fld id="{154F4BC5-C275-4A59-82DC-6AFC02DFC54D}" type="datetimeFigureOut">
               <a:rPr lang="en-CA" smtClean="0"/>
-              <a:t>2023-09-20</a:t>
+              <a:t>2023-09-23</a:t>
             </a:fld>
             <a:endParaRPr lang="en-CA"/>
           </a:p>
@@ -2680,7 +2681,7 @@
           <a:p>
             <a:fld id="{154F4BC5-C275-4A59-82DC-6AFC02DFC54D}" type="datetimeFigureOut">
               <a:rPr lang="en-CA" smtClean="0"/>
-              <a:t>2023-09-20</a:t>
+              <a:t>2023-09-23</a:t>
             </a:fld>
             <a:endParaRPr lang="en-CA"/>
           </a:p>
@@ -2948,7 +2949,7 @@
           <a:p>
             <a:fld id="{154F4BC5-C275-4A59-82DC-6AFC02DFC54D}" type="datetimeFigureOut">
               <a:rPr lang="en-CA" smtClean="0"/>
-              <a:t>2023-09-20</a:t>
+              <a:t>2023-09-23</a:t>
             </a:fld>
             <a:endParaRPr lang="en-CA"/>
           </a:p>
@@ -3363,7 +3364,7 @@
           <a:p>
             <a:fld id="{154F4BC5-C275-4A59-82DC-6AFC02DFC54D}" type="datetimeFigureOut">
               <a:rPr lang="en-CA" smtClean="0"/>
-              <a:t>2023-09-20</a:t>
+              <a:t>2023-09-23</a:t>
             </a:fld>
             <a:endParaRPr lang="en-CA"/>
           </a:p>
@@ -3505,7 +3506,7 @@
           <a:p>
             <a:fld id="{154F4BC5-C275-4A59-82DC-6AFC02DFC54D}" type="datetimeFigureOut">
               <a:rPr lang="en-CA" smtClean="0"/>
-              <a:t>2023-09-20</a:t>
+              <a:t>2023-09-23</a:t>
             </a:fld>
             <a:endParaRPr lang="en-CA"/>
           </a:p>
@@ -3618,7 +3619,7 @@
           <a:p>
             <a:fld id="{154F4BC5-C275-4A59-82DC-6AFC02DFC54D}" type="datetimeFigureOut">
               <a:rPr lang="en-CA" smtClean="0"/>
-              <a:t>2023-09-20</a:t>
+              <a:t>2023-09-23</a:t>
             </a:fld>
             <a:endParaRPr lang="en-CA"/>
           </a:p>
@@ -3931,7 +3932,7 @@
           <a:p>
             <a:fld id="{154F4BC5-C275-4A59-82DC-6AFC02DFC54D}" type="datetimeFigureOut">
               <a:rPr lang="en-CA" smtClean="0"/>
-              <a:t>2023-09-20</a:t>
+              <a:t>2023-09-23</a:t>
             </a:fld>
             <a:endParaRPr lang="en-CA"/>
           </a:p>
@@ -4220,7 +4221,7 @@
           <a:p>
             <a:fld id="{154F4BC5-C275-4A59-82DC-6AFC02DFC54D}" type="datetimeFigureOut">
               <a:rPr lang="en-CA" smtClean="0"/>
-              <a:t>2023-09-20</a:t>
+              <a:t>2023-09-23</a:t>
             </a:fld>
             <a:endParaRPr lang="en-CA"/>
           </a:p>
@@ -4463,7 +4464,7 @@
           <a:p>
             <a:fld id="{154F4BC5-C275-4A59-82DC-6AFC02DFC54D}" type="datetimeFigureOut">
               <a:rPr lang="en-CA" smtClean="0"/>
-              <a:t>2023-09-20</a:t>
+              <a:t>2023-09-23</a:t>
             </a:fld>
             <a:endParaRPr lang="en-CA"/>
           </a:p>
@@ -16283,6 +16284,686 @@
 </p:sld>
 </file>
 
+<file path=ppt/slides/slide9.xml><?xml version="1.0" encoding="utf-8"?>
+<p:sld xmlns:a="http://schemas.openxmlformats.org/drawingml/2006/main" xmlns:r="http://schemas.openxmlformats.org/officeDocument/2006/relationships" xmlns:p="http://schemas.openxmlformats.org/presentationml/2006/main">
+  <p:cSld>
+    <p:spTree>
+      <p:nvGrpSpPr>
+        <p:cNvPr id="1" name=""/>
+        <p:cNvGrpSpPr/>
+        <p:nvPr/>
+      </p:nvGrpSpPr>
+      <p:grpSpPr>
+        <a:xfrm>
+          <a:off x="0" y="0"/>
+          <a:ext cx="0" cy="0"/>
+          <a:chOff x="0" y="0"/>
+          <a:chExt cx="0" cy="0"/>
+        </a:xfrm>
+      </p:grpSpPr>
+      <p:graphicFrame>
+        <p:nvGraphicFramePr>
+          <p:cNvPr id="3" name="Table 3">
+            <a:extLst>
+              <a:ext uri="{FF2B5EF4-FFF2-40B4-BE49-F238E27FC236}">
+                <a16:creationId xmlns:a16="http://schemas.microsoft.com/office/drawing/2014/main" id="{8AB95FB7-22DA-F36A-2177-5575872A34AB}"/>
+              </a:ext>
+            </a:extLst>
+          </p:cNvPr>
+          <p:cNvGraphicFramePr>
+            <a:graphicFrameLocks noGrp="1"/>
+          </p:cNvGraphicFramePr>
+          <p:nvPr>
+            <p:extLst>
+              <p:ext uri="{D42A27DB-BD31-4B8C-83A1-F6EECF244321}">
+                <p14:modId xmlns:p14="http://schemas.microsoft.com/office/powerpoint/2010/main" val="2975436269"/>
+              </p:ext>
+            </p:extLst>
+          </p:nvPr>
+        </p:nvGraphicFramePr>
+        <p:xfrm>
+          <a:off x="98927" y="1433538"/>
+          <a:ext cx="5331326" cy="3783099"/>
+        </p:xfrm>
+        <a:graphic>
+          <a:graphicData uri="http://schemas.openxmlformats.org/drawingml/2006/table">
+            <a:tbl>
+              <a:tblPr firstRow="1" bandRow="1">
+                <a:tableStyleId>{5C22544A-7EE6-4342-B048-85BDC9FD1C3A}</a:tableStyleId>
+              </a:tblPr>
+              <a:tblGrid>
+                <a:gridCol w="1777109">
+                  <a:extLst>
+                    <a:ext uri="{9D8B030D-6E8A-4147-A177-3AD203B41FA5}">
+                      <a16:colId xmlns:a16="http://schemas.microsoft.com/office/drawing/2014/main" val="734180390"/>
+                    </a:ext>
+                  </a:extLst>
+                </a:gridCol>
+                <a:gridCol w="2007491">
+                  <a:extLst>
+                    <a:ext uri="{9D8B030D-6E8A-4147-A177-3AD203B41FA5}">
+                      <a16:colId xmlns:a16="http://schemas.microsoft.com/office/drawing/2014/main" val="2286615271"/>
+                    </a:ext>
+                  </a:extLst>
+                </a:gridCol>
+                <a:gridCol w="1546726">
+                  <a:extLst>
+                    <a:ext uri="{9D8B030D-6E8A-4147-A177-3AD203B41FA5}">
+                      <a16:colId xmlns:a16="http://schemas.microsoft.com/office/drawing/2014/main" val="633070246"/>
+                    </a:ext>
+                  </a:extLst>
+                </a:gridCol>
+              </a:tblGrid>
+              <a:tr h="688462">
+                <a:tc>
+                  <a:txBody>
+                    <a:bodyPr/>
+                    <a:lstStyle/>
+                    <a:p>
+                      <a:r>
+                        <a:rPr lang="en-CA" dirty="0"/>
+                        <a:t>Frontend Framework</a:t>
+                      </a:r>
+                    </a:p>
+                  </a:txBody>
+                  <a:tcPr/>
+                </a:tc>
+                <a:tc>
+                  <a:txBody>
+                    <a:bodyPr/>
+                    <a:lstStyle/>
+                    <a:p>
+                      <a:r>
+                        <a:rPr lang="en-CA" dirty="0"/>
+                        <a:t>Application (global) State</a:t>
+                      </a:r>
+                    </a:p>
+                  </a:txBody>
+                  <a:tcPr/>
+                </a:tc>
+                <a:tc>
+                  <a:txBody>
+                    <a:bodyPr/>
+                    <a:lstStyle/>
+                    <a:p>
+                      <a:r>
+                        <a:rPr lang="en-CA" dirty="0"/>
+                        <a:t>Component (local) state</a:t>
+                      </a:r>
+                    </a:p>
+                  </a:txBody>
+                  <a:tcPr/>
+                </a:tc>
+                <a:extLst>
+                  <a:ext uri="{0D108BD9-81ED-4DB2-BD59-A6C34878D82A}">
+                    <a16:rowId xmlns:a16="http://schemas.microsoft.com/office/drawing/2014/main" val="3383211534"/>
+                  </a:ext>
+                </a:extLst>
+              </a:tr>
+              <a:tr h="688462">
+                <a:tc>
+                  <a:txBody>
+                    <a:bodyPr/>
+                    <a:lstStyle/>
+                    <a:p>
+                      <a:r>
+                        <a:rPr lang="en-CA" dirty="0"/>
+                        <a:t>React</a:t>
+                      </a:r>
+                    </a:p>
+                  </a:txBody>
+                  <a:tcPr/>
+                </a:tc>
+                <a:tc>
+                  <a:txBody>
+                    <a:bodyPr/>
+                    <a:lstStyle/>
+                    <a:p>
+                      <a:pPr marL="285750" indent="-285750">
+                        <a:buFont typeface="Arial" panose="020B0604020202020204" pitchFamily="34" charset="0"/>
+                        <a:buChar char="•"/>
+                      </a:pPr>
+                      <a:r>
+                        <a:rPr lang="en-CA" sz="1400" dirty="0"/>
+                        <a:t>Redux</a:t>
+                      </a:r>
+                    </a:p>
+                    <a:p>
+                      <a:pPr marL="285750" indent="-285750">
+                        <a:buFont typeface="Arial" panose="020B0604020202020204" pitchFamily="34" charset="0"/>
+                        <a:buChar char="•"/>
+                      </a:pPr>
+                      <a:r>
+                        <a:rPr lang="en-CA" sz="1400" dirty="0"/>
+                        <a:t>Context API</a:t>
+                      </a:r>
+                    </a:p>
+                  </a:txBody>
+                  <a:tcPr/>
+                </a:tc>
+                <a:tc>
+                  <a:txBody>
+                    <a:bodyPr/>
+                    <a:lstStyle/>
+                    <a:p>
+                      <a:pPr marL="285750" indent="-285750">
+                        <a:buFont typeface="Arial" panose="020B0604020202020204" pitchFamily="34" charset="0"/>
+                        <a:buChar char="•"/>
+                      </a:pPr>
+                      <a:r>
+                        <a:rPr lang="en-CA" sz="1400" dirty="0" err="1"/>
+                        <a:t>useState</a:t>
+                      </a:r>
+                      <a:endParaRPr lang="en-CA" sz="1400" dirty="0"/>
+                    </a:p>
+                    <a:p>
+                      <a:pPr marL="285750" indent="-285750">
+                        <a:buFont typeface="Arial" panose="020B0604020202020204" pitchFamily="34" charset="0"/>
+                        <a:buChar char="•"/>
+                      </a:pPr>
+                      <a:r>
+                        <a:rPr lang="en-CA" sz="1400" dirty="0" err="1"/>
+                        <a:t>useReducer</a:t>
+                      </a:r>
+                      <a:endParaRPr lang="en-CA" sz="1400" dirty="0"/>
+                    </a:p>
+                  </a:txBody>
+                  <a:tcPr/>
+                </a:tc>
+                <a:extLst>
+                  <a:ext uri="{0D108BD9-81ED-4DB2-BD59-A6C34878D82A}">
+                    <a16:rowId xmlns:a16="http://schemas.microsoft.com/office/drawing/2014/main" val="2316131968"/>
+                  </a:ext>
+                </a:extLst>
+              </a:tr>
+              <a:tr h="1674655">
+                <a:tc>
+                  <a:txBody>
+                    <a:bodyPr/>
+                    <a:lstStyle/>
+                    <a:p>
+                      <a:r>
+                        <a:rPr lang="en-CA" dirty="0"/>
+                        <a:t>Angular</a:t>
+                      </a:r>
+                    </a:p>
+                  </a:txBody>
+                  <a:tcPr/>
+                </a:tc>
+                <a:tc>
+                  <a:txBody>
+                    <a:bodyPr/>
+                    <a:lstStyle/>
+                    <a:p>
+                      <a:pPr marL="285750" indent="-285750">
+                        <a:buFont typeface="Arial" panose="020B0604020202020204" pitchFamily="34" charset="0"/>
+                        <a:buChar char="•"/>
+                      </a:pPr>
+                      <a:r>
+                        <a:rPr lang="en-CA" sz="1400" dirty="0" err="1"/>
+                        <a:t>NgRx</a:t>
+                      </a:r>
+                      <a:endParaRPr lang="en-CA" sz="1400" dirty="0"/>
+                    </a:p>
+                    <a:p>
+                      <a:pPr marL="285750" indent="-285750">
+                        <a:buFont typeface="Arial" panose="020B0604020202020204" pitchFamily="34" charset="0"/>
+                        <a:buChar char="•"/>
+                      </a:pPr>
+                      <a:r>
+                        <a:rPr lang="en-CA" sz="1400" dirty="0"/>
+                        <a:t>Angular Services</a:t>
+                      </a:r>
+                    </a:p>
+                  </a:txBody>
+                  <a:tcPr/>
+                </a:tc>
+                <a:tc>
+                  <a:txBody>
+                    <a:bodyPr/>
+                    <a:lstStyle/>
+                    <a:p>
+                      <a:pPr marL="285750" indent="-285750">
+                        <a:buFont typeface="Arial" panose="020B0604020202020204" pitchFamily="34" charset="0"/>
+                        <a:buChar char="•"/>
+                      </a:pPr>
+                      <a:r>
+                        <a:rPr lang="en-CA" sz="1400" dirty="0" err="1"/>
+                        <a:t>RxJS</a:t>
+                      </a:r>
+                      <a:r>
+                        <a:rPr lang="en-CA" sz="1400" dirty="0"/>
+                        <a:t> Observables</a:t>
+                      </a:r>
+                    </a:p>
+                    <a:p>
+                      <a:pPr marL="0" indent="0">
+                        <a:buFont typeface="Arial" panose="020B0604020202020204" pitchFamily="34" charset="0"/>
+                        <a:buNone/>
+                      </a:pPr>
+                      <a:endParaRPr lang="en-CA" sz="1400" dirty="0"/>
+                    </a:p>
+                    <a:p>
+                      <a:pPr marL="285750" indent="-285750">
+                        <a:buFont typeface="Arial" panose="020B0604020202020204" pitchFamily="34" charset="0"/>
+                        <a:buChar char="•"/>
+                      </a:pPr>
+                      <a:r>
+                        <a:rPr lang="en-CA" sz="1400" dirty="0"/>
+                        <a:t>Component class properties</a:t>
+                      </a:r>
+                    </a:p>
+                  </a:txBody>
+                  <a:tcPr/>
+                </a:tc>
+                <a:extLst>
+                  <a:ext uri="{0D108BD9-81ED-4DB2-BD59-A6C34878D82A}">
+                    <a16:rowId xmlns:a16="http://schemas.microsoft.com/office/drawing/2014/main" val="631243619"/>
+                  </a:ext>
+                </a:extLst>
+              </a:tr>
+              <a:tr h="688462">
+                <a:tc>
+                  <a:txBody>
+                    <a:bodyPr/>
+                    <a:lstStyle/>
+                    <a:p>
+                      <a:r>
+                        <a:rPr lang="en-CA" dirty="0"/>
+                        <a:t>Vue</a:t>
+                      </a:r>
+                    </a:p>
+                  </a:txBody>
+                  <a:tcPr/>
+                </a:tc>
+                <a:tc>
+                  <a:txBody>
+                    <a:bodyPr/>
+                    <a:lstStyle/>
+                    <a:p>
+                      <a:pPr marL="285750" indent="-285750">
+                        <a:buFont typeface="Arial" panose="020B0604020202020204" pitchFamily="34" charset="0"/>
+                        <a:buChar char="•"/>
+                      </a:pPr>
+                      <a:r>
+                        <a:rPr lang="en-CA" sz="1400" dirty="0" err="1"/>
+                        <a:t>Pinia</a:t>
+                      </a:r>
+                      <a:endParaRPr lang="en-CA" sz="1400" dirty="0"/>
+                    </a:p>
+                    <a:p>
+                      <a:pPr marL="285750" indent="-285750">
+                        <a:buFont typeface="Arial" panose="020B0604020202020204" pitchFamily="34" charset="0"/>
+                        <a:buChar char="•"/>
+                      </a:pPr>
+                      <a:r>
+                        <a:rPr lang="en-CA" sz="1400" dirty="0"/>
+                        <a:t>Reactivity API</a:t>
+                      </a:r>
+                    </a:p>
+                    <a:p>
+                      <a:pPr marL="285750" indent="-285750">
+                        <a:buFont typeface="Arial" panose="020B0604020202020204" pitchFamily="34" charset="0"/>
+                        <a:buChar char="•"/>
+                      </a:pPr>
+                      <a:r>
+                        <a:rPr lang="en-CA" sz="1400" dirty="0" err="1"/>
+                        <a:t>Vuex</a:t>
+                      </a:r>
+                      <a:endParaRPr lang="en-CA" sz="1400" dirty="0"/>
+                    </a:p>
+                  </a:txBody>
+                  <a:tcPr/>
+                </a:tc>
+                <a:tc>
+                  <a:txBody>
+                    <a:bodyPr/>
+                    <a:lstStyle/>
+                    <a:p>
+                      <a:pPr marL="285750" indent="-285750">
+                        <a:buFont typeface="Arial" panose="020B0604020202020204" pitchFamily="34" charset="0"/>
+                        <a:buChar char="•"/>
+                      </a:pPr>
+                      <a:r>
+                        <a:rPr lang="en-CA" sz="1400" dirty="0"/>
+                        <a:t>ref</a:t>
+                      </a:r>
+                    </a:p>
+                  </a:txBody>
+                  <a:tcPr/>
+                </a:tc>
+                <a:extLst>
+                  <a:ext uri="{0D108BD9-81ED-4DB2-BD59-A6C34878D82A}">
+                    <a16:rowId xmlns:a16="http://schemas.microsoft.com/office/drawing/2014/main" val="2410763806"/>
+                  </a:ext>
+                </a:extLst>
+              </a:tr>
+            </a:tbl>
+          </a:graphicData>
+        </a:graphic>
+      </p:graphicFrame>
+      <p:graphicFrame>
+        <p:nvGraphicFramePr>
+          <p:cNvPr id="4" name="Table 3">
+            <a:extLst>
+              <a:ext uri="{FF2B5EF4-FFF2-40B4-BE49-F238E27FC236}">
+                <a16:creationId xmlns:a16="http://schemas.microsoft.com/office/drawing/2014/main" id="{62A31E3E-A3F5-F3E3-46A5-585FD89C8464}"/>
+              </a:ext>
+            </a:extLst>
+          </p:cNvPr>
+          <p:cNvGraphicFramePr>
+            <a:graphicFrameLocks noGrp="1"/>
+          </p:cNvGraphicFramePr>
+          <p:nvPr>
+            <p:extLst>
+              <p:ext uri="{D42A27DB-BD31-4B8C-83A1-F6EECF244321}">
+                <p14:modId xmlns:p14="http://schemas.microsoft.com/office/powerpoint/2010/main" val="3927356613"/>
+              </p:ext>
+            </p:extLst>
+          </p:nvPr>
+        </p:nvGraphicFramePr>
+        <p:xfrm>
+          <a:off x="6809876" y="1431308"/>
+          <a:ext cx="5114757" cy="3747198"/>
+        </p:xfrm>
+        <a:graphic>
+          <a:graphicData uri="http://schemas.openxmlformats.org/drawingml/2006/table">
+            <a:tbl>
+              <a:tblPr firstRow="1" bandRow="1">
+                <a:tableStyleId>{5C22544A-7EE6-4342-B048-85BDC9FD1C3A}</a:tableStyleId>
+              </a:tblPr>
+              <a:tblGrid>
+                <a:gridCol w="1704919">
+                  <a:extLst>
+                    <a:ext uri="{9D8B030D-6E8A-4147-A177-3AD203B41FA5}">
+                      <a16:colId xmlns:a16="http://schemas.microsoft.com/office/drawing/2014/main" val="734180390"/>
+                    </a:ext>
+                  </a:extLst>
+                </a:gridCol>
+                <a:gridCol w="1704919">
+                  <a:extLst>
+                    <a:ext uri="{9D8B030D-6E8A-4147-A177-3AD203B41FA5}">
+                      <a16:colId xmlns:a16="http://schemas.microsoft.com/office/drawing/2014/main" val="2286615271"/>
+                    </a:ext>
+                  </a:extLst>
+                </a:gridCol>
+                <a:gridCol w="1704919">
+                  <a:extLst>
+                    <a:ext uri="{9D8B030D-6E8A-4147-A177-3AD203B41FA5}">
+                      <a16:colId xmlns:a16="http://schemas.microsoft.com/office/drawing/2014/main" val="633070246"/>
+                    </a:ext>
+                  </a:extLst>
+                </a:gridCol>
+              </a:tblGrid>
+              <a:tr h="688462">
+                <a:tc>
+                  <a:txBody>
+                    <a:bodyPr/>
+                    <a:lstStyle/>
+                    <a:p>
+                      <a:r>
+                        <a:rPr lang="en-CA" dirty="0"/>
+                        <a:t>Frontend Framework</a:t>
+                      </a:r>
+                    </a:p>
+                  </a:txBody>
+                  <a:tcPr/>
+                </a:tc>
+                <a:tc>
+                  <a:txBody>
+                    <a:bodyPr/>
+                    <a:lstStyle/>
+                    <a:p>
+                      <a:r>
+                        <a:rPr lang="en-CA" dirty="0"/>
+                        <a:t>Application (global) State</a:t>
+                      </a:r>
+                    </a:p>
+                  </a:txBody>
+                  <a:tcPr/>
+                </a:tc>
+                <a:tc>
+                  <a:txBody>
+                    <a:bodyPr/>
+                    <a:lstStyle/>
+                    <a:p>
+                      <a:r>
+                        <a:rPr lang="en-CA" dirty="0"/>
+                        <a:t>Component (local) state</a:t>
+                      </a:r>
+                    </a:p>
+                  </a:txBody>
+                  <a:tcPr/>
+                </a:tc>
+                <a:extLst>
+                  <a:ext uri="{0D108BD9-81ED-4DB2-BD59-A6C34878D82A}">
+                    <a16:rowId xmlns:a16="http://schemas.microsoft.com/office/drawing/2014/main" val="3383211534"/>
+                  </a:ext>
+                </a:extLst>
+              </a:tr>
+              <a:tr h="695619">
+                <a:tc>
+                  <a:txBody>
+                    <a:bodyPr/>
+                    <a:lstStyle/>
+                    <a:p>
+                      <a:r>
+                        <a:rPr lang="en-CA" dirty="0"/>
+                        <a:t>React</a:t>
+                      </a:r>
+                    </a:p>
+                  </a:txBody>
+                  <a:tcPr/>
+                </a:tc>
+                <a:tc rowSpan="3" gridSpan="2">
+                  <a:txBody>
+                    <a:bodyPr/>
+                    <a:lstStyle/>
+                    <a:p>
+                      <a:pPr algn="ctr"/>
+                      <a:r>
+                        <a:rPr lang="en-CA" sz="3600" dirty="0"/>
+                        <a:t>Hubfx</a:t>
+                      </a:r>
+                    </a:p>
+                  </a:txBody>
+                  <a:tcPr anchor="ctr"/>
+                </a:tc>
+                <a:tc rowSpan="3" hMerge="1">
+                  <a:txBody>
+                    <a:bodyPr/>
+                    <a:lstStyle/>
+                    <a:p>
+                      <a:endParaRPr lang="en-CA" dirty="0"/>
+                    </a:p>
+                  </a:txBody>
+                  <a:tcPr/>
+                </a:tc>
+                <a:extLst>
+                  <a:ext uri="{0D108BD9-81ED-4DB2-BD59-A6C34878D82A}">
+                    <a16:rowId xmlns:a16="http://schemas.microsoft.com/office/drawing/2014/main" val="2316131968"/>
+                  </a:ext>
+                </a:extLst>
+              </a:tr>
+              <a:tr h="1674655">
+                <a:tc>
+                  <a:txBody>
+                    <a:bodyPr/>
+                    <a:lstStyle/>
+                    <a:p>
+                      <a:r>
+                        <a:rPr lang="en-CA" dirty="0"/>
+                        <a:t>Angular</a:t>
+                      </a:r>
+                    </a:p>
+                  </a:txBody>
+                  <a:tcPr/>
+                </a:tc>
+                <a:tc gridSpan="2" vMerge="1">
+                  <a:txBody>
+                    <a:bodyPr/>
+                    <a:lstStyle/>
+                    <a:p>
+                      <a:endParaRPr lang="en-CA" dirty="0"/>
+                    </a:p>
+                  </a:txBody>
+                  <a:tcPr/>
+                </a:tc>
+                <a:tc hMerge="1" vMerge="1">
+                  <a:txBody>
+                    <a:bodyPr/>
+                    <a:lstStyle/>
+                    <a:p>
+                      <a:endParaRPr lang="en-CA" dirty="0"/>
+                    </a:p>
+                  </a:txBody>
+                  <a:tcPr/>
+                </a:tc>
+                <a:extLst>
+                  <a:ext uri="{0D108BD9-81ED-4DB2-BD59-A6C34878D82A}">
+                    <a16:rowId xmlns:a16="http://schemas.microsoft.com/office/drawing/2014/main" val="631243619"/>
+                  </a:ext>
+                </a:extLst>
+              </a:tr>
+              <a:tr h="688462">
+                <a:tc>
+                  <a:txBody>
+                    <a:bodyPr/>
+                    <a:lstStyle/>
+                    <a:p>
+                      <a:r>
+                        <a:rPr lang="en-CA" dirty="0"/>
+                        <a:t>Vue</a:t>
+                      </a:r>
+                    </a:p>
+                  </a:txBody>
+                  <a:tcPr/>
+                </a:tc>
+                <a:tc gridSpan="2" vMerge="1">
+                  <a:txBody>
+                    <a:bodyPr/>
+                    <a:lstStyle/>
+                    <a:p>
+                      <a:endParaRPr lang="en-CA" dirty="0"/>
+                    </a:p>
+                  </a:txBody>
+                  <a:tcPr/>
+                </a:tc>
+                <a:tc hMerge="1" vMerge="1">
+                  <a:txBody>
+                    <a:bodyPr/>
+                    <a:lstStyle/>
+                    <a:p>
+                      <a:endParaRPr lang="en-CA" dirty="0"/>
+                    </a:p>
+                  </a:txBody>
+                  <a:tcPr/>
+                </a:tc>
+                <a:extLst>
+                  <a:ext uri="{0D108BD9-81ED-4DB2-BD59-A6C34878D82A}">
+                    <a16:rowId xmlns:a16="http://schemas.microsoft.com/office/drawing/2014/main" val="2410763806"/>
+                  </a:ext>
+                </a:extLst>
+              </a:tr>
+            </a:tbl>
+          </a:graphicData>
+        </a:graphic>
+      </p:graphicFrame>
+      <p:sp>
+        <p:nvSpPr>
+          <p:cNvPr id="5" name="Arrow: Right 4">
+            <a:extLst>
+              <a:ext uri="{FF2B5EF4-FFF2-40B4-BE49-F238E27FC236}">
+                <a16:creationId xmlns:a16="http://schemas.microsoft.com/office/drawing/2014/main" id="{CA6FAA0F-2DAD-3D23-9FB5-42966977B89C}"/>
+              </a:ext>
+            </a:extLst>
+          </p:cNvPr>
+          <p:cNvSpPr/>
+          <p:nvPr/>
+        </p:nvSpPr>
+        <p:spPr>
+          <a:xfrm>
+            <a:off x="5542549" y="2923907"/>
+            <a:ext cx="1155031" cy="381000"/>
+          </a:xfrm>
+          <a:prstGeom prst="rightArrow">
+            <a:avLst/>
+          </a:prstGeom>
+        </p:spPr>
+        <p:style>
+          <a:lnRef idx="2">
+            <a:schemeClr val="accent1">
+              <a:shade val="15000"/>
+            </a:schemeClr>
+          </a:lnRef>
+          <a:fillRef idx="1">
+            <a:schemeClr val="accent1"/>
+          </a:fillRef>
+          <a:effectRef idx="0">
+            <a:schemeClr val="accent1"/>
+          </a:effectRef>
+          <a:fontRef idx="minor">
+            <a:schemeClr val="lt1"/>
+          </a:fontRef>
+        </p:style>
+        <p:txBody>
+          <a:bodyPr rtlCol="0" anchor="ctr"/>
+          <a:lstStyle/>
+          <a:p>
+            <a:pPr algn="ctr"/>
+            <a:endParaRPr lang="en-CA"/>
+          </a:p>
+        </p:txBody>
+      </p:sp>
+      <p:sp>
+        <p:nvSpPr>
+          <p:cNvPr id="6" name="TextBox 5">
+            <a:extLst>
+              <a:ext uri="{FF2B5EF4-FFF2-40B4-BE49-F238E27FC236}">
+                <a16:creationId xmlns:a16="http://schemas.microsoft.com/office/drawing/2014/main" id="{54405CA9-FB9D-918C-2A43-65255C2E8CF4}"/>
+              </a:ext>
+            </a:extLst>
+          </p:cNvPr>
+          <p:cNvSpPr txBox="1"/>
+          <p:nvPr/>
+        </p:nvSpPr>
+        <p:spPr>
+          <a:xfrm>
+            <a:off x="729916" y="911806"/>
+            <a:ext cx="4203032" cy="461665"/>
+          </a:xfrm>
+          <a:prstGeom prst="rect">
+            <a:avLst/>
+          </a:prstGeom>
+          <a:noFill/>
+        </p:spPr>
+        <p:txBody>
+          <a:bodyPr wrap="square" rtlCol="0">
+            <a:spAutoFit/>
+          </a:bodyPr>
+          <a:lstStyle/>
+          <a:p>
+            <a:pPr algn="ctr"/>
+            <a:r>
+              <a:rPr lang="en-CA" sz="2400" dirty="0"/>
+              <a:t>??? What to use ???</a:t>
+            </a:r>
+          </a:p>
+        </p:txBody>
+      </p:sp>
+    </p:spTree>
+    <p:extLst>
+      <p:ext uri="{BB962C8B-B14F-4D97-AF65-F5344CB8AC3E}">
+        <p14:creationId xmlns:p14="http://schemas.microsoft.com/office/powerpoint/2010/main" val="3035806385"/>
+      </p:ext>
+    </p:extLst>
+  </p:cSld>
+  <p:clrMapOvr>
+    <a:masterClrMapping/>
+  </p:clrMapOvr>
+</p:sld>
+</file>
+
 <file path=ppt/theme/theme1.xml><?xml version="1.0" encoding="utf-8"?>
 <a:theme xmlns:a="http://schemas.openxmlformats.org/drawingml/2006/main" name="Office Theme">
   <a:themeElements>

</xml_diff>

<commit_message>
[6] sources option for HubConfig
</commit_message>
<xml_diff>
--- a/documentation/Hubfx Presentation.pptx
+++ b/documentation/Hubfx Presentation.pptx
@@ -14,6 +14,7 @@
     <p:sldId id="262" r:id="rId8"/>
     <p:sldId id="263" r:id="rId9"/>
     <p:sldId id="264" r:id="rId10"/>
+    <p:sldId id="265" r:id="rId11"/>
   </p:sldIdLst>
   <p:sldSz cx="12192000" cy="6858000"/>
   <p:notesSz cx="6858000" cy="9144000"/>
@@ -1795,7 +1796,7 @@
           <a:p>
             <a:fld id="{154F4BC5-C275-4A59-82DC-6AFC02DFC54D}" type="datetimeFigureOut">
               <a:rPr lang="en-CA" smtClean="0"/>
-              <a:t>2023-09-24</a:t>
+              <a:t>2023-10-01</a:t>
             </a:fld>
             <a:endParaRPr lang="en-CA"/>
           </a:p>
@@ -1995,7 +1996,7 @@
           <a:p>
             <a:fld id="{154F4BC5-C275-4A59-82DC-6AFC02DFC54D}" type="datetimeFigureOut">
               <a:rPr lang="en-CA" smtClean="0"/>
-              <a:t>2023-09-24</a:t>
+              <a:t>2023-10-01</a:t>
             </a:fld>
             <a:endParaRPr lang="en-CA"/>
           </a:p>
@@ -2205,7 +2206,7 @@
           <a:p>
             <a:fld id="{154F4BC5-C275-4A59-82DC-6AFC02DFC54D}" type="datetimeFigureOut">
               <a:rPr lang="en-CA" smtClean="0"/>
-              <a:t>2023-09-24</a:t>
+              <a:t>2023-10-01</a:t>
             </a:fld>
             <a:endParaRPr lang="en-CA"/>
           </a:p>
@@ -2405,7 +2406,7 @@
           <a:p>
             <a:fld id="{154F4BC5-C275-4A59-82DC-6AFC02DFC54D}" type="datetimeFigureOut">
               <a:rPr lang="en-CA" smtClean="0"/>
-              <a:t>2023-09-24</a:t>
+              <a:t>2023-10-01</a:t>
             </a:fld>
             <a:endParaRPr lang="en-CA"/>
           </a:p>
@@ -2681,7 +2682,7 @@
           <a:p>
             <a:fld id="{154F4BC5-C275-4A59-82DC-6AFC02DFC54D}" type="datetimeFigureOut">
               <a:rPr lang="en-CA" smtClean="0"/>
-              <a:t>2023-09-24</a:t>
+              <a:t>2023-10-01</a:t>
             </a:fld>
             <a:endParaRPr lang="en-CA"/>
           </a:p>
@@ -2949,7 +2950,7 @@
           <a:p>
             <a:fld id="{154F4BC5-C275-4A59-82DC-6AFC02DFC54D}" type="datetimeFigureOut">
               <a:rPr lang="en-CA" smtClean="0"/>
-              <a:t>2023-09-24</a:t>
+              <a:t>2023-10-01</a:t>
             </a:fld>
             <a:endParaRPr lang="en-CA"/>
           </a:p>
@@ -3364,7 +3365,7 @@
           <a:p>
             <a:fld id="{154F4BC5-C275-4A59-82DC-6AFC02DFC54D}" type="datetimeFigureOut">
               <a:rPr lang="en-CA" smtClean="0"/>
-              <a:t>2023-09-24</a:t>
+              <a:t>2023-10-01</a:t>
             </a:fld>
             <a:endParaRPr lang="en-CA"/>
           </a:p>
@@ -3506,7 +3507,7 @@
           <a:p>
             <a:fld id="{154F4BC5-C275-4A59-82DC-6AFC02DFC54D}" type="datetimeFigureOut">
               <a:rPr lang="en-CA" smtClean="0"/>
-              <a:t>2023-09-24</a:t>
+              <a:t>2023-10-01</a:t>
             </a:fld>
             <a:endParaRPr lang="en-CA"/>
           </a:p>
@@ -3619,7 +3620,7 @@
           <a:p>
             <a:fld id="{154F4BC5-C275-4A59-82DC-6AFC02DFC54D}" type="datetimeFigureOut">
               <a:rPr lang="en-CA" smtClean="0"/>
-              <a:t>2023-09-24</a:t>
+              <a:t>2023-10-01</a:t>
             </a:fld>
             <a:endParaRPr lang="en-CA"/>
           </a:p>
@@ -3932,7 +3933,7 @@
           <a:p>
             <a:fld id="{154F4BC5-C275-4A59-82DC-6AFC02DFC54D}" type="datetimeFigureOut">
               <a:rPr lang="en-CA" smtClean="0"/>
-              <a:t>2023-09-24</a:t>
+              <a:t>2023-10-01</a:t>
             </a:fld>
             <a:endParaRPr lang="en-CA"/>
           </a:p>
@@ -4221,7 +4222,7 @@
           <a:p>
             <a:fld id="{154F4BC5-C275-4A59-82DC-6AFC02DFC54D}" type="datetimeFigureOut">
               <a:rPr lang="en-CA" smtClean="0"/>
-              <a:t>2023-09-24</a:t>
+              <a:t>2023-10-01</a:t>
             </a:fld>
             <a:endParaRPr lang="en-CA"/>
           </a:p>
@@ -4464,7 +4465,7 @@
           <a:p>
             <a:fld id="{154F4BC5-C275-4A59-82DC-6AFC02DFC54D}" type="datetimeFigureOut">
               <a:rPr lang="en-CA" smtClean="0"/>
-              <a:t>2023-09-24</a:t>
+              <a:t>2023-10-01</a:t>
             </a:fld>
             <a:endParaRPr lang="en-CA"/>
           </a:p>
@@ -5441,6 +5442,1934 @@
     <p:extLst>
       <p:ext uri="{BB962C8B-B14F-4D97-AF65-F5344CB8AC3E}">
         <p14:creationId xmlns:p14="http://schemas.microsoft.com/office/powerpoint/2010/main" val="4084387805"/>
+      </p:ext>
+    </p:extLst>
+  </p:cSld>
+  <p:clrMapOvr>
+    <a:masterClrMapping/>
+  </p:clrMapOvr>
+</p:sld>
+</file>
+
+<file path=ppt/slides/slide10.xml><?xml version="1.0" encoding="utf-8"?>
+<p:sld xmlns:a="http://schemas.openxmlformats.org/drawingml/2006/main" xmlns:r="http://schemas.openxmlformats.org/officeDocument/2006/relationships" xmlns:p="http://schemas.openxmlformats.org/presentationml/2006/main">
+  <p:cSld>
+    <p:spTree>
+      <p:nvGrpSpPr>
+        <p:cNvPr id="1" name=""/>
+        <p:cNvGrpSpPr/>
+        <p:nvPr/>
+      </p:nvGrpSpPr>
+      <p:grpSpPr>
+        <a:xfrm>
+          <a:off x="0" y="0"/>
+          <a:ext cx="0" cy="0"/>
+          <a:chOff x="0" y="0"/>
+          <a:chExt cx="0" cy="0"/>
+        </a:xfrm>
+      </p:grpSpPr>
+      <p:sp>
+        <p:nvSpPr>
+          <p:cNvPr id="106" name="Rectangle: Rounded Corners 105">
+            <a:extLst>
+              <a:ext uri="{FF2B5EF4-FFF2-40B4-BE49-F238E27FC236}">
+                <a16:creationId xmlns:a16="http://schemas.microsoft.com/office/drawing/2014/main" id="{522C20D7-71E7-4B9E-4B83-48DDC36B85DB}"/>
+              </a:ext>
+            </a:extLst>
+          </p:cNvPr>
+          <p:cNvSpPr/>
+          <p:nvPr/>
+        </p:nvSpPr>
+        <p:spPr>
+          <a:xfrm>
+            <a:off x="9364610" y="606916"/>
+            <a:ext cx="2684930" cy="4911626"/>
+          </a:xfrm>
+          <a:prstGeom prst="roundRect">
+            <a:avLst/>
+          </a:prstGeom>
+          <a:solidFill>
+            <a:schemeClr val="accent6">
+              <a:lumMod val="20000"/>
+              <a:lumOff val="80000"/>
+              <a:alpha val="50000"/>
+            </a:schemeClr>
+          </a:solidFill>
+        </p:spPr>
+        <p:style>
+          <a:lnRef idx="2">
+            <a:schemeClr val="accent1">
+              <a:shade val="15000"/>
+            </a:schemeClr>
+          </a:lnRef>
+          <a:fillRef idx="1">
+            <a:schemeClr val="accent1"/>
+          </a:fillRef>
+          <a:effectRef idx="0">
+            <a:schemeClr val="accent1"/>
+          </a:effectRef>
+          <a:fontRef idx="minor">
+            <a:schemeClr val="lt1"/>
+          </a:fontRef>
+        </p:style>
+        <p:txBody>
+          <a:bodyPr rtlCol="0" anchor="ctr"/>
+          <a:lstStyle/>
+          <a:p>
+            <a:endParaRPr lang="en-CA" dirty="0"/>
+          </a:p>
+        </p:txBody>
+      </p:sp>
+      <p:sp>
+        <p:nvSpPr>
+          <p:cNvPr id="40" name="Rectangle: Rounded Corners 39">
+            <a:extLst>
+              <a:ext uri="{FF2B5EF4-FFF2-40B4-BE49-F238E27FC236}">
+                <a16:creationId xmlns:a16="http://schemas.microsoft.com/office/drawing/2014/main" id="{8E086B6F-71B7-4D46-89D4-113CE772AAE6}"/>
+              </a:ext>
+            </a:extLst>
+          </p:cNvPr>
+          <p:cNvSpPr/>
+          <p:nvPr/>
+        </p:nvSpPr>
+        <p:spPr>
+          <a:xfrm>
+            <a:off x="9744394" y="2604021"/>
+            <a:ext cx="2106592" cy="1549542"/>
+          </a:xfrm>
+          <a:prstGeom prst="roundRect">
+            <a:avLst/>
+          </a:prstGeom>
+          <a:solidFill>
+            <a:schemeClr val="accent4">
+              <a:lumMod val="20000"/>
+              <a:lumOff val="80000"/>
+            </a:schemeClr>
+          </a:solidFill>
+        </p:spPr>
+        <p:style>
+          <a:lnRef idx="2">
+            <a:schemeClr val="accent1">
+              <a:shade val="15000"/>
+            </a:schemeClr>
+          </a:lnRef>
+          <a:fillRef idx="1">
+            <a:schemeClr val="accent1"/>
+          </a:fillRef>
+          <a:effectRef idx="0">
+            <a:schemeClr val="accent1"/>
+          </a:effectRef>
+          <a:fontRef idx="minor">
+            <a:schemeClr val="lt1"/>
+          </a:fontRef>
+        </p:style>
+        <p:txBody>
+          <a:bodyPr rtlCol="0" anchor="ctr"/>
+          <a:lstStyle/>
+          <a:p>
+            <a:pPr algn="ctr"/>
+            <a:r>
+              <a:rPr lang="en-CA" sz="2000" dirty="0">
+                <a:solidFill>
+                  <a:schemeClr val="tx1"/>
+                </a:solidFill>
+              </a:rPr>
+              <a:t>Validated Form Store</a:t>
+            </a:r>
+          </a:p>
+        </p:txBody>
+      </p:sp>
+      <p:sp>
+        <p:nvSpPr>
+          <p:cNvPr id="3" name="Rectangle: Rounded Corners 2">
+            <a:extLst>
+              <a:ext uri="{FF2B5EF4-FFF2-40B4-BE49-F238E27FC236}">
+                <a16:creationId xmlns:a16="http://schemas.microsoft.com/office/drawing/2014/main" id="{6E67614B-2C9E-2399-1C9E-308A7761CCA3}"/>
+              </a:ext>
+            </a:extLst>
+          </p:cNvPr>
+          <p:cNvSpPr/>
+          <p:nvPr/>
+        </p:nvSpPr>
+        <p:spPr>
+          <a:xfrm>
+            <a:off x="3358697" y="2604021"/>
+            <a:ext cx="2396672" cy="1549542"/>
+          </a:xfrm>
+          <a:prstGeom prst="roundRect">
+            <a:avLst/>
+          </a:prstGeom>
+          <a:solidFill>
+            <a:schemeClr val="accent4">
+              <a:lumMod val="20000"/>
+              <a:lumOff val="80000"/>
+            </a:schemeClr>
+          </a:solidFill>
+        </p:spPr>
+        <p:style>
+          <a:lnRef idx="2">
+            <a:schemeClr val="accent1">
+              <a:shade val="15000"/>
+            </a:schemeClr>
+          </a:lnRef>
+          <a:fillRef idx="1">
+            <a:schemeClr val="accent1"/>
+          </a:fillRef>
+          <a:effectRef idx="0">
+            <a:schemeClr val="accent1"/>
+          </a:effectRef>
+          <a:fontRef idx="minor">
+            <a:schemeClr val="lt1"/>
+          </a:fontRef>
+        </p:style>
+        <p:txBody>
+          <a:bodyPr rtlCol="0" anchor="ctr"/>
+          <a:lstStyle/>
+          <a:p>
+            <a:pPr algn="ctr"/>
+            <a:r>
+              <a:rPr lang="en-CA" sz="2000" dirty="0">
+                <a:solidFill>
+                  <a:schemeClr val="tx1"/>
+                </a:solidFill>
+              </a:rPr>
+              <a:t>Base Form Store</a:t>
+            </a:r>
+          </a:p>
+          <a:p>
+            <a:pPr algn="ctr"/>
+            <a:r>
+              <a:rPr lang="en-CA" sz="2000" dirty="0">
+                <a:solidFill>
+                  <a:schemeClr val="tx1"/>
+                </a:solidFill>
+              </a:rPr>
+              <a:t>(partial validation)</a:t>
+            </a:r>
+          </a:p>
+        </p:txBody>
+      </p:sp>
+      <p:cxnSp>
+        <p:nvCxnSpPr>
+          <p:cNvPr id="2" name="Straight Arrow Connector 1">
+            <a:extLst>
+              <a:ext uri="{FF2B5EF4-FFF2-40B4-BE49-F238E27FC236}">
+                <a16:creationId xmlns:a16="http://schemas.microsoft.com/office/drawing/2014/main" id="{3A085252-946F-A6D4-FB17-D3092B4BA9B8}"/>
+              </a:ext>
+            </a:extLst>
+          </p:cNvPr>
+          <p:cNvCxnSpPr>
+            <a:cxnSpLocks/>
+          </p:cNvCxnSpPr>
+          <p:nvPr/>
+        </p:nvCxnSpPr>
+        <p:spPr>
+          <a:xfrm>
+            <a:off x="297180" y="3378792"/>
+            <a:ext cx="3502660" cy="14329"/>
+          </a:xfrm>
+          <a:prstGeom prst="straightConnector1">
+            <a:avLst/>
+          </a:prstGeom>
+          <a:ln w="34925">
+            <a:tailEnd type="arrow"/>
+          </a:ln>
+        </p:spPr>
+        <p:style>
+          <a:lnRef idx="1">
+            <a:schemeClr val="accent1"/>
+          </a:lnRef>
+          <a:fillRef idx="0">
+            <a:schemeClr val="accent1"/>
+          </a:fillRef>
+          <a:effectRef idx="0">
+            <a:schemeClr val="accent1"/>
+          </a:effectRef>
+          <a:fontRef idx="minor">
+            <a:schemeClr val="tx1"/>
+          </a:fontRef>
+        </p:style>
+      </p:cxnSp>
+      <p:sp>
+        <p:nvSpPr>
+          <p:cNvPr id="4" name="Oval 3">
+            <a:extLst>
+              <a:ext uri="{FF2B5EF4-FFF2-40B4-BE49-F238E27FC236}">
+                <a16:creationId xmlns:a16="http://schemas.microsoft.com/office/drawing/2014/main" id="{1AC4A9FF-4ACA-E7BB-1510-75A2490F3132}"/>
+              </a:ext>
+            </a:extLst>
+          </p:cNvPr>
+          <p:cNvSpPr/>
+          <p:nvPr/>
+        </p:nvSpPr>
+        <p:spPr>
+          <a:xfrm>
+            <a:off x="2487276" y="3178224"/>
+            <a:ext cx="353536" cy="353536"/>
+          </a:xfrm>
+          <a:prstGeom prst="ellipse">
+            <a:avLst/>
+          </a:prstGeom>
+          <a:solidFill>
+            <a:schemeClr val="accent6">
+              <a:lumMod val="40000"/>
+              <a:lumOff val="60000"/>
+            </a:schemeClr>
+          </a:solidFill>
+        </p:spPr>
+        <p:style>
+          <a:lnRef idx="2">
+            <a:schemeClr val="accent1">
+              <a:shade val="15000"/>
+            </a:schemeClr>
+          </a:lnRef>
+          <a:fillRef idx="1">
+            <a:schemeClr val="accent1"/>
+          </a:fillRef>
+          <a:effectRef idx="0">
+            <a:schemeClr val="accent1"/>
+          </a:effectRef>
+          <a:fontRef idx="minor">
+            <a:schemeClr val="lt1"/>
+          </a:fontRef>
+        </p:style>
+        <p:txBody>
+          <a:bodyPr rtlCol="0" anchor="ctr"/>
+          <a:lstStyle/>
+          <a:p>
+            <a:pPr algn="ctr"/>
+            <a:endParaRPr lang="en-CA"/>
+          </a:p>
+        </p:txBody>
+      </p:sp>
+      <p:sp>
+        <p:nvSpPr>
+          <p:cNvPr id="5" name="TextBox 4">
+            <a:extLst>
+              <a:ext uri="{FF2B5EF4-FFF2-40B4-BE49-F238E27FC236}">
+                <a16:creationId xmlns:a16="http://schemas.microsoft.com/office/drawing/2014/main" id="{7E441CD8-4EF4-F3D2-CE95-D1348DBD1DF7}"/>
+              </a:ext>
+            </a:extLst>
+          </p:cNvPr>
+          <p:cNvSpPr txBox="1"/>
+          <p:nvPr/>
+        </p:nvSpPr>
+        <p:spPr>
+          <a:xfrm>
+            <a:off x="4585284" y="438368"/>
+            <a:ext cx="2092279" cy="523220"/>
+          </a:xfrm>
+          <a:prstGeom prst="rect">
+            <a:avLst/>
+          </a:prstGeom>
+          <a:noFill/>
+        </p:spPr>
+        <p:txBody>
+          <a:bodyPr wrap="square" rtlCol="0">
+            <a:spAutoFit/>
+          </a:bodyPr>
+          <a:lstStyle/>
+          <a:p>
+            <a:r>
+              <a:rPr lang="en-CA" sz="2800" dirty="0"/>
+              <a:t>Hubfx Forms</a:t>
+            </a:r>
+          </a:p>
+        </p:txBody>
+      </p:sp>
+      <p:sp>
+        <p:nvSpPr>
+          <p:cNvPr id="6" name="Oval 5">
+            <a:extLst>
+              <a:ext uri="{FF2B5EF4-FFF2-40B4-BE49-F238E27FC236}">
+                <a16:creationId xmlns:a16="http://schemas.microsoft.com/office/drawing/2014/main" id="{436EAF86-D283-1961-C89C-2D5F386D1E47}"/>
+              </a:ext>
+            </a:extLst>
+          </p:cNvPr>
+          <p:cNvSpPr/>
+          <p:nvPr/>
+        </p:nvSpPr>
+        <p:spPr>
+          <a:xfrm>
+            <a:off x="177452" y="2289946"/>
+            <a:ext cx="3113155" cy="2152036"/>
+          </a:xfrm>
+          <a:prstGeom prst="ellipse">
+            <a:avLst/>
+          </a:prstGeom>
+          <a:noFill/>
+          <a:ln w="38100">
+            <a:prstDash val="lgDash"/>
+          </a:ln>
+        </p:spPr>
+        <p:style>
+          <a:lnRef idx="2">
+            <a:schemeClr val="accent1">
+              <a:shade val="15000"/>
+            </a:schemeClr>
+          </a:lnRef>
+          <a:fillRef idx="1">
+            <a:schemeClr val="accent1"/>
+          </a:fillRef>
+          <a:effectRef idx="0">
+            <a:schemeClr val="accent1"/>
+          </a:effectRef>
+          <a:fontRef idx="minor">
+            <a:schemeClr val="lt1"/>
+          </a:fontRef>
+        </p:style>
+        <p:txBody>
+          <a:bodyPr rtlCol="0" anchor="ctr"/>
+          <a:lstStyle/>
+          <a:p>
+            <a:pPr algn="ctr"/>
+            <a:endParaRPr lang="en-CA"/>
+          </a:p>
+        </p:txBody>
+      </p:sp>
+      <p:sp>
+        <p:nvSpPr>
+          <p:cNvPr id="9" name="TextBox 8">
+            <a:extLst>
+              <a:ext uri="{FF2B5EF4-FFF2-40B4-BE49-F238E27FC236}">
+                <a16:creationId xmlns:a16="http://schemas.microsoft.com/office/drawing/2014/main" id="{B07FF30A-5260-F5B2-71A9-8AF2C7E14F6D}"/>
+              </a:ext>
+            </a:extLst>
+          </p:cNvPr>
+          <p:cNvSpPr txBox="1"/>
+          <p:nvPr/>
+        </p:nvSpPr>
+        <p:spPr>
+          <a:xfrm>
+            <a:off x="544126" y="4624233"/>
+            <a:ext cx="2558362" cy="800219"/>
+          </a:xfrm>
+          <a:prstGeom prst="rect">
+            <a:avLst/>
+          </a:prstGeom>
+          <a:solidFill>
+            <a:schemeClr val="bg1"/>
+          </a:solidFill>
+          <a:ln>
+            <a:solidFill>
+              <a:schemeClr val="accent1">
+                <a:shade val="15000"/>
+              </a:schemeClr>
+            </a:solidFill>
+          </a:ln>
+        </p:spPr>
+        <p:txBody>
+          <a:bodyPr wrap="square" rtlCol="0">
+            <a:spAutoFit/>
+          </a:bodyPr>
+          <a:lstStyle/>
+          <a:p>
+            <a:pPr algn="ctr"/>
+            <a:r>
+              <a:rPr lang="en-CA" dirty="0"/>
+              <a:t>Dispatcher (User) Actions</a:t>
+            </a:r>
+            <a:endParaRPr lang="en-CA" sz="1400" dirty="0"/>
+          </a:p>
+          <a:p>
+            <a:r>
+              <a:rPr lang="en-CA" sz="1400" dirty="0"/>
+              <a:t>FORMS_CONTROL_CHANGE</a:t>
+            </a:r>
+          </a:p>
+          <a:p>
+            <a:r>
+              <a:rPr lang="en-CA" sz="1400" dirty="0"/>
+              <a:t>FORMS_ADD_CONTROL</a:t>
+            </a:r>
+          </a:p>
+        </p:txBody>
+      </p:sp>
+      <p:sp>
+        <p:nvSpPr>
+          <p:cNvPr id="12" name="Oval 11">
+            <a:extLst>
+              <a:ext uri="{FF2B5EF4-FFF2-40B4-BE49-F238E27FC236}">
+                <a16:creationId xmlns:a16="http://schemas.microsoft.com/office/drawing/2014/main" id="{98E8350D-B40F-136C-9B26-A5FF6B9CEFD3}"/>
+              </a:ext>
+            </a:extLst>
+          </p:cNvPr>
+          <p:cNvSpPr/>
+          <p:nvPr/>
+        </p:nvSpPr>
+        <p:spPr>
+          <a:xfrm>
+            <a:off x="563006" y="3178224"/>
+            <a:ext cx="355106" cy="355106"/>
+          </a:xfrm>
+          <a:prstGeom prst="ellipse">
+            <a:avLst/>
+          </a:prstGeom>
+          <a:solidFill>
+            <a:schemeClr val="bg2"/>
+          </a:solidFill>
+        </p:spPr>
+        <p:style>
+          <a:lnRef idx="2">
+            <a:schemeClr val="accent1">
+              <a:shade val="15000"/>
+            </a:schemeClr>
+          </a:lnRef>
+          <a:fillRef idx="1">
+            <a:schemeClr val="accent1"/>
+          </a:fillRef>
+          <a:effectRef idx="0">
+            <a:schemeClr val="accent1"/>
+          </a:effectRef>
+          <a:fontRef idx="minor">
+            <a:schemeClr val="lt1"/>
+          </a:fontRef>
+        </p:style>
+        <p:txBody>
+          <a:bodyPr rtlCol="0" anchor="ctr"/>
+          <a:lstStyle/>
+          <a:p>
+            <a:pPr algn="ctr"/>
+            <a:endParaRPr lang="en-CA"/>
+          </a:p>
+        </p:txBody>
+      </p:sp>
+      <p:cxnSp>
+        <p:nvCxnSpPr>
+          <p:cNvPr id="35" name="Straight Arrow Connector 34">
+            <a:extLst>
+              <a:ext uri="{FF2B5EF4-FFF2-40B4-BE49-F238E27FC236}">
+                <a16:creationId xmlns:a16="http://schemas.microsoft.com/office/drawing/2014/main" id="{F5770EE1-A1D0-3016-EBC2-8E30A07EA51A}"/>
+              </a:ext>
+            </a:extLst>
+          </p:cNvPr>
+          <p:cNvCxnSpPr>
+            <a:cxnSpLocks/>
+            <a:stCxn id="3" idx="3"/>
+          </p:cNvCxnSpPr>
+          <p:nvPr/>
+        </p:nvCxnSpPr>
+        <p:spPr>
+          <a:xfrm>
+            <a:off x="5755369" y="3378792"/>
+            <a:ext cx="4709431" cy="23860"/>
+          </a:xfrm>
+          <a:prstGeom prst="straightConnector1">
+            <a:avLst/>
+          </a:prstGeom>
+          <a:ln w="34925">
+            <a:solidFill>
+              <a:schemeClr val="accent6">
+                <a:lumMod val="60000"/>
+                <a:lumOff val="40000"/>
+              </a:schemeClr>
+            </a:solidFill>
+            <a:tailEnd type="arrow"/>
+          </a:ln>
+        </p:spPr>
+        <p:style>
+          <a:lnRef idx="1">
+            <a:schemeClr val="accent1"/>
+          </a:lnRef>
+          <a:fillRef idx="0">
+            <a:schemeClr val="accent1"/>
+          </a:fillRef>
+          <a:effectRef idx="0">
+            <a:schemeClr val="accent1"/>
+          </a:effectRef>
+          <a:fontRef idx="minor">
+            <a:schemeClr val="tx1"/>
+          </a:fontRef>
+        </p:style>
+      </p:cxnSp>
+      <p:sp>
+        <p:nvSpPr>
+          <p:cNvPr id="37" name="Oval 36">
+            <a:extLst>
+              <a:ext uri="{FF2B5EF4-FFF2-40B4-BE49-F238E27FC236}">
+                <a16:creationId xmlns:a16="http://schemas.microsoft.com/office/drawing/2014/main" id="{32A74E61-AAB7-331B-13A6-0FFC63FC63D6}"/>
+              </a:ext>
+            </a:extLst>
+          </p:cNvPr>
+          <p:cNvSpPr/>
+          <p:nvPr/>
+        </p:nvSpPr>
+        <p:spPr>
+          <a:xfrm>
+            <a:off x="6073829" y="2235200"/>
+            <a:ext cx="3168220" cy="2386029"/>
+          </a:xfrm>
+          <a:prstGeom prst="ellipse">
+            <a:avLst/>
+          </a:prstGeom>
+          <a:noFill/>
+          <a:ln w="38100">
+            <a:prstDash val="lgDash"/>
+          </a:ln>
+        </p:spPr>
+        <p:style>
+          <a:lnRef idx="2">
+            <a:schemeClr val="accent1">
+              <a:shade val="15000"/>
+            </a:schemeClr>
+          </a:lnRef>
+          <a:fillRef idx="1">
+            <a:schemeClr val="accent1"/>
+          </a:fillRef>
+          <a:effectRef idx="0">
+            <a:schemeClr val="accent1"/>
+          </a:effectRef>
+          <a:fontRef idx="minor">
+            <a:schemeClr val="lt1"/>
+          </a:fontRef>
+        </p:style>
+        <p:txBody>
+          <a:bodyPr rtlCol="0" anchor="ctr"/>
+          <a:lstStyle/>
+          <a:p>
+            <a:pPr algn="ctr"/>
+            <a:endParaRPr lang="en-CA"/>
+          </a:p>
+        </p:txBody>
+      </p:sp>
+      <p:sp>
+        <p:nvSpPr>
+          <p:cNvPr id="54" name="Oval 53">
+            <a:extLst>
+              <a:ext uri="{FF2B5EF4-FFF2-40B4-BE49-F238E27FC236}">
+                <a16:creationId xmlns:a16="http://schemas.microsoft.com/office/drawing/2014/main" id="{CE06762A-D69D-D849-D40D-FCB920C1E8D1}"/>
+              </a:ext>
+            </a:extLst>
+          </p:cNvPr>
+          <p:cNvSpPr/>
+          <p:nvPr/>
+        </p:nvSpPr>
+        <p:spPr>
+          <a:xfrm>
+            <a:off x="5911151" y="3217723"/>
+            <a:ext cx="350797" cy="350797"/>
+          </a:xfrm>
+          <a:prstGeom prst="ellipse">
+            <a:avLst/>
+          </a:prstGeom>
+          <a:solidFill>
+            <a:schemeClr val="accent1">
+              <a:lumMod val="60000"/>
+              <a:lumOff val="40000"/>
+              <a:alpha val="50000"/>
+            </a:schemeClr>
+          </a:solidFill>
+        </p:spPr>
+        <p:style>
+          <a:lnRef idx="2">
+            <a:schemeClr val="accent1">
+              <a:shade val="15000"/>
+            </a:schemeClr>
+          </a:lnRef>
+          <a:fillRef idx="1">
+            <a:schemeClr val="accent1"/>
+          </a:fillRef>
+          <a:effectRef idx="0">
+            <a:schemeClr val="accent1"/>
+          </a:effectRef>
+          <a:fontRef idx="minor">
+            <a:schemeClr val="lt1"/>
+          </a:fontRef>
+        </p:style>
+        <p:txBody>
+          <a:bodyPr rtlCol="0" anchor="ctr"/>
+          <a:lstStyle/>
+          <a:p>
+            <a:pPr algn="ctr"/>
+            <a:endParaRPr lang="en-CA"/>
+          </a:p>
+        </p:txBody>
+      </p:sp>
+      <p:sp>
+        <p:nvSpPr>
+          <p:cNvPr id="60" name="TextBox 59">
+            <a:extLst>
+              <a:ext uri="{FF2B5EF4-FFF2-40B4-BE49-F238E27FC236}">
+                <a16:creationId xmlns:a16="http://schemas.microsoft.com/office/drawing/2014/main" id="{CE614C56-C033-600E-FCF9-11D9B8C46C63}"/>
+              </a:ext>
+            </a:extLst>
+          </p:cNvPr>
+          <p:cNvSpPr txBox="1"/>
+          <p:nvPr/>
+        </p:nvSpPr>
+        <p:spPr>
+          <a:xfrm>
+            <a:off x="1198669" y="3205727"/>
+            <a:ext cx="1117812" cy="307777"/>
+          </a:xfrm>
+          <a:prstGeom prst="rect">
+            <a:avLst/>
+          </a:prstGeom>
+          <a:solidFill>
+            <a:schemeClr val="bg1"/>
+          </a:solidFill>
+          <a:ln>
+            <a:solidFill>
+              <a:schemeClr val="accent1">
+                <a:shade val="15000"/>
+              </a:schemeClr>
+            </a:solidFill>
+          </a:ln>
+        </p:spPr>
+        <p:txBody>
+          <a:bodyPr wrap="square" rtlCol="0">
+            <a:spAutoFit/>
+          </a:bodyPr>
+          <a:lstStyle/>
+          <a:p>
+            <a:pPr algn="ctr"/>
+            <a:r>
+              <a:rPr lang="en-CA" sz="1400" dirty="0"/>
+              <a:t>dispatcher$</a:t>
+            </a:r>
+          </a:p>
+        </p:txBody>
+      </p:sp>
+      <p:sp>
+        <p:nvSpPr>
+          <p:cNvPr id="63" name="TextBox 62">
+            <a:extLst>
+              <a:ext uri="{FF2B5EF4-FFF2-40B4-BE49-F238E27FC236}">
+                <a16:creationId xmlns:a16="http://schemas.microsoft.com/office/drawing/2014/main" id="{4C8DF126-D70D-8E4D-5899-6C2301DB73B6}"/>
+              </a:ext>
+            </a:extLst>
+          </p:cNvPr>
+          <p:cNvSpPr txBox="1"/>
+          <p:nvPr/>
+        </p:nvSpPr>
+        <p:spPr>
+          <a:xfrm>
+            <a:off x="7072699" y="3216827"/>
+            <a:ext cx="1380224" cy="307777"/>
+          </a:xfrm>
+          <a:prstGeom prst="rect">
+            <a:avLst/>
+          </a:prstGeom>
+          <a:solidFill>
+            <a:schemeClr val="bg1"/>
+          </a:solidFill>
+          <a:ln>
+            <a:solidFill>
+              <a:schemeClr val="accent1">
+                <a:shade val="15000"/>
+              </a:schemeClr>
+            </a:solidFill>
+          </a:ln>
+        </p:spPr>
+        <p:txBody>
+          <a:bodyPr wrap="square" rtlCol="0">
+            <a:spAutoFit/>
+          </a:bodyPr>
+          <a:lstStyle/>
+          <a:p>
+            <a:pPr algn="ctr"/>
+            <a:r>
+              <a:rPr lang="en-CA" sz="1400" dirty="0"/>
+              <a:t>sourceForHub2$</a:t>
+            </a:r>
+          </a:p>
+        </p:txBody>
+      </p:sp>
+      <p:sp>
+        <p:nvSpPr>
+          <p:cNvPr id="65" name="TextBox 64">
+            <a:extLst>
+              <a:ext uri="{FF2B5EF4-FFF2-40B4-BE49-F238E27FC236}">
+                <a16:creationId xmlns:a16="http://schemas.microsoft.com/office/drawing/2014/main" id="{A72DD2CC-A92D-90EB-3CC1-EB6AFC05D83A}"/>
+              </a:ext>
+            </a:extLst>
+          </p:cNvPr>
+          <p:cNvSpPr txBox="1"/>
+          <p:nvPr/>
+        </p:nvSpPr>
+        <p:spPr>
+          <a:xfrm>
+            <a:off x="6343510" y="1723917"/>
+            <a:ext cx="2637504" cy="369332"/>
+          </a:xfrm>
+          <a:prstGeom prst="rect">
+            <a:avLst/>
+          </a:prstGeom>
+          <a:noFill/>
+        </p:spPr>
+        <p:txBody>
+          <a:bodyPr wrap="square" rtlCol="0">
+            <a:spAutoFit/>
+          </a:bodyPr>
+          <a:lstStyle/>
+          <a:p>
+            <a:r>
+              <a:rPr lang="en-CA" dirty="0"/>
+              <a:t>Hub 2 – Async Validation</a:t>
+            </a:r>
+          </a:p>
+        </p:txBody>
+      </p:sp>
+      <p:sp>
+        <p:nvSpPr>
+          <p:cNvPr id="66" name="TextBox 65">
+            <a:extLst>
+              <a:ext uri="{FF2B5EF4-FFF2-40B4-BE49-F238E27FC236}">
+                <a16:creationId xmlns:a16="http://schemas.microsoft.com/office/drawing/2014/main" id="{A0FE41AB-6FF8-F3EA-DDAC-BE7405DFE942}"/>
+              </a:ext>
+            </a:extLst>
+          </p:cNvPr>
+          <p:cNvSpPr txBox="1"/>
+          <p:nvPr/>
+        </p:nvSpPr>
+        <p:spPr>
+          <a:xfrm>
+            <a:off x="624937" y="1640688"/>
+            <a:ext cx="2456971" cy="369332"/>
+          </a:xfrm>
+          <a:prstGeom prst="rect">
+            <a:avLst/>
+          </a:prstGeom>
+          <a:noFill/>
+        </p:spPr>
+        <p:txBody>
+          <a:bodyPr wrap="square" rtlCol="0">
+            <a:spAutoFit/>
+          </a:bodyPr>
+          <a:lstStyle/>
+          <a:p>
+            <a:r>
+              <a:rPr lang="en-CA" dirty="0"/>
+              <a:t>Hub 1 – User Actions</a:t>
+            </a:r>
+          </a:p>
+        </p:txBody>
+      </p:sp>
+      <p:sp>
+        <p:nvSpPr>
+          <p:cNvPr id="67" name="Arc 66">
+            <a:extLst>
+              <a:ext uri="{FF2B5EF4-FFF2-40B4-BE49-F238E27FC236}">
+                <a16:creationId xmlns:a16="http://schemas.microsoft.com/office/drawing/2014/main" id="{FD098034-63A2-14C5-4689-14E57FDFF334}"/>
+              </a:ext>
+            </a:extLst>
+          </p:cNvPr>
+          <p:cNvSpPr/>
+          <p:nvPr/>
+        </p:nvSpPr>
+        <p:spPr>
+          <a:xfrm flipV="1">
+            <a:off x="6207332" y="2935853"/>
+            <a:ext cx="3523791" cy="1086709"/>
+          </a:xfrm>
+          <a:prstGeom prst="arc">
+            <a:avLst>
+              <a:gd name="adj1" fmla="val 10769572"/>
+              <a:gd name="adj2" fmla="val 21448792"/>
+            </a:avLst>
+          </a:prstGeom>
+          <a:ln w="34925">
+            <a:solidFill>
+              <a:schemeClr val="accent2"/>
+            </a:solidFill>
+            <a:tailEnd type="arrow"/>
+          </a:ln>
+        </p:spPr>
+        <p:style>
+          <a:lnRef idx="1">
+            <a:schemeClr val="accent1"/>
+          </a:lnRef>
+          <a:fillRef idx="0">
+            <a:schemeClr val="accent1"/>
+          </a:fillRef>
+          <a:effectRef idx="0">
+            <a:schemeClr val="accent1"/>
+          </a:effectRef>
+          <a:fontRef idx="minor">
+            <a:schemeClr val="tx1"/>
+          </a:fontRef>
+        </p:style>
+        <p:txBody>
+          <a:bodyPr rtlCol="0" anchor="ctr"/>
+          <a:lstStyle/>
+          <a:p>
+            <a:pPr algn="ctr"/>
+            <a:endParaRPr lang="en-CA"/>
+          </a:p>
+        </p:txBody>
+      </p:sp>
+      <p:sp>
+        <p:nvSpPr>
+          <p:cNvPr id="68" name="Arc 67">
+            <a:extLst>
+              <a:ext uri="{FF2B5EF4-FFF2-40B4-BE49-F238E27FC236}">
+                <a16:creationId xmlns:a16="http://schemas.microsoft.com/office/drawing/2014/main" id="{42C32F68-CA99-AFD5-7EF4-F87048816E7E}"/>
+              </a:ext>
+            </a:extLst>
+          </p:cNvPr>
+          <p:cNvSpPr/>
+          <p:nvPr/>
+        </p:nvSpPr>
+        <p:spPr>
+          <a:xfrm>
+            <a:off x="6194061" y="2738000"/>
+            <a:ext cx="3523791" cy="1086710"/>
+          </a:xfrm>
+          <a:prstGeom prst="arc">
+            <a:avLst>
+              <a:gd name="adj1" fmla="val 10769572"/>
+              <a:gd name="adj2" fmla="val 21448792"/>
+            </a:avLst>
+          </a:prstGeom>
+          <a:ln w="34925">
+            <a:solidFill>
+              <a:schemeClr val="accent2"/>
+            </a:solidFill>
+            <a:tailEnd type="arrow"/>
+          </a:ln>
+        </p:spPr>
+        <p:style>
+          <a:lnRef idx="1">
+            <a:schemeClr val="accent1"/>
+          </a:lnRef>
+          <a:fillRef idx="0">
+            <a:schemeClr val="accent1"/>
+          </a:fillRef>
+          <a:effectRef idx="0">
+            <a:schemeClr val="accent1"/>
+          </a:effectRef>
+          <a:fontRef idx="minor">
+            <a:schemeClr val="tx1"/>
+          </a:fontRef>
+        </p:style>
+        <p:txBody>
+          <a:bodyPr rtlCol="0" anchor="ctr"/>
+          <a:lstStyle/>
+          <a:p>
+            <a:pPr algn="ctr"/>
+            <a:endParaRPr lang="en-CA"/>
+          </a:p>
+        </p:txBody>
+      </p:sp>
+      <p:sp>
+        <p:nvSpPr>
+          <p:cNvPr id="71" name="TextBox 70">
+            <a:extLst>
+              <a:ext uri="{FF2B5EF4-FFF2-40B4-BE49-F238E27FC236}">
+                <a16:creationId xmlns:a16="http://schemas.microsoft.com/office/drawing/2014/main" id="{C579B0D2-2BD0-E83C-9123-C28538FCAEB5}"/>
+              </a:ext>
+            </a:extLst>
+          </p:cNvPr>
+          <p:cNvSpPr txBox="1"/>
+          <p:nvPr/>
+        </p:nvSpPr>
+        <p:spPr>
+          <a:xfrm>
+            <a:off x="6833895" y="2643235"/>
+            <a:ext cx="2051387" cy="307777"/>
+          </a:xfrm>
+          <a:prstGeom prst="rect">
+            <a:avLst/>
+          </a:prstGeom>
+          <a:solidFill>
+            <a:schemeClr val="bg1"/>
+          </a:solidFill>
+          <a:ln>
+            <a:solidFill>
+              <a:schemeClr val="accent1">
+                <a:shade val="15000"/>
+              </a:schemeClr>
+            </a:solidFill>
+          </a:ln>
+        </p:spPr>
+        <p:txBody>
+          <a:bodyPr wrap="square" rtlCol="0">
+            <a:spAutoFit/>
+          </a:bodyPr>
+          <a:lstStyle/>
+          <a:p>
+            <a:pPr algn="ctr"/>
+            <a:r>
+              <a:rPr lang="en-CA" sz="1400" dirty="0"/>
+              <a:t>controlAsyncValidator$</a:t>
+            </a:r>
+          </a:p>
+        </p:txBody>
+      </p:sp>
+      <p:sp>
+        <p:nvSpPr>
+          <p:cNvPr id="73" name="TextBox 72">
+            <a:extLst>
+              <a:ext uri="{FF2B5EF4-FFF2-40B4-BE49-F238E27FC236}">
+                <a16:creationId xmlns:a16="http://schemas.microsoft.com/office/drawing/2014/main" id="{7B2A229D-7138-672B-E1CD-17C600D80BDB}"/>
+              </a:ext>
+            </a:extLst>
+          </p:cNvPr>
+          <p:cNvSpPr txBox="1"/>
+          <p:nvPr/>
+        </p:nvSpPr>
+        <p:spPr>
+          <a:xfrm>
+            <a:off x="6811701" y="3809648"/>
+            <a:ext cx="2051387" cy="307777"/>
+          </a:xfrm>
+          <a:prstGeom prst="rect">
+            <a:avLst/>
+          </a:prstGeom>
+          <a:solidFill>
+            <a:schemeClr val="bg1"/>
+          </a:solidFill>
+          <a:ln>
+            <a:solidFill>
+              <a:schemeClr val="accent1">
+                <a:shade val="15000"/>
+              </a:schemeClr>
+            </a:solidFill>
+          </a:ln>
+        </p:spPr>
+        <p:txBody>
+          <a:bodyPr wrap="square" rtlCol="0">
+            <a:spAutoFit/>
+          </a:bodyPr>
+          <a:lstStyle/>
+          <a:p>
+            <a:pPr algn="ctr"/>
+            <a:r>
+              <a:rPr lang="en-CA" sz="1400" dirty="0"/>
+              <a:t>controlAsyncValidator$</a:t>
+            </a:r>
+          </a:p>
+        </p:txBody>
+      </p:sp>
+      <p:sp>
+        <p:nvSpPr>
+          <p:cNvPr id="74" name="Oval 73">
+            <a:extLst>
+              <a:ext uri="{FF2B5EF4-FFF2-40B4-BE49-F238E27FC236}">
+                <a16:creationId xmlns:a16="http://schemas.microsoft.com/office/drawing/2014/main" id="{E633858B-C360-72FE-2C64-9A173A408608}"/>
+              </a:ext>
+            </a:extLst>
+          </p:cNvPr>
+          <p:cNvSpPr/>
+          <p:nvPr/>
+        </p:nvSpPr>
+        <p:spPr>
+          <a:xfrm>
+            <a:off x="6397365" y="2760454"/>
+            <a:ext cx="350797" cy="350797"/>
+          </a:xfrm>
+          <a:prstGeom prst="ellipse">
+            <a:avLst/>
+          </a:prstGeom>
+          <a:solidFill>
+            <a:schemeClr val="accent4">
+              <a:lumMod val="60000"/>
+              <a:lumOff val="40000"/>
+              <a:alpha val="50000"/>
+            </a:schemeClr>
+          </a:solidFill>
+        </p:spPr>
+        <p:style>
+          <a:lnRef idx="2">
+            <a:schemeClr val="accent1">
+              <a:shade val="15000"/>
+            </a:schemeClr>
+          </a:lnRef>
+          <a:fillRef idx="1">
+            <a:schemeClr val="accent1"/>
+          </a:fillRef>
+          <a:effectRef idx="0">
+            <a:schemeClr val="accent1"/>
+          </a:effectRef>
+          <a:fontRef idx="minor">
+            <a:schemeClr val="lt1"/>
+          </a:fontRef>
+        </p:style>
+        <p:txBody>
+          <a:bodyPr rtlCol="0" anchor="ctr"/>
+          <a:lstStyle/>
+          <a:p>
+            <a:pPr algn="ctr"/>
+            <a:endParaRPr lang="en-CA"/>
+          </a:p>
+        </p:txBody>
+      </p:sp>
+      <p:sp>
+        <p:nvSpPr>
+          <p:cNvPr id="75" name="Oval 74">
+            <a:extLst>
+              <a:ext uri="{FF2B5EF4-FFF2-40B4-BE49-F238E27FC236}">
+                <a16:creationId xmlns:a16="http://schemas.microsoft.com/office/drawing/2014/main" id="{FC50D024-302F-D907-8E0F-07E6FBB43EFD}"/>
+              </a:ext>
+            </a:extLst>
+          </p:cNvPr>
+          <p:cNvSpPr/>
+          <p:nvPr/>
+        </p:nvSpPr>
+        <p:spPr>
+          <a:xfrm>
+            <a:off x="6343510" y="3615028"/>
+            <a:ext cx="350797" cy="350797"/>
+          </a:xfrm>
+          <a:prstGeom prst="ellipse">
+            <a:avLst/>
+          </a:prstGeom>
+          <a:solidFill>
+            <a:schemeClr val="accent4">
+              <a:lumMod val="40000"/>
+              <a:lumOff val="60000"/>
+              <a:alpha val="50000"/>
+            </a:schemeClr>
+          </a:solidFill>
+        </p:spPr>
+        <p:style>
+          <a:lnRef idx="2">
+            <a:schemeClr val="accent1">
+              <a:shade val="15000"/>
+            </a:schemeClr>
+          </a:lnRef>
+          <a:fillRef idx="1">
+            <a:schemeClr val="accent1"/>
+          </a:fillRef>
+          <a:effectRef idx="0">
+            <a:schemeClr val="accent1"/>
+          </a:effectRef>
+          <a:fontRef idx="minor">
+            <a:schemeClr val="lt1"/>
+          </a:fontRef>
+        </p:style>
+        <p:txBody>
+          <a:bodyPr rtlCol="0" anchor="ctr"/>
+          <a:lstStyle/>
+          <a:p>
+            <a:pPr algn="ctr"/>
+            <a:endParaRPr lang="en-CA"/>
+          </a:p>
+        </p:txBody>
+      </p:sp>
+      <p:sp>
+        <p:nvSpPr>
+          <p:cNvPr id="76" name="Oval 75">
+            <a:extLst>
+              <a:ext uri="{FF2B5EF4-FFF2-40B4-BE49-F238E27FC236}">
+                <a16:creationId xmlns:a16="http://schemas.microsoft.com/office/drawing/2014/main" id="{6E4A664F-40FB-2CE2-04D7-454257BF1103}"/>
+              </a:ext>
+            </a:extLst>
+          </p:cNvPr>
+          <p:cNvSpPr/>
+          <p:nvPr/>
+        </p:nvSpPr>
+        <p:spPr>
+          <a:xfrm>
+            <a:off x="8938753" y="2662976"/>
+            <a:ext cx="350797" cy="350797"/>
+          </a:xfrm>
+          <a:prstGeom prst="ellipse">
+            <a:avLst/>
+          </a:prstGeom>
+          <a:solidFill>
+            <a:srgbClr val="92D050"/>
+          </a:solidFill>
+        </p:spPr>
+        <p:style>
+          <a:lnRef idx="2">
+            <a:schemeClr val="accent1">
+              <a:shade val="15000"/>
+            </a:schemeClr>
+          </a:lnRef>
+          <a:fillRef idx="1">
+            <a:schemeClr val="accent1"/>
+          </a:fillRef>
+          <a:effectRef idx="0">
+            <a:schemeClr val="accent1"/>
+          </a:effectRef>
+          <a:fontRef idx="minor">
+            <a:schemeClr val="lt1"/>
+          </a:fontRef>
+        </p:style>
+        <p:txBody>
+          <a:bodyPr rtlCol="0" anchor="ctr"/>
+          <a:lstStyle/>
+          <a:p>
+            <a:pPr algn="ctr"/>
+            <a:endParaRPr lang="en-CA"/>
+          </a:p>
+        </p:txBody>
+      </p:sp>
+      <p:sp>
+        <p:nvSpPr>
+          <p:cNvPr id="77" name="Oval 76">
+            <a:extLst>
+              <a:ext uri="{FF2B5EF4-FFF2-40B4-BE49-F238E27FC236}">
+                <a16:creationId xmlns:a16="http://schemas.microsoft.com/office/drawing/2014/main" id="{3B6B83A4-49C8-CB17-3275-3CC40D3D1724}"/>
+              </a:ext>
+            </a:extLst>
+          </p:cNvPr>
+          <p:cNvSpPr/>
+          <p:nvPr/>
+        </p:nvSpPr>
+        <p:spPr>
+          <a:xfrm>
+            <a:off x="8885282" y="3716977"/>
+            <a:ext cx="350797" cy="350797"/>
+          </a:xfrm>
+          <a:prstGeom prst="ellipse">
+            <a:avLst/>
+          </a:prstGeom>
+          <a:solidFill>
+            <a:srgbClr val="92D050"/>
+          </a:solidFill>
+        </p:spPr>
+        <p:style>
+          <a:lnRef idx="2">
+            <a:schemeClr val="accent1">
+              <a:shade val="15000"/>
+            </a:schemeClr>
+          </a:lnRef>
+          <a:fillRef idx="1">
+            <a:schemeClr val="accent1"/>
+          </a:fillRef>
+          <a:effectRef idx="0">
+            <a:schemeClr val="accent1"/>
+          </a:effectRef>
+          <a:fontRef idx="minor">
+            <a:schemeClr val="lt1"/>
+          </a:fontRef>
+        </p:style>
+        <p:txBody>
+          <a:bodyPr rtlCol="0" anchor="ctr"/>
+          <a:lstStyle/>
+          <a:p>
+            <a:pPr algn="ctr"/>
+            <a:endParaRPr lang="en-CA"/>
+          </a:p>
+        </p:txBody>
+      </p:sp>
+      <p:sp>
+        <p:nvSpPr>
+          <p:cNvPr id="80" name="Oval 79">
+            <a:extLst>
+              <a:ext uri="{FF2B5EF4-FFF2-40B4-BE49-F238E27FC236}">
+                <a16:creationId xmlns:a16="http://schemas.microsoft.com/office/drawing/2014/main" id="{B4176DFD-5BDC-C273-0094-261B7B94E49F}"/>
+              </a:ext>
+            </a:extLst>
+          </p:cNvPr>
+          <p:cNvSpPr/>
+          <p:nvPr/>
+        </p:nvSpPr>
+        <p:spPr>
+          <a:xfrm>
+            <a:off x="5768640" y="3210557"/>
+            <a:ext cx="350797" cy="350797"/>
+          </a:xfrm>
+          <a:prstGeom prst="ellipse">
+            <a:avLst/>
+          </a:prstGeom>
+          <a:solidFill>
+            <a:schemeClr val="accent4">
+              <a:lumMod val="60000"/>
+              <a:lumOff val="40000"/>
+              <a:alpha val="50000"/>
+            </a:schemeClr>
+          </a:solidFill>
+        </p:spPr>
+        <p:style>
+          <a:lnRef idx="2">
+            <a:schemeClr val="accent1">
+              <a:shade val="15000"/>
+            </a:schemeClr>
+          </a:lnRef>
+          <a:fillRef idx="1">
+            <a:schemeClr val="accent1"/>
+          </a:fillRef>
+          <a:effectRef idx="0">
+            <a:schemeClr val="accent1"/>
+          </a:effectRef>
+          <a:fontRef idx="minor">
+            <a:schemeClr val="lt1"/>
+          </a:fontRef>
+        </p:style>
+        <p:txBody>
+          <a:bodyPr rtlCol="0" anchor="ctr"/>
+          <a:lstStyle/>
+          <a:p>
+            <a:pPr algn="ctr"/>
+            <a:endParaRPr lang="en-CA"/>
+          </a:p>
+        </p:txBody>
+      </p:sp>
+      <p:sp>
+        <p:nvSpPr>
+          <p:cNvPr id="81" name="Oval 80">
+            <a:extLst>
+              <a:ext uri="{FF2B5EF4-FFF2-40B4-BE49-F238E27FC236}">
+                <a16:creationId xmlns:a16="http://schemas.microsoft.com/office/drawing/2014/main" id="{31089ED5-729F-4C7F-ABC6-DC45617EABD6}"/>
+              </a:ext>
+            </a:extLst>
+          </p:cNvPr>
+          <p:cNvSpPr/>
+          <p:nvPr/>
+        </p:nvSpPr>
+        <p:spPr>
+          <a:xfrm>
+            <a:off x="5631424" y="3217722"/>
+            <a:ext cx="350797" cy="350797"/>
+          </a:xfrm>
+          <a:prstGeom prst="ellipse">
+            <a:avLst/>
+          </a:prstGeom>
+          <a:solidFill>
+            <a:schemeClr val="accent4">
+              <a:lumMod val="60000"/>
+              <a:lumOff val="40000"/>
+              <a:alpha val="50000"/>
+            </a:schemeClr>
+          </a:solidFill>
+        </p:spPr>
+        <p:style>
+          <a:lnRef idx="2">
+            <a:schemeClr val="accent1">
+              <a:shade val="15000"/>
+            </a:schemeClr>
+          </a:lnRef>
+          <a:fillRef idx="1">
+            <a:schemeClr val="accent1"/>
+          </a:fillRef>
+          <a:effectRef idx="0">
+            <a:schemeClr val="accent1"/>
+          </a:effectRef>
+          <a:fontRef idx="minor">
+            <a:schemeClr val="lt1"/>
+          </a:fontRef>
+        </p:style>
+        <p:txBody>
+          <a:bodyPr rtlCol="0" anchor="ctr"/>
+          <a:lstStyle/>
+          <a:p>
+            <a:pPr algn="ctr"/>
+            <a:endParaRPr lang="en-CA"/>
+          </a:p>
+        </p:txBody>
+      </p:sp>
+      <p:sp>
+        <p:nvSpPr>
+          <p:cNvPr id="83" name="Oval 82">
+            <a:extLst>
+              <a:ext uri="{FF2B5EF4-FFF2-40B4-BE49-F238E27FC236}">
+                <a16:creationId xmlns:a16="http://schemas.microsoft.com/office/drawing/2014/main" id="{17490A86-1BFC-B818-4FCD-7D73464D9295}"/>
+              </a:ext>
+            </a:extLst>
+          </p:cNvPr>
+          <p:cNvSpPr/>
+          <p:nvPr/>
+        </p:nvSpPr>
+        <p:spPr>
+          <a:xfrm>
+            <a:off x="9310139" y="3259505"/>
+            <a:ext cx="350797" cy="350797"/>
+          </a:xfrm>
+          <a:prstGeom prst="ellipse">
+            <a:avLst/>
+          </a:prstGeom>
+          <a:solidFill>
+            <a:schemeClr val="accent4">
+              <a:lumMod val="40000"/>
+              <a:lumOff val="60000"/>
+            </a:schemeClr>
+          </a:solidFill>
+        </p:spPr>
+        <p:style>
+          <a:lnRef idx="2">
+            <a:schemeClr val="accent1">
+              <a:shade val="15000"/>
+            </a:schemeClr>
+          </a:lnRef>
+          <a:fillRef idx="1">
+            <a:schemeClr val="accent1"/>
+          </a:fillRef>
+          <a:effectRef idx="0">
+            <a:schemeClr val="accent1"/>
+          </a:effectRef>
+          <a:fontRef idx="minor">
+            <a:schemeClr val="lt1"/>
+          </a:fontRef>
+        </p:style>
+        <p:txBody>
+          <a:bodyPr rtlCol="0" anchor="ctr"/>
+          <a:lstStyle/>
+          <a:p>
+            <a:pPr algn="ctr"/>
+            <a:endParaRPr lang="en-CA"/>
+          </a:p>
+        </p:txBody>
+      </p:sp>
+      <p:sp>
+        <p:nvSpPr>
+          <p:cNvPr id="84" name="Oval 83">
+            <a:extLst>
+              <a:ext uri="{FF2B5EF4-FFF2-40B4-BE49-F238E27FC236}">
+                <a16:creationId xmlns:a16="http://schemas.microsoft.com/office/drawing/2014/main" id="{30145217-5E60-B591-1811-DF4129973DA1}"/>
+              </a:ext>
+            </a:extLst>
+          </p:cNvPr>
+          <p:cNvSpPr/>
+          <p:nvPr/>
+        </p:nvSpPr>
+        <p:spPr>
+          <a:xfrm>
+            <a:off x="9540350" y="3250550"/>
+            <a:ext cx="350797" cy="350797"/>
+          </a:xfrm>
+          <a:prstGeom prst="ellipse">
+            <a:avLst/>
+          </a:prstGeom>
+          <a:solidFill>
+            <a:schemeClr val="accent4">
+              <a:lumMod val="40000"/>
+              <a:lumOff val="60000"/>
+            </a:schemeClr>
+          </a:solidFill>
+        </p:spPr>
+        <p:style>
+          <a:lnRef idx="2">
+            <a:schemeClr val="accent1">
+              <a:shade val="15000"/>
+            </a:schemeClr>
+          </a:lnRef>
+          <a:fillRef idx="1">
+            <a:schemeClr val="accent1"/>
+          </a:fillRef>
+          <a:effectRef idx="0">
+            <a:schemeClr val="accent1"/>
+          </a:effectRef>
+          <a:fontRef idx="minor">
+            <a:schemeClr val="lt1"/>
+          </a:fontRef>
+        </p:style>
+        <p:txBody>
+          <a:bodyPr rtlCol="0" anchor="ctr"/>
+          <a:lstStyle/>
+          <a:p>
+            <a:pPr algn="ctr"/>
+            <a:endParaRPr lang="en-CA"/>
+          </a:p>
+        </p:txBody>
+      </p:sp>
+      <p:sp>
+        <p:nvSpPr>
+          <p:cNvPr id="64" name="Oval 63">
+            <a:extLst>
+              <a:ext uri="{FF2B5EF4-FFF2-40B4-BE49-F238E27FC236}">
+                <a16:creationId xmlns:a16="http://schemas.microsoft.com/office/drawing/2014/main" id="{4373DEC7-662F-A21D-0B7C-865151BBD5A6}"/>
+              </a:ext>
+            </a:extLst>
+          </p:cNvPr>
+          <p:cNvSpPr/>
+          <p:nvPr/>
+        </p:nvSpPr>
+        <p:spPr>
+          <a:xfrm>
+            <a:off x="9743847" y="3241595"/>
+            <a:ext cx="350797" cy="350797"/>
+          </a:xfrm>
+          <a:prstGeom prst="ellipse">
+            <a:avLst/>
+          </a:prstGeom>
+          <a:solidFill>
+            <a:schemeClr val="accent1">
+              <a:lumMod val="60000"/>
+              <a:lumOff val="40000"/>
+            </a:schemeClr>
+          </a:solidFill>
+        </p:spPr>
+        <p:style>
+          <a:lnRef idx="2">
+            <a:schemeClr val="accent1">
+              <a:shade val="15000"/>
+            </a:schemeClr>
+          </a:lnRef>
+          <a:fillRef idx="1">
+            <a:schemeClr val="accent1"/>
+          </a:fillRef>
+          <a:effectRef idx="0">
+            <a:schemeClr val="accent1"/>
+          </a:effectRef>
+          <a:fontRef idx="minor">
+            <a:schemeClr val="lt1"/>
+          </a:fontRef>
+        </p:style>
+        <p:txBody>
+          <a:bodyPr rtlCol="0" anchor="ctr"/>
+          <a:lstStyle/>
+          <a:p>
+            <a:pPr algn="ctr"/>
+            <a:endParaRPr lang="en-CA"/>
+          </a:p>
+        </p:txBody>
+      </p:sp>
+      <p:sp>
+        <p:nvSpPr>
+          <p:cNvPr id="100" name="TextBox 99">
+            <a:extLst>
+              <a:ext uri="{FF2B5EF4-FFF2-40B4-BE49-F238E27FC236}">
+                <a16:creationId xmlns:a16="http://schemas.microsoft.com/office/drawing/2014/main" id="{A8AE2161-5D45-3218-CE95-260C443B8A74}"/>
+              </a:ext>
+            </a:extLst>
+          </p:cNvPr>
+          <p:cNvSpPr txBox="1"/>
+          <p:nvPr/>
+        </p:nvSpPr>
+        <p:spPr>
+          <a:xfrm>
+            <a:off x="5299843" y="4758426"/>
+            <a:ext cx="3881203" cy="1015663"/>
+          </a:xfrm>
+          <a:prstGeom prst="rect">
+            <a:avLst/>
+          </a:prstGeom>
+          <a:solidFill>
+            <a:schemeClr val="bg1"/>
+          </a:solidFill>
+          <a:ln>
+            <a:solidFill>
+              <a:schemeClr val="accent1">
+                <a:shade val="15000"/>
+              </a:schemeClr>
+            </a:solidFill>
+          </a:ln>
+        </p:spPr>
+        <p:txBody>
+          <a:bodyPr wrap="square" rtlCol="0">
+            <a:spAutoFit/>
+          </a:bodyPr>
+          <a:lstStyle/>
+          <a:p>
+            <a:pPr algn="ctr"/>
+            <a:r>
+              <a:rPr lang="en-CA" dirty="0"/>
+              <a:t>Source For Hub 2 Actions</a:t>
+            </a:r>
+          </a:p>
+          <a:p>
+            <a:r>
+              <a:rPr lang="en-CA" sz="1400" dirty="0"/>
+              <a:t>FORMS_FORM_CHANGE</a:t>
+            </a:r>
+          </a:p>
+          <a:p>
+            <a:r>
+              <a:rPr lang="en-CA" sz="1400" dirty="0"/>
+              <a:t>FORMS_ASYNC_VALIDATE_CONTROL</a:t>
+            </a:r>
+          </a:p>
+          <a:p>
+            <a:r>
+              <a:rPr lang="en-CA" sz="1400" dirty="0"/>
+              <a:t>FORMS_ASYNC_VALIDATE_SUCCESS_RESPONSE</a:t>
+            </a:r>
+          </a:p>
+        </p:txBody>
+      </p:sp>
+      <p:sp>
+        <p:nvSpPr>
+          <p:cNvPr id="101" name="Oval 100">
+            <a:extLst>
+              <a:ext uri="{FF2B5EF4-FFF2-40B4-BE49-F238E27FC236}">
+                <a16:creationId xmlns:a16="http://schemas.microsoft.com/office/drawing/2014/main" id="{72684D0B-F2B2-EBDD-1D6C-9FA485818925}"/>
+              </a:ext>
+            </a:extLst>
+          </p:cNvPr>
+          <p:cNvSpPr/>
+          <p:nvPr/>
+        </p:nvSpPr>
+        <p:spPr>
+          <a:xfrm>
+            <a:off x="2834870" y="5201106"/>
+            <a:ext cx="179850" cy="177553"/>
+          </a:xfrm>
+          <a:prstGeom prst="ellipse">
+            <a:avLst/>
+          </a:prstGeom>
+          <a:solidFill>
+            <a:schemeClr val="bg2"/>
+          </a:solidFill>
+        </p:spPr>
+        <p:style>
+          <a:lnRef idx="2">
+            <a:schemeClr val="accent1">
+              <a:shade val="15000"/>
+            </a:schemeClr>
+          </a:lnRef>
+          <a:fillRef idx="1">
+            <a:schemeClr val="accent1"/>
+          </a:fillRef>
+          <a:effectRef idx="0">
+            <a:schemeClr val="accent1"/>
+          </a:effectRef>
+          <a:fontRef idx="minor">
+            <a:schemeClr val="lt1"/>
+          </a:fontRef>
+        </p:style>
+        <p:txBody>
+          <a:bodyPr rtlCol="0" anchor="ctr"/>
+          <a:lstStyle/>
+          <a:p>
+            <a:pPr algn="ctr"/>
+            <a:endParaRPr lang="en-CA"/>
+          </a:p>
+        </p:txBody>
+      </p:sp>
+      <p:sp>
+        <p:nvSpPr>
+          <p:cNvPr id="102" name="Oval 101">
+            <a:extLst>
+              <a:ext uri="{FF2B5EF4-FFF2-40B4-BE49-F238E27FC236}">
+                <a16:creationId xmlns:a16="http://schemas.microsoft.com/office/drawing/2014/main" id="{81D6EC26-8AB9-7F3A-2935-C3BCF43BB796}"/>
+              </a:ext>
+            </a:extLst>
+          </p:cNvPr>
+          <p:cNvSpPr/>
+          <p:nvPr/>
+        </p:nvSpPr>
+        <p:spPr>
+          <a:xfrm flipH="1" flipV="1">
+            <a:off x="2840812" y="4958748"/>
+            <a:ext cx="173908" cy="173908"/>
+          </a:xfrm>
+          <a:prstGeom prst="ellipse">
+            <a:avLst/>
+          </a:prstGeom>
+          <a:solidFill>
+            <a:schemeClr val="accent6">
+              <a:lumMod val="40000"/>
+              <a:lumOff val="60000"/>
+            </a:schemeClr>
+          </a:solidFill>
+        </p:spPr>
+        <p:style>
+          <a:lnRef idx="2">
+            <a:schemeClr val="accent1">
+              <a:shade val="15000"/>
+            </a:schemeClr>
+          </a:lnRef>
+          <a:fillRef idx="1">
+            <a:schemeClr val="accent1"/>
+          </a:fillRef>
+          <a:effectRef idx="0">
+            <a:schemeClr val="accent1"/>
+          </a:effectRef>
+          <a:fontRef idx="minor">
+            <a:schemeClr val="lt1"/>
+          </a:fontRef>
+        </p:style>
+        <p:txBody>
+          <a:bodyPr rtlCol="0" anchor="ctr"/>
+          <a:lstStyle/>
+          <a:p>
+            <a:pPr algn="ctr"/>
+            <a:endParaRPr lang="en-CA"/>
+          </a:p>
+        </p:txBody>
+      </p:sp>
+      <p:sp>
+        <p:nvSpPr>
+          <p:cNvPr id="103" name="Oval 102">
+            <a:extLst>
+              <a:ext uri="{FF2B5EF4-FFF2-40B4-BE49-F238E27FC236}">
+                <a16:creationId xmlns:a16="http://schemas.microsoft.com/office/drawing/2014/main" id="{D2983791-687E-10D4-C378-F850E7694B18}"/>
+              </a:ext>
+            </a:extLst>
+          </p:cNvPr>
+          <p:cNvSpPr/>
+          <p:nvPr/>
+        </p:nvSpPr>
+        <p:spPr>
+          <a:xfrm>
+            <a:off x="8896154" y="5518542"/>
+            <a:ext cx="169549" cy="169549"/>
+          </a:xfrm>
+          <a:prstGeom prst="ellipse">
+            <a:avLst/>
+          </a:prstGeom>
+          <a:solidFill>
+            <a:srgbClr val="92D050"/>
+          </a:solidFill>
+        </p:spPr>
+        <p:style>
+          <a:lnRef idx="2">
+            <a:schemeClr val="accent1">
+              <a:shade val="15000"/>
+            </a:schemeClr>
+          </a:lnRef>
+          <a:fillRef idx="1">
+            <a:schemeClr val="accent1"/>
+          </a:fillRef>
+          <a:effectRef idx="0">
+            <a:schemeClr val="accent1"/>
+          </a:effectRef>
+          <a:fontRef idx="minor">
+            <a:schemeClr val="lt1"/>
+          </a:fontRef>
+        </p:style>
+        <p:txBody>
+          <a:bodyPr rtlCol="0" anchor="ctr"/>
+          <a:lstStyle/>
+          <a:p>
+            <a:pPr algn="ctr"/>
+            <a:endParaRPr lang="en-CA"/>
+          </a:p>
+        </p:txBody>
+      </p:sp>
+      <p:sp>
+        <p:nvSpPr>
+          <p:cNvPr id="104" name="Oval 103">
+            <a:extLst>
+              <a:ext uri="{FF2B5EF4-FFF2-40B4-BE49-F238E27FC236}">
+                <a16:creationId xmlns:a16="http://schemas.microsoft.com/office/drawing/2014/main" id="{556E9C82-0F88-6C68-9FBB-3B7E402D41A0}"/>
+              </a:ext>
+            </a:extLst>
+          </p:cNvPr>
+          <p:cNvSpPr/>
+          <p:nvPr/>
+        </p:nvSpPr>
+        <p:spPr>
+          <a:xfrm>
+            <a:off x="8889204" y="5287864"/>
+            <a:ext cx="169549" cy="169549"/>
+          </a:xfrm>
+          <a:prstGeom prst="ellipse">
+            <a:avLst/>
+          </a:prstGeom>
+          <a:solidFill>
+            <a:schemeClr val="accent4">
+              <a:lumMod val="40000"/>
+              <a:lumOff val="60000"/>
+            </a:schemeClr>
+          </a:solidFill>
+        </p:spPr>
+        <p:style>
+          <a:lnRef idx="2">
+            <a:schemeClr val="accent1">
+              <a:shade val="15000"/>
+            </a:schemeClr>
+          </a:lnRef>
+          <a:fillRef idx="1">
+            <a:schemeClr val="accent1"/>
+          </a:fillRef>
+          <a:effectRef idx="0">
+            <a:schemeClr val="accent1"/>
+          </a:effectRef>
+          <a:fontRef idx="minor">
+            <a:schemeClr val="lt1"/>
+          </a:fontRef>
+        </p:style>
+        <p:txBody>
+          <a:bodyPr rtlCol="0" anchor="ctr"/>
+          <a:lstStyle/>
+          <a:p>
+            <a:pPr algn="ctr"/>
+            <a:endParaRPr lang="en-CA"/>
+          </a:p>
+        </p:txBody>
+      </p:sp>
+      <p:sp>
+        <p:nvSpPr>
+          <p:cNvPr id="105" name="Oval 104">
+            <a:extLst>
+              <a:ext uri="{FF2B5EF4-FFF2-40B4-BE49-F238E27FC236}">
+                <a16:creationId xmlns:a16="http://schemas.microsoft.com/office/drawing/2014/main" id="{5BA2E242-00C5-D801-8A26-6DEF84C7509B}"/>
+              </a:ext>
+            </a:extLst>
+          </p:cNvPr>
+          <p:cNvSpPr/>
+          <p:nvPr/>
+        </p:nvSpPr>
+        <p:spPr>
+          <a:xfrm>
+            <a:off x="8894106" y="5065797"/>
+            <a:ext cx="171597" cy="171597"/>
+          </a:xfrm>
+          <a:prstGeom prst="ellipse">
+            <a:avLst/>
+          </a:prstGeom>
+          <a:solidFill>
+            <a:schemeClr val="accent1">
+              <a:lumMod val="60000"/>
+              <a:lumOff val="40000"/>
+            </a:schemeClr>
+          </a:solidFill>
+        </p:spPr>
+        <p:style>
+          <a:lnRef idx="2">
+            <a:schemeClr val="accent1">
+              <a:shade val="15000"/>
+            </a:schemeClr>
+          </a:lnRef>
+          <a:fillRef idx="1">
+            <a:schemeClr val="accent1"/>
+          </a:fillRef>
+          <a:effectRef idx="0">
+            <a:schemeClr val="accent1"/>
+          </a:effectRef>
+          <a:fontRef idx="minor">
+            <a:schemeClr val="lt1"/>
+          </a:fontRef>
+        </p:style>
+        <p:txBody>
+          <a:bodyPr rtlCol="0" anchor="ctr"/>
+          <a:lstStyle/>
+          <a:p>
+            <a:pPr algn="ctr"/>
+            <a:endParaRPr lang="en-CA"/>
+          </a:p>
+        </p:txBody>
+      </p:sp>
+      <p:sp>
+        <p:nvSpPr>
+          <p:cNvPr id="107" name="TextBox 106">
+            <a:extLst>
+              <a:ext uri="{FF2B5EF4-FFF2-40B4-BE49-F238E27FC236}">
+                <a16:creationId xmlns:a16="http://schemas.microsoft.com/office/drawing/2014/main" id="{CDB304A9-0ECB-5393-7F16-F3B9E68DF367}"/>
+              </a:ext>
+            </a:extLst>
+          </p:cNvPr>
+          <p:cNvSpPr txBox="1"/>
+          <p:nvPr/>
+        </p:nvSpPr>
+        <p:spPr>
+          <a:xfrm>
+            <a:off x="9991797" y="832242"/>
+            <a:ext cx="1297256" cy="400110"/>
+          </a:xfrm>
+          <a:prstGeom prst="rect">
+            <a:avLst/>
+          </a:prstGeom>
+          <a:noFill/>
+        </p:spPr>
+        <p:txBody>
+          <a:bodyPr wrap="square" rtlCol="0">
+            <a:spAutoFit/>
+          </a:bodyPr>
+          <a:lstStyle/>
+          <a:p>
+            <a:pPr algn="ctr"/>
+            <a:r>
+              <a:rPr lang="en-CA" sz="2000" dirty="0"/>
+              <a:t>View</a:t>
+            </a:r>
+          </a:p>
+        </p:txBody>
+      </p:sp>
+      <p:sp>
+        <p:nvSpPr>
+          <p:cNvPr id="109" name="Rectangle: Rounded Corners 108">
+            <a:extLst>
+              <a:ext uri="{FF2B5EF4-FFF2-40B4-BE49-F238E27FC236}">
+                <a16:creationId xmlns:a16="http://schemas.microsoft.com/office/drawing/2014/main" id="{A13AA74E-1F9D-FA33-8D2B-D7796AB14A28}"/>
+              </a:ext>
+            </a:extLst>
+          </p:cNvPr>
+          <p:cNvSpPr/>
+          <p:nvPr/>
+        </p:nvSpPr>
+        <p:spPr>
+          <a:xfrm>
+            <a:off x="9991797" y="1540324"/>
+            <a:ext cx="1329625" cy="280894"/>
+          </a:xfrm>
+          <a:prstGeom prst="roundRect">
+            <a:avLst/>
+          </a:prstGeom>
+          <a:noFill/>
+        </p:spPr>
+        <p:style>
+          <a:lnRef idx="2">
+            <a:schemeClr val="accent1">
+              <a:shade val="15000"/>
+            </a:schemeClr>
+          </a:lnRef>
+          <a:fillRef idx="1">
+            <a:schemeClr val="accent1"/>
+          </a:fillRef>
+          <a:effectRef idx="0">
+            <a:schemeClr val="accent1"/>
+          </a:effectRef>
+          <a:fontRef idx="minor">
+            <a:schemeClr val="lt1"/>
+          </a:fontRef>
+        </p:style>
+        <p:txBody>
+          <a:bodyPr rtlCol="0" anchor="ctr"/>
+          <a:lstStyle/>
+          <a:p>
+            <a:r>
+              <a:rPr lang="en-CA" sz="1400" dirty="0">
+                <a:solidFill>
+                  <a:schemeClr val="tx1"/>
+                </a:solidFill>
+              </a:rPr>
+              <a:t>User Input</a:t>
+            </a:r>
+          </a:p>
+        </p:txBody>
+      </p:sp>
+      <p:sp>
+        <p:nvSpPr>
+          <p:cNvPr id="110" name="Arc 109">
+            <a:extLst>
+              <a:ext uri="{FF2B5EF4-FFF2-40B4-BE49-F238E27FC236}">
+                <a16:creationId xmlns:a16="http://schemas.microsoft.com/office/drawing/2014/main" id="{DBED7460-5777-4FBF-195C-BC0A319CAAD8}"/>
+              </a:ext>
+            </a:extLst>
+          </p:cNvPr>
+          <p:cNvSpPr/>
+          <p:nvPr/>
+        </p:nvSpPr>
+        <p:spPr>
+          <a:xfrm flipV="1">
+            <a:off x="291740" y="1660571"/>
+            <a:ext cx="16634820" cy="3420288"/>
+          </a:xfrm>
+          <a:prstGeom prst="arc">
+            <a:avLst>
+              <a:gd name="adj1" fmla="val 3102540"/>
+              <a:gd name="adj2" fmla="val 10800727"/>
+            </a:avLst>
+          </a:prstGeom>
+          <a:ln w="34925">
+            <a:solidFill>
+              <a:schemeClr val="accent1"/>
+            </a:solidFill>
+            <a:tailEnd type="arrow"/>
+          </a:ln>
+        </p:spPr>
+        <p:style>
+          <a:lnRef idx="1">
+            <a:schemeClr val="accent1"/>
+          </a:lnRef>
+          <a:fillRef idx="0">
+            <a:schemeClr val="accent1"/>
+          </a:fillRef>
+          <a:effectRef idx="0">
+            <a:schemeClr val="accent1"/>
+          </a:effectRef>
+          <a:fontRef idx="minor">
+            <a:schemeClr val="tx1"/>
+          </a:fontRef>
+        </p:style>
+        <p:txBody>
+          <a:bodyPr rtlCol="0" anchor="ctr"/>
+          <a:lstStyle/>
+          <a:p>
+            <a:pPr algn="ctr"/>
+            <a:endParaRPr lang="en-CA"/>
+          </a:p>
+        </p:txBody>
+      </p:sp>
+    </p:spTree>
+    <p:extLst>
+      <p:ext uri="{BB962C8B-B14F-4D97-AF65-F5344CB8AC3E}">
+        <p14:creationId xmlns:p14="http://schemas.microsoft.com/office/powerpoint/2010/main" val="1465928425"/>
       </p:ext>
     </p:extLst>
   </p:cSld>

</xml_diff>

<commit_message>
[11] Update core docs and add examples
</commit_message>
<xml_diff>
--- a/documentation/Hubfx Presentation.pptx
+++ b/documentation/Hubfx Presentation.pptx
@@ -15,6 +15,9 @@
     <p:sldId id="263" r:id="rId9"/>
     <p:sldId id="264" r:id="rId10"/>
     <p:sldId id="265" r:id="rId11"/>
+    <p:sldId id="266" r:id="rId12"/>
+    <p:sldId id="267" r:id="rId13"/>
+    <p:sldId id="268" r:id="rId14"/>
   </p:sldIdLst>
   <p:sldSz cx="12192000" cy="6858000"/>
   <p:notesSz cx="6858000" cy="9144000"/>
@@ -1796,7 +1799,7 @@
           <a:p>
             <a:fld id="{154F4BC5-C275-4A59-82DC-6AFC02DFC54D}" type="datetimeFigureOut">
               <a:rPr lang="en-CA" smtClean="0"/>
-              <a:t>2023-10-01</a:t>
+              <a:t>2023-10-10</a:t>
             </a:fld>
             <a:endParaRPr lang="en-CA"/>
           </a:p>
@@ -1996,7 +1999,7 @@
           <a:p>
             <a:fld id="{154F4BC5-C275-4A59-82DC-6AFC02DFC54D}" type="datetimeFigureOut">
               <a:rPr lang="en-CA" smtClean="0"/>
-              <a:t>2023-10-01</a:t>
+              <a:t>2023-10-10</a:t>
             </a:fld>
             <a:endParaRPr lang="en-CA"/>
           </a:p>
@@ -2206,7 +2209,7 @@
           <a:p>
             <a:fld id="{154F4BC5-C275-4A59-82DC-6AFC02DFC54D}" type="datetimeFigureOut">
               <a:rPr lang="en-CA" smtClean="0"/>
-              <a:t>2023-10-01</a:t>
+              <a:t>2023-10-10</a:t>
             </a:fld>
             <a:endParaRPr lang="en-CA"/>
           </a:p>
@@ -2406,7 +2409,7 @@
           <a:p>
             <a:fld id="{154F4BC5-C275-4A59-82DC-6AFC02DFC54D}" type="datetimeFigureOut">
               <a:rPr lang="en-CA" smtClean="0"/>
-              <a:t>2023-10-01</a:t>
+              <a:t>2023-10-10</a:t>
             </a:fld>
             <a:endParaRPr lang="en-CA"/>
           </a:p>
@@ -2682,7 +2685,7 @@
           <a:p>
             <a:fld id="{154F4BC5-C275-4A59-82DC-6AFC02DFC54D}" type="datetimeFigureOut">
               <a:rPr lang="en-CA" smtClean="0"/>
-              <a:t>2023-10-01</a:t>
+              <a:t>2023-10-10</a:t>
             </a:fld>
             <a:endParaRPr lang="en-CA"/>
           </a:p>
@@ -2950,7 +2953,7 @@
           <a:p>
             <a:fld id="{154F4BC5-C275-4A59-82DC-6AFC02DFC54D}" type="datetimeFigureOut">
               <a:rPr lang="en-CA" smtClean="0"/>
-              <a:t>2023-10-01</a:t>
+              <a:t>2023-10-10</a:t>
             </a:fld>
             <a:endParaRPr lang="en-CA"/>
           </a:p>
@@ -3365,7 +3368,7 @@
           <a:p>
             <a:fld id="{154F4BC5-C275-4A59-82DC-6AFC02DFC54D}" type="datetimeFigureOut">
               <a:rPr lang="en-CA" smtClean="0"/>
-              <a:t>2023-10-01</a:t>
+              <a:t>2023-10-10</a:t>
             </a:fld>
             <a:endParaRPr lang="en-CA"/>
           </a:p>
@@ -3507,7 +3510,7 @@
           <a:p>
             <a:fld id="{154F4BC5-C275-4A59-82DC-6AFC02DFC54D}" type="datetimeFigureOut">
               <a:rPr lang="en-CA" smtClean="0"/>
-              <a:t>2023-10-01</a:t>
+              <a:t>2023-10-10</a:t>
             </a:fld>
             <a:endParaRPr lang="en-CA"/>
           </a:p>
@@ -3620,7 +3623,7 @@
           <a:p>
             <a:fld id="{154F4BC5-C275-4A59-82DC-6AFC02DFC54D}" type="datetimeFigureOut">
               <a:rPr lang="en-CA" smtClean="0"/>
-              <a:t>2023-10-01</a:t>
+              <a:t>2023-10-10</a:t>
             </a:fld>
             <a:endParaRPr lang="en-CA"/>
           </a:p>
@@ -3933,7 +3936,7 @@
           <a:p>
             <a:fld id="{154F4BC5-C275-4A59-82DC-6AFC02DFC54D}" type="datetimeFigureOut">
               <a:rPr lang="en-CA" smtClean="0"/>
-              <a:t>2023-10-01</a:t>
+              <a:t>2023-10-10</a:t>
             </a:fld>
             <a:endParaRPr lang="en-CA"/>
           </a:p>
@@ -4222,7 +4225,7 @@
           <a:p>
             <a:fld id="{154F4BC5-C275-4A59-82DC-6AFC02DFC54D}" type="datetimeFigureOut">
               <a:rPr lang="en-CA" smtClean="0"/>
-              <a:t>2023-10-01</a:t>
+              <a:t>2023-10-10</a:t>
             </a:fld>
             <a:endParaRPr lang="en-CA"/>
           </a:p>
@@ -4465,7 +4468,7 @@
           <a:p>
             <a:fld id="{154F4BC5-C275-4A59-82DC-6AFC02DFC54D}" type="datetimeFigureOut">
               <a:rPr lang="en-CA" smtClean="0"/>
-              <a:t>2023-10-01</a:t>
+              <a:t>2023-10-10</a:t>
             </a:fld>
             <a:endParaRPr lang="en-CA"/>
           </a:p>
@@ -7370,6 +7373,3349 @@
     <p:extLst>
       <p:ext uri="{BB962C8B-B14F-4D97-AF65-F5344CB8AC3E}">
         <p14:creationId xmlns:p14="http://schemas.microsoft.com/office/powerpoint/2010/main" val="1465928425"/>
+      </p:ext>
+    </p:extLst>
+  </p:cSld>
+  <p:clrMapOvr>
+    <a:masterClrMapping/>
+  </p:clrMapOvr>
+</p:sld>
+</file>
+
+<file path=ppt/slides/slide11.xml><?xml version="1.0" encoding="utf-8"?>
+<p:sld xmlns:a="http://schemas.openxmlformats.org/drawingml/2006/main" xmlns:r="http://schemas.openxmlformats.org/officeDocument/2006/relationships" xmlns:p="http://schemas.openxmlformats.org/presentationml/2006/main">
+  <p:cSld>
+    <p:spTree>
+      <p:nvGrpSpPr>
+        <p:cNvPr id="1" name=""/>
+        <p:cNvGrpSpPr/>
+        <p:nvPr/>
+      </p:nvGrpSpPr>
+      <p:grpSpPr>
+        <a:xfrm>
+          <a:off x="0" y="0"/>
+          <a:ext cx="0" cy="0"/>
+          <a:chOff x="0" y="0"/>
+          <a:chExt cx="0" cy="0"/>
+        </a:xfrm>
+      </p:grpSpPr>
+      <p:cxnSp>
+        <p:nvCxnSpPr>
+          <p:cNvPr id="5" name="Straight Arrow Connector 4">
+            <a:extLst>
+              <a:ext uri="{FF2B5EF4-FFF2-40B4-BE49-F238E27FC236}">
+                <a16:creationId xmlns:a16="http://schemas.microsoft.com/office/drawing/2014/main" id="{4D57241C-FD8F-6E69-D1C7-1CEC88535E98}"/>
+              </a:ext>
+            </a:extLst>
+          </p:cNvPr>
+          <p:cNvCxnSpPr>
+            <a:cxnSpLocks/>
+            <a:endCxn id="7" idx="1"/>
+          </p:cNvCxnSpPr>
+          <p:nvPr/>
+        </p:nvCxnSpPr>
+        <p:spPr>
+          <a:xfrm flipV="1">
+            <a:off x="386080" y="3734552"/>
+            <a:ext cx="8737604" cy="80295"/>
+          </a:xfrm>
+          <a:prstGeom prst="straightConnector1">
+            <a:avLst/>
+          </a:prstGeom>
+          <a:ln w="57150">
+            <a:tailEnd type="arrow"/>
+          </a:ln>
+        </p:spPr>
+        <p:style>
+          <a:lnRef idx="1">
+            <a:schemeClr val="accent1"/>
+          </a:lnRef>
+          <a:fillRef idx="0">
+            <a:schemeClr val="accent1"/>
+          </a:fillRef>
+          <a:effectRef idx="0">
+            <a:schemeClr val="accent1"/>
+          </a:effectRef>
+          <a:fontRef idx="minor">
+            <a:schemeClr val="tx1"/>
+          </a:fontRef>
+        </p:style>
+      </p:cxnSp>
+      <p:sp>
+        <p:nvSpPr>
+          <p:cNvPr id="7" name="Rectangle: Rounded Corners 6">
+            <a:extLst>
+              <a:ext uri="{FF2B5EF4-FFF2-40B4-BE49-F238E27FC236}">
+                <a16:creationId xmlns:a16="http://schemas.microsoft.com/office/drawing/2014/main" id="{5212D68A-7D3D-67A8-D6E8-310B59CC5D21}"/>
+              </a:ext>
+            </a:extLst>
+          </p:cNvPr>
+          <p:cNvSpPr/>
+          <p:nvPr/>
+        </p:nvSpPr>
+        <p:spPr>
+          <a:xfrm>
+            <a:off x="9123684" y="3231632"/>
+            <a:ext cx="1849120" cy="1005839"/>
+          </a:xfrm>
+          <a:prstGeom prst="roundRect">
+            <a:avLst/>
+          </a:prstGeom>
+          <a:solidFill>
+            <a:schemeClr val="accent4">
+              <a:lumMod val="20000"/>
+              <a:lumOff val="80000"/>
+            </a:schemeClr>
+          </a:solidFill>
+        </p:spPr>
+        <p:style>
+          <a:lnRef idx="2">
+            <a:schemeClr val="accent1">
+              <a:shade val="15000"/>
+            </a:schemeClr>
+          </a:lnRef>
+          <a:fillRef idx="1">
+            <a:schemeClr val="accent1"/>
+          </a:fillRef>
+          <a:effectRef idx="0">
+            <a:schemeClr val="accent1"/>
+          </a:effectRef>
+          <a:fontRef idx="minor">
+            <a:schemeClr val="lt1"/>
+          </a:fontRef>
+        </p:style>
+        <p:txBody>
+          <a:bodyPr rtlCol="0" anchor="ctr"/>
+          <a:lstStyle/>
+          <a:p>
+            <a:pPr algn="ctr"/>
+            <a:r>
+              <a:rPr lang="en-CA" sz="2400" dirty="0">
+                <a:solidFill>
+                  <a:schemeClr val="tx1"/>
+                </a:solidFill>
+              </a:rPr>
+              <a:t>Store</a:t>
+            </a:r>
+          </a:p>
+        </p:txBody>
+      </p:sp>
+      <p:sp>
+        <p:nvSpPr>
+          <p:cNvPr id="12" name="Oval 11">
+            <a:extLst>
+              <a:ext uri="{FF2B5EF4-FFF2-40B4-BE49-F238E27FC236}">
+                <a16:creationId xmlns:a16="http://schemas.microsoft.com/office/drawing/2014/main" id="{520AABD6-6D11-224E-A000-31969392AE8F}"/>
+              </a:ext>
+            </a:extLst>
+          </p:cNvPr>
+          <p:cNvSpPr/>
+          <p:nvPr/>
+        </p:nvSpPr>
+        <p:spPr>
+          <a:xfrm>
+            <a:off x="6796727" y="3564402"/>
+            <a:ext cx="406398" cy="406398"/>
+          </a:xfrm>
+          <a:prstGeom prst="ellipse">
+            <a:avLst/>
+          </a:prstGeom>
+          <a:solidFill>
+            <a:schemeClr val="accent6">
+              <a:lumMod val="40000"/>
+              <a:lumOff val="60000"/>
+            </a:schemeClr>
+          </a:solidFill>
+        </p:spPr>
+        <p:style>
+          <a:lnRef idx="2">
+            <a:schemeClr val="accent1">
+              <a:shade val="15000"/>
+            </a:schemeClr>
+          </a:lnRef>
+          <a:fillRef idx="1">
+            <a:schemeClr val="accent1"/>
+          </a:fillRef>
+          <a:effectRef idx="0">
+            <a:schemeClr val="accent1"/>
+          </a:effectRef>
+          <a:fontRef idx="minor">
+            <a:schemeClr val="lt1"/>
+          </a:fontRef>
+        </p:style>
+        <p:txBody>
+          <a:bodyPr rtlCol="0" anchor="ctr"/>
+          <a:lstStyle/>
+          <a:p>
+            <a:pPr algn="ctr"/>
+            <a:endParaRPr lang="en-CA"/>
+          </a:p>
+        </p:txBody>
+      </p:sp>
+      <p:sp>
+        <p:nvSpPr>
+          <p:cNvPr id="15" name="TextBox 14">
+            <a:extLst>
+              <a:ext uri="{FF2B5EF4-FFF2-40B4-BE49-F238E27FC236}">
+                <a16:creationId xmlns:a16="http://schemas.microsoft.com/office/drawing/2014/main" id="{DFED59AE-8C4A-0B06-CA15-802FCEB0E30B}"/>
+              </a:ext>
+            </a:extLst>
+          </p:cNvPr>
+          <p:cNvSpPr txBox="1"/>
+          <p:nvPr/>
+        </p:nvSpPr>
+        <p:spPr>
+          <a:xfrm>
+            <a:off x="3209603" y="479288"/>
+            <a:ext cx="3980697" cy="954107"/>
+          </a:xfrm>
+          <a:prstGeom prst="rect">
+            <a:avLst/>
+          </a:prstGeom>
+          <a:noFill/>
+        </p:spPr>
+        <p:txBody>
+          <a:bodyPr wrap="square" rtlCol="0">
+            <a:spAutoFit/>
+          </a:bodyPr>
+          <a:lstStyle/>
+          <a:p>
+            <a:r>
+              <a:rPr lang="en-CA" sz="2800" dirty="0"/>
+              <a:t>Basic Counter Example</a:t>
+            </a:r>
+          </a:p>
+          <a:p>
+            <a:endParaRPr lang="en-CA" sz="2800" dirty="0"/>
+          </a:p>
+        </p:txBody>
+      </p:sp>
+      <p:sp>
+        <p:nvSpPr>
+          <p:cNvPr id="16" name="Oval 15">
+            <a:extLst>
+              <a:ext uri="{FF2B5EF4-FFF2-40B4-BE49-F238E27FC236}">
+                <a16:creationId xmlns:a16="http://schemas.microsoft.com/office/drawing/2014/main" id="{2CFA347A-8CC0-A2A4-962B-390CE3D6DDA6}"/>
+              </a:ext>
+            </a:extLst>
+          </p:cNvPr>
+          <p:cNvSpPr/>
+          <p:nvPr/>
+        </p:nvSpPr>
+        <p:spPr>
+          <a:xfrm>
+            <a:off x="1442720" y="1188255"/>
+            <a:ext cx="6746240" cy="5253185"/>
+          </a:xfrm>
+          <a:prstGeom prst="ellipse">
+            <a:avLst/>
+          </a:prstGeom>
+          <a:noFill/>
+          <a:ln w="38100">
+            <a:prstDash val="lgDash"/>
+          </a:ln>
+        </p:spPr>
+        <p:style>
+          <a:lnRef idx="2">
+            <a:schemeClr val="accent1">
+              <a:shade val="15000"/>
+            </a:schemeClr>
+          </a:lnRef>
+          <a:fillRef idx="1">
+            <a:schemeClr val="accent1"/>
+          </a:fillRef>
+          <a:effectRef idx="0">
+            <a:schemeClr val="accent1"/>
+          </a:effectRef>
+          <a:fontRef idx="minor">
+            <a:schemeClr val="lt1"/>
+          </a:fontRef>
+        </p:style>
+        <p:txBody>
+          <a:bodyPr rtlCol="0" anchor="ctr"/>
+          <a:lstStyle/>
+          <a:p>
+            <a:pPr algn="ctr"/>
+            <a:endParaRPr lang="en-CA"/>
+          </a:p>
+        </p:txBody>
+      </p:sp>
+      <p:sp>
+        <p:nvSpPr>
+          <p:cNvPr id="18" name="Oval 17">
+            <a:extLst>
+              <a:ext uri="{FF2B5EF4-FFF2-40B4-BE49-F238E27FC236}">
+                <a16:creationId xmlns:a16="http://schemas.microsoft.com/office/drawing/2014/main" id="{2B2DC22D-4CFC-D293-F0EF-EBEB7D7A89D8}"/>
+              </a:ext>
+            </a:extLst>
+          </p:cNvPr>
+          <p:cNvSpPr/>
+          <p:nvPr/>
+        </p:nvSpPr>
+        <p:spPr>
+          <a:xfrm>
+            <a:off x="4573750" y="3582935"/>
+            <a:ext cx="406398" cy="406398"/>
+          </a:xfrm>
+          <a:prstGeom prst="ellipse">
+            <a:avLst/>
+          </a:prstGeom>
+          <a:solidFill>
+            <a:schemeClr val="accent2">
+              <a:lumMod val="40000"/>
+              <a:lumOff val="60000"/>
+            </a:schemeClr>
+          </a:solidFill>
+        </p:spPr>
+        <p:style>
+          <a:lnRef idx="2">
+            <a:schemeClr val="accent1">
+              <a:shade val="15000"/>
+            </a:schemeClr>
+          </a:lnRef>
+          <a:fillRef idx="1">
+            <a:schemeClr val="accent1"/>
+          </a:fillRef>
+          <a:effectRef idx="0">
+            <a:schemeClr val="accent1"/>
+          </a:effectRef>
+          <a:fontRef idx="minor">
+            <a:schemeClr val="lt1"/>
+          </a:fontRef>
+        </p:style>
+        <p:txBody>
+          <a:bodyPr rtlCol="0" anchor="ctr"/>
+          <a:lstStyle/>
+          <a:p>
+            <a:pPr algn="ctr"/>
+            <a:endParaRPr lang="en-CA"/>
+          </a:p>
+        </p:txBody>
+      </p:sp>
+      <p:sp>
+        <p:nvSpPr>
+          <p:cNvPr id="10" name="TextBox 9">
+            <a:extLst>
+              <a:ext uri="{FF2B5EF4-FFF2-40B4-BE49-F238E27FC236}">
+                <a16:creationId xmlns:a16="http://schemas.microsoft.com/office/drawing/2014/main" id="{0DE2DCF6-810D-52DD-C2CF-D8B2DED47CC8}"/>
+              </a:ext>
+            </a:extLst>
+          </p:cNvPr>
+          <p:cNvSpPr txBox="1"/>
+          <p:nvPr/>
+        </p:nvSpPr>
+        <p:spPr>
+          <a:xfrm>
+            <a:off x="1781809" y="3582935"/>
+            <a:ext cx="1381761" cy="369332"/>
+          </a:xfrm>
+          <a:prstGeom prst="rect">
+            <a:avLst/>
+          </a:prstGeom>
+          <a:solidFill>
+            <a:schemeClr val="bg1"/>
+          </a:solidFill>
+          <a:ln>
+            <a:solidFill>
+              <a:schemeClr val="accent1">
+                <a:shade val="15000"/>
+              </a:schemeClr>
+            </a:solidFill>
+          </a:ln>
+        </p:spPr>
+        <p:txBody>
+          <a:bodyPr wrap="square" rtlCol="0">
+            <a:spAutoFit/>
+          </a:bodyPr>
+          <a:lstStyle/>
+          <a:p>
+            <a:pPr algn="ctr"/>
+            <a:r>
+              <a:rPr lang="en-CA" dirty="0"/>
+              <a:t>dispatcher$</a:t>
+            </a:r>
+          </a:p>
+        </p:txBody>
+      </p:sp>
+      <p:sp>
+        <p:nvSpPr>
+          <p:cNvPr id="3" name="TextBox 2">
+            <a:extLst>
+              <a:ext uri="{FF2B5EF4-FFF2-40B4-BE49-F238E27FC236}">
+                <a16:creationId xmlns:a16="http://schemas.microsoft.com/office/drawing/2014/main" id="{F872867C-CD13-4F11-BF4C-E81593436CDB}"/>
+              </a:ext>
+            </a:extLst>
+          </p:cNvPr>
+          <p:cNvSpPr txBox="1"/>
+          <p:nvPr/>
+        </p:nvSpPr>
+        <p:spPr>
+          <a:xfrm>
+            <a:off x="6457289" y="3997446"/>
+            <a:ext cx="1466022" cy="369332"/>
+          </a:xfrm>
+          <a:prstGeom prst="rect">
+            <a:avLst/>
+          </a:prstGeom>
+          <a:noFill/>
+        </p:spPr>
+        <p:txBody>
+          <a:bodyPr wrap="square" rtlCol="0">
+            <a:spAutoFit/>
+          </a:bodyPr>
+          <a:lstStyle/>
+          <a:p>
+            <a:r>
+              <a:rPr lang="en-CA" dirty="0"/>
+              <a:t>INCREMENT</a:t>
+            </a:r>
+          </a:p>
+        </p:txBody>
+      </p:sp>
+      <p:sp>
+        <p:nvSpPr>
+          <p:cNvPr id="4" name="TextBox 3">
+            <a:extLst>
+              <a:ext uri="{FF2B5EF4-FFF2-40B4-BE49-F238E27FC236}">
+                <a16:creationId xmlns:a16="http://schemas.microsoft.com/office/drawing/2014/main" id="{94478DCB-C78A-7590-98BB-FE252ABD5A3C}"/>
+              </a:ext>
+            </a:extLst>
+          </p:cNvPr>
+          <p:cNvSpPr txBox="1"/>
+          <p:nvPr/>
+        </p:nvSpPr>
+        <p:spPr>
+          <a:xfrm>
+            <a:off x="4388294" y="4052805"/>
+            <a:ext cx="1466022" cy="369332"/>
+          </a:xfrm>
+          <a:prstGeom prst="rect">
+            <a:avLst/>
+          </a:prstGeom>
+          <a:noFill/>
+        </p:spPr>
+        <p:txBody>
+          <a:bodyPr wrap="square" rtlCol="0">
+            <a:spAutoFit/>
+          </a:bodyPr>
+          <a:lstStyle/>
+          <a:p>
+            <a:r>
+              <a:rPr lang="en-CA" dirty="0"/>
+              <a:t>RESET</a:t>
+            </a:r>
+          </a:p>
+        </p:txBody>
+      </p:sp>
+    </p:spTree>
+    <p:extLst>
+      <p:ext uri="{BB962C8B-B14F-4D97-AF65-F5344CB8AC3E}">
+        <p14:creationId xmlns:p14="http://schemas.microsoft.com/office/powerpoint/2010/main" val="1004788944"/>
+      </p:ext>
+    </p:extLst>
+  </p:cSld>
+  <p:clrMapOvr>
+    <a:masterClrMapping/>
+  </p:clrMapOvr>
+</p:sld>
+</file>
+
+<file path=ppt/slides/slide12.xml><?xml version="1.0" encoding="utf-8"?>
+<p:sld xmlns:a="http://schemas.openxmlformats.org/drawingml/2006/main" xmlns:r="http://schemas.openxmlformats.org/officeDocument/2006/relationships" xmlns:p="http://schemas.openxmlformats.org/presentationml/2006/main">
+  <p:cSld>
+    <p:spTree>
+      <p:nvGrpSpPr>
+        <p:cNvPr id="1" name=""/>
+        <p:cNvGrpSpPr/>
+        <p:nvPr/>
+      </p:nvGrpSpPr>
+      <p:grpSpPr>
+        <a:xfrm>
+          <a:off x="0" y="0"/>
+          <a:ext cx="0" cy="0"/>
+          <a:chOff x="0" y="0"/>
+          <a:chExt cx="0" cy="0"/>
+        </a:xfrm>
+      </p:grpSpPr>
+      <p:cxnSp>
+        <p:nvCxnSpPr>
+          <p:cNvPr id="5" name="Straight Arrow Connector 4">
+            <a:extLst>
+              <a:ext uri="{FF2B5EF4-FFF2-40B4-BE49-F238E27FC236}">
+                <a16:creationId xmlns:a16="http://schemas.microsoft.com/office/drawing/2014/main" id="{4D57241C-FD8F-6E69-D1C7-1CEC88535E98}"/>
+              </a:ext>
+            </a:extLst>
+          </p:cNvPr>
+          <p:cNvCxnSpPr>
+            <a:cxnSpLocks/>
+            <a:endCxn id="7" idx="1"/>
+          </p:cNvCxnSpPr>
+          <p:nvPr/>
+        </p:nvCxnSpPr>
+        <p:spPr>
+          <a:xfrm>
+            <a:off x="714375" y="3216392"/>
+            <a:ext cx="9628505" cy="0"/>
+          </a:xfrm>
+          <a:prstGeom prst="straightConnector1">
+            <a:avLst/>
+          </a:prstGeom>
+          <a:ln w="57150">
+            <a:tailEnd type="arrow"/>
+          </a:ln>
+        </p:spPr>
+        <p:style>
+          <a:lnRef idx="1">
+            <a:schemeClr val="accent1"/>
+          </a:lnRef>
+          <a:fillRef idx="0">
+            <a:schemeClr val="accent1"/>
+          </a:fillRef>
+          <a:effectRef idx="0">
+            <a:schemeClr val="accent1"/>
+          </a:effectRef>
+          <a:fontRef idx="minor">
+            <a:schemeClr val="tx1"/>
+          </a:fontRef>
+        </p:style>
+      </p:cxnSp>
+      <p:sp>
+        <p:nvSpPr>
+          <p:cNvPr id="7" name="Rectangle: Rounded Corners 6">
+            <a:extLst>
+              <a:ext uri="{FF2B5EF4-FFF2-40B4-BE49-F238E27FC236}">
+                <a16:creationId xmlns:a16="http://schemas.microsoft.com/office/drawing/2014/main" id="{5212D68A-7D3D-67A8-D6E8-310B59CC5D21}"/>
+              </a:ext>
+            </a:extLst>
+          </p:cNvPr>
+          <p:cNvSpPr/>
+          <p:nvPr/>
+        </p:nvSpPr>
+        <p:spPr>
+          <a:xfrm>
+            <a:off x="10342880" y="2713472"/>
+            <a:ext cx="1849120" cy="1005839"/>
+          </a:xfrm>
+          <a:prstGeom prst="roundRect">
+            <a:avLst/>
+          </a:prstGeom>
+          <a:solidFill>
+            <a:schemeClr val="accent4">
+              <a:lumMod val="20000"/>
+              <a:lumOff val="80000"/>
+            </a:schemeClr>
+          </a:solidFill>
+        </p:spPr>
+        <p:style>
+          <a:lnRef idx="2">
+            <a:schemeClr val="accent1">
+              <a:shade val="15000"/>
+            </a:schemeClr>
+          </a:lnRef>
+          <a:fillRef idx="1">
+            <a:schemeClr val="accent1"/>
+          </a:fillRef>
+          <a:effectRef idx="0">
+            <a:schemeClr val="accent1"/>
+          </a:effectRef>
+          <a:fontRef idx="minor">
+            <a:schemeClr val="lt1"/>
+          </a:fontRef>
+        </p:style>
+        <p:txBody>
+          <a:bodyPr rtlCol="0" anchor="ctr"/>
+          <a:lstStyle/>
+          <a:p>
+            <a:pPr algn="ctr"/>
+            <a:r>
+              <a:rPr lang="en-CA" sz="2400" dirty="0">
+                <a:solidFill>
+                  <a:schemeClr val="tx1"/>
+                </a:solidFill>
+              </a:rPr>
+              <a:t>Store</a:t>
+            </a:r>
+          </a:p>
+        </p:txBody>
+      </p:sp>
+      <p:sp>
+        <p:nvSpPr>
+          <p:cNvPr id="16" name="Oval 15">
+            <a:extLst>
+              <a:ext uri="{FF2B5EF4-FFF2-40B4-BE49-F238E27FC236}">
+                <a16:creationId xmlns:a16="http://schemas.microsoft.com/office/drawing/2014/main" id="{2CFA347A-8CC0-A2A4-962B-390CE3D6DDA6}"/>
+              </a:ext>
+            </a:extLst>
+          </p:cNvPr>
+          <p:cNvSpPr/>
+          <p:nvPr/>
+        </p:nvSpPr>
+        <p:spPr>
+          <a:xfrm>
+            <a:off x="990600" y="967661"/>
+            <a:ext cx="8864596" cy="4497457"/>
+          </a:xfrm>
+          <a:prstGeom prst="ellipse">
+            <a:avLst/>
+          </a:prstGeom>
+          <a:noFill/>
+          <a:ln w="38100">
+            <a:prstDash val="lgDash"/>
+          </a:ln>
+        </p:spPr>
+        <p:style>
+          <a:lnRef idx="2">
+            <a:schemeClr val="accent1">
+              <a:shade val="15000"/>
+            </a:schemeClr>
+          </a:lnRef>
+          <a:fillRef idx="1">
+            <a:schemeClr val="accent1"/>
+          </a:fillRef>
+          <a:effectRef idx="0">
+            <a:schemeClr val="accent1"/>
+          </a:effectRef>
+          <a:fontRef idx="minor">
+            <a:schemeClr val="lt1"/>
+          </a:fontRef>
+        </p:style>
+        <p:txBody>
+          <a:bodyPr rtlCol="0" anchor="ctr"/>
+          <a:lstStyle/>
+          <a:p>
+            <a:pPr algn="ctr"/>
+            <a:endParaRPr lang="en-CA"/>
+          </a:p>
+        </p:txBody>
+      </p:sp>
+      <p:sp>
+        <p:nvSpPr>
+          <p:cNvPr id="27" name="Oval 26">
+            <a:extLst>
+              <a:ext uri="{FF2B5EF4-FFF2-40B4-BE49-F238E27FC236}">
+                <a16:creationId xmlns:a16="http://schemas.microsoft.com/office/drawing/2014/main" id="{514B41B0-4BF6-3B8F-6513-CDE036CFB98E}"/>
+              </a:ext>
+            </a:extLst>
+          </p:cNvPr>
+          <p:cNvSpPr/>
+          <p:nvPr/>
+        </p:nvSpPr>
+        <p:spPr>
+          <a:xfrm>
+            <a:off x="1757198" y="2862326"/>
+            <a:ext cx="655495" cy="655495"/>
+          </a:xfrm>
+          <a:prstGeom prst="ellipse">
+            <a:avLst/>
+          </a:prstGeom>
+          <a:solidFill>
+            <a:schemeClr val="accent2">
+              <a:alpha val="50000"/>
+            </a:schemeClr>
+          </a:solidFill>
+        </p:spPr>
+        <p:style>
+          <a:lnRef idx="2">
+            <a:schemeClr val="accent1">
+              <a:shade val="15000"/>
+            </a:schemeClr>
+          </a:lnRef>
+          <a:fillRef idx="1">
+            <a:schemeClr val="accent1"/>
+          </a:fillRef>
+          <a:effectRef idx="0">
+            <a:schemeClr val="accent1"/>
+          </a:effectRef>
+          <a:fontRef idx="minor">
+            <a:schemeClr val="lt1"/>
+          </a:fontRef>
+        </p:style>
+        <p:txBody>
+          <a:bodyPr rtlCol="0" anchor="ctr"/>
+          <a:lstStyle/>
+          <a:p>
+            <a:pPr algn="ctr"/>
+            <a:endParaRPr lang="en-CA"/>
+          </a:p>
+        </p:txBody>
+      </p:sp>
+      <p:sp>
+        <p:nvSpPr>
+          <p:cNvPr id="28" name="Oval 27">
+            <a:extLst>
+              <a:ext uri="{FF2B5EF4-FFF2-40B4-BE49-F238E27FC236}">
+                <a16:creationId xmlns:a16="http://schemas.microsoft.com/office/drawing/2014/main" id="{F4E3AD08-8E9F-7B85-0D10-C01DB2BE4B9A}"/>
+              </a:ext>
+            </a:extLst>
+          </p:cNvPr>
+          <p:cNvSpPr/>
+          <p:nvPr/>
+        </p:nvSpPr>
+        <p:spPr>
+          <a:xfrm>
+            <a:off x="1490018" y="2862369"/>
+            <a:ext cx="655495" cy="655495"/>
+          </a:xfrm>
+          <a:prstGeom prst="ellipse">
+            <a:avLst/>
+          </a:prstGeom>
+          <a:solidFill>
+            <a:schemeClr val="accent2">
+              <a:alpha val="50000"/>
+            </a:schemeClr>
+          </a:solidFill>
+        </p:spPr>
+        <p:style>
+          <a:lnRef idx="2">
+            <a:schemeClr val="accent1">
+              <a:shade val="15000"/>
+            </a:schemeClr>
+          </a:lnRef>
+          <a:fillRef idx="1">
+            <a:schemeClr val="accent1"/>
+          </a:fillRef>
+          <a:effectRef idx="0">
+            <a:schemeClr val="accent1"/>
+          </a:effectRef>
+          <a:fontRef idx="minor">
+            <a:schemeClr val="lt1"/>
+          </a:fontRef>
+        </p:style>
+        <p:txBody>
+          <a:bodyPr rtlCol="0" anchor="ctr"/>
+          <a:lstStyle/>
+          <a:p>
+            <a:pPr algn="ctr"/>
+            <a:endParaRPr lang="en-CA"/>
+          </a:p>
+        </p:txBody>
+      </p:sp>
+      <p:sp>
+        <p:nvSpPr>
+          <p:cNvPr id="33" name="Arc 32">
+            <a:extLst>
+              <a:ext uri="{FF2B5EF4-FFF2-40B4-BE49-F238E27FC236}">
+                <a16:creationId xmlns:a16="http://schemas.microsoft.com/office/drawing/2014/main" id="{332FFE7B-C361-FC63-030B-BFF9C1C84E71}"/>
+              </a:ext>
+            </a:extLst>
+          </p:cNvPr>
+          <p:cNvSpPr/>
+          <p:nvPr/>
+        </p:nvSpPr>
+        <p:spPr>
+          <a:xfrm flipV="1">
+            <a:off x="1579880" y="2489004"/>
+            <a:ext cx="8864596" cy="1615363"/>
+          </a:xfrm>
+          <a:prstGeom prst="arc">
+            <a:avLst>
+              <a:gd name="adj1" fmla="val 10769572"/>
+              <a:gd name="adj2" fmla="val 21373139"/>
+            </a:avLst>
+          </a:prstGeom>
+          <a:ln w="57150">
+            <a:solidFill>
+              <a:schemeClr val="accent2"/>
+            </a:solidFill>
+            <a:tailEnd type="arrow"/>
+          </a:ln>
+        </p:spPr>
+        <p:style>
+          <a:lnRef idx="1">
+            <a:schemeClr val="accent1"/>
+          </a:lnRef>
+          <a:fillRef idx="0">
+            <a:schemeClr val="accent1"/>
+          </a:fillRef>
+          <a:effectRef idx="0">
+            <a:schemeClr val="accent1"/>
+          </a:effectRef>
+          <a:fontRef idx="minor">
+            <a:schemeClr val="tx1"/>
+          </a:fontRef>
+        </p:style>
+        <p:txBody>
+          <a:bodyPr rtlCol="0" anchor="ctr"/>
+          <a:lstStyle/>
+          <a:p>
+            <a:pPr algn="ctr"/>
+            <a:endParaRPr lang="en-CA"/>
+          </a:p>
+        </p:txBody>
+      </p:sp>
+      <p:sp>
+        <p:nvSpPr>
+          <p:cNvPr id="35" name="Arc 34">
+            <a:extLst>
+              <a:ext uri="{FF2B5EF4-FFF2-40B4-BE49-F238E27FC236}">
+                <a16:creationId xmlns:a16="http://schemas.microsoft.com/office/drawing/2014/main" id="{219CA8B1-EBA7-F130-31B2-715D0FD356E4}"/>
+              </a:ext>
+            </a:extLst>
+          </p:cNvPr>
+          <p:cNvSpPr/>
+          <p:nvPr/>
+        </p:nvSpPr>
+        <p:spPr>
+          <a:xfrm>
+            <a:off x="1597427" y="1747381"/>
+            <a:ext cx="8864596" cy="2681871"/>
+          </a:xfrm>
+          <a:prstGeom prst="arc">
+            <a:avLst>
+              <a:gd name="adj1" fmla="val 10769572"/>
+              <a:gd name="adj2" fmla="val 21373139"/>
+            </a:avLst>
+          </a:prstGeom>
+          <a:ln w="57150">
+            <a:solidFill>
+              <a:schemeClr val="accent2"/>
+            </a:solidFill>
+            <a:tailEnd type="arrow"/>
+          </a:ln>
+        </p:spPr>
+        <p:style>
+          <a:lnRef idx="1">
+            <a:schemeClr val="accent1"/>
+          </a:lnRef>
+          <a:fillRef idx="0">
+            <a:schemeClr val="accent1"/>
+          </a:fillRef>
+          <a:effectRef idx="0">
+            <a:schemeClr val="accent1"/>
+          </a:effectRef>
+          <a:fontRef idx="minor">
+            <a:schemeClr val="tx1"/>
+          </a:fontRef>
+        </p:style>
+        <p:txBody>
+          <a:bodyPr rtlCol="0" anchor="ctr"/>
+          <a:lstStyle/>
+          <a:p>
+            <a:pPr algn="ctr"/>
+            <a:endParaRPr lang="en-CA"/>
+          </a:p>
+        </p:txBody>
+      </p:sp>
+      <p:sp>
+        <p:nvSpPr>
+          <p:cNvPr id="38" name="Oval 37">
+            <a:extLst>
+              <a:ext uri="{FF2B5EF4-FFF2-40B4-BE49-F238E27FC236}">
+                <a16:creationId xmlns:a16="http://schemas.microsoft.com/office/drawing/2014/main" id="{44639066-94DF-F17D-4DD8-5936189C1732}"/>
+              </a:ext>
+            </a:extLst>
+          </p:cNvPr>
+          <p:cNvSpPr/>
+          <p:nvPr/>
+        </p:nvSpPr>
+        <p:spPr>
+          <a:xfrm>
+            <a:off x="7336663" y="2918371"/>
+            <a:ext cx="655495" cy="655495"/>
+          </a:xfrm>
+          <a:prstGeom prst="ellipse">
+            <a:avLst/>
+          </a:prstGeom>
+          <a:solidFill>
+            <a:schemeClr val="accent2"/>
+          </a:solidFill>
+        </p:spPr>
+        <p:style>
+          <a:lnRef idx="2">
+            <a:schemeClr val="accent1">
+              <a:shade val="15000"/>
+            </a:schemeClr>
+          </a:lnRef>
+          <a:fillRef idx="1">
+            <a:schemeClr val="accent1"/>
+          </a:fillRef>
+          <a:effectRef idx="0">
+            <a:schemeClr val="accent1"/>
+          </a:effectRef>
+          <a:fontRef idx="minor">
+            <a:schemeClr val="lt1"/>
+          </a:fontRef>
+        </p:style>
+        <p:txBody>
+          <a:bodyPr rtlCol="0" anchor="ctr"/>
+          <a:lstStyle/>
+          <a:p>
+            <a:pPr algn="ctr"/>
+            <a:r>
+              <a:rPr lang="en-CA" sz="1200" dirty="0"/>
+              <a:t>id: 2</a:t>
+            </a:r>
+          </a:p>
+        </p:txBody>
+      </p:sp>
+      <p:sp>
+        <p:nvSpPr>
+          <p:cNvPr id="39" name="Oval 38">
+            <a:extLst>
+              <a:ext uri="{FF2B5EF4-FFF2-40B4-BE49-F238E27FC236}">
+                <a16:creationId xmlns:a16="http://schemas.microsoft.com/office/drawing/2014/main" id="{20446432-E406-C4A9-CD78-8064AF5BF0A6}"/>
+              </a:ext>
+            </a:extLst>
+          </p:cNvPr>
+          <p:cNvSpPr/>
+          <p:nvPr/>
+        </p:nvSpPr>
+        <p:spPr>
+          <a:xfrm>
+            <a:off x="8183449" y="2888643"/>
+            <a:ext cx="655495" cy="655495"/>
+          </a:xfrm>
+          <a:prstGeom prst="ellipse">
+            <a:avLst/>
+          </a:prstGeom>
+          <a:solidFill>
+            <a:schemeClr val="accent2"/>
+          </a:solidFill>
+        </p:spPr>
+        <p:style>
+          <a:lnRef idx="2">
+            <a:schemeClr val="accent1">
+              <a:shade val="15000"/>
+            </a:schemeClr>
+          </a:lnRef>
+          <a:fillRef idx="1">
+            <a:schemeClr val="accent1"/>
+          </a:fillRef>
+          <a:effectRef idx="0">
+            <a:schemeClr val="accent1"/>
+          </a:effectRef>
+          <a:fontRef idx="minor">
+            <a:schemeClr val="lt1"/>
+          </a:fontRef>
+        </p:style>
+        <p:txBody>
+          <a:bodyPr rtlCol="0" anchor="ctr"/>
+          <a:lstStyle/>
+          <a:p>
+            <a:pPr algn="ctr"/>
+            <a:r>
+              <a:rPr lang="en-CA" sz="1200" dirty="0"/>
+              <a:t>id: 1</a:t>
+            </a:r>
+          </a:p>
+        </p:txBody>
+      </p:sp>
+      <p:sp>
+        <p:nvSpPr>
+          <p:cNvPr id="42" name="TextBox 41">
+            <a:extLst>
+              <a:ext uri="{FF2B5EF4-FFF2-40B4-BE49-F238E27FC236}">
+                <a16:creationId xmlns:a16="http://schemas.microsoft.com/office/drawing/2014/main" id="{564C71DB-E709-6C43-3252-6C5608045901}"/>
+              </a:ext>
+            </a:extLst>
+          </p:cNvPr>
+          <p:cNvSpPr txBox="1"/>
+          <p:nvPr/>
+        </p:nvSpPr>
+        <p:spPr>
+          <a:xfrm>
+            <a:off x="3521525" y="3887598"/>
+            <a:ext cx="1983925" cy="646331"/>
+          </a:xfrm>
+          <a:prstGeom prst="rect">
+            <a:avLst/>
+          </a:prstGeom>
+          <a:solidFill>
+            <a:schemeClr val="bg1"/>
+          </a:solidFill>
+          <a:ln>
+            <a:solidFill>
+              <a:schemeClr val="tx1"/>
+            </a:solidFill>
+          </a:ln>
+        </p:spPr>
+        <p:txBody>
+          <a:bodyPr wrap="square" rtlCol="0">
+            <a:spAutoFit/>
+          </a:bodyPr>
+          <a:lstStyle/>
+          <a:p>
+            <a:pPr algn="ctr"/>
+            <a:r>
+              <a:rPr lang="en-CA" dirty="0" err="1"/>
+              <a:t>updateTodoEffect</a:t>
+            </a:r>
+            <a:r>
+              <a:rPr lang="en-CA" dirty="0"/>
+              <a:t>${ id: 1}</a:t>
+            </a:r>
+          </a:p>
+        </p:txBody>
+      </p:sp>
+      <p:sp>
+        <p:nvSpPr>
+          <p:cNvPr id="43" name="TextBox 42">
+            <a:extLst>
+              <a:ext uri="{FF2B5EF4-FFF2-40B4-BE49-F238E27FC236}">
+                <a16:creationId xmlns:a16="http://schemas.microsoft.com/office/drawing/2014/main" id="{19413BF1-7244-7BAA-DE92-3D3C31DB0AA9}"/>
+              </a:ext>
+            </a:extLst>
+          </p:cNvPr>
+          <p:cNvSpPr txBox="1"/>
+          <p:nvPr/>
+        </p:nvSpPr>
+        <p:spPr>
+          <a:xfrm>
+            <a:off x="4213896" y="1299547"/>
+            <a:ext cx="1983925" cy="646331"/>
+          </a:xfrm>
+          <a:prstGeom prst="rect">
+            <a:avLst/>
+          </a:prstGeom>
+          <a:solidFill>
+            <a:schemeClr val="bg1"/>
+          </a:solidFill>
+          <a:ln>
+            <a:solidFill>
+              <a:schemeClr val="tx1"/>
+            </a:solidFill>
+          </a:ln>
+        </p:spPr>
+        <p:txBody>
+          <a:bodyPr wrap="square" rtlCol="0">
+            <a:spAutoFit/>
+          </a:bodyPr>
+          <a:lstStyle/>
+          <a:p>
+            <a:pPr algn="ctr"/>
+            <a:r>
+              <a:rPr lang="en-CA" dirty="0" err="1"/>
+              <a:t>updateTodoEffect</a:t>
+            </a:r>
+            <a:r>
+              <a:rPr lang="en-CA" dirty="0"/>
+              <a:t>$</a:t>
+            </a:r>
+          </a:p>
+          <a:p>
+            <a:pPr algn="ctr"/>
+            <a:r>
+              <a:rPr lang="en-CA" dirty="0"/>
+              <a:t>{ id: 2 }</a:t>
+            </a:r>
+          </a:p>
+        </p:txBody>
+      </p:sp>
+      <p:sp>
+        <p:nvSpPr>
+          <p:cNvPr id="44" name="Oval 43">
+            <a:extLst>
+              <a:ext uri="{FF2B5EF4-FFF2-40B4-BE49-F238E27FC236}">
+                <a16:creationId xmlns:a16="http://schemas.microsoft.com/office/drawing/2014/main" id="{6D1B5850-42F6-F016-38E9-79264A6AC1B4}"/>
+              </a:ext>
+            </a:extLst>
+          </p:cNvPr>
+          <p:cNvSpPr/>
+          <p:nvPr/>
+        </p:nvSpPr>
+        <p:spPr>
+          <a:xfrm>
+            <a:off x="5932125" y="3759519"/>
+            <a:ext cx="655495" cy="655495"/>
+          </a:xfrm>
+          <a:prstGeom prst="ellipse">
+            <a:avLst/>
+          </a:prstGeom>
+          <a:solidFill>
+            <a:schemeClr val="accent3">
+              <a:lumMod val="60000"/>
+              <a:lumOff val="40000"/>
+            </a:schemeClr>
+          </a:solidFill>
+        </p:spPr>
+        <p:style>
+          <a:lnRef idx="2">
+            <a:schemeClr val="accent1">
+              <a:shade val="15000"/>
+            </a:schemeClr>
+          </a:lnRef>
+          <a:fillRef idx="1">
+            <a:schemeClr val="accent1"/>
+          </a:fillRef>
+          <a:effectRef idx="0">
+            <a:schemeClr val="accent1"/>
+          </a:effectRef>
+          <a:fontRef idx="minor">
+            <a:schemeClr val="lt1"/>
+          </a:fontRef>
+        </p:style>
+        <p:txBody>
+          <a:bodyPr rtlCol="0" anchor="ctr"/>
+          <a:lstStyle/>
+          <a:p>
+            <a:pPr algn="ctr"/>
+            <a:r>
+              <a:rPr lang="en-CA" sz="1200"/>
+              <a:t>id: 1</a:t>
+            </a:r>
+            <a:endParaRPr lang="en-CA" sz="1200" dirty="0"/>
+          </a:p>
+        </p:txBody>
+      </p:sp>
+      <p:sp>
+        <p:nvSpPr>
+          <p:cNvPr id="47" name="Oval 46">
+            <a:extLst>
+              <a:ext uri="{FF2B5EF4-FFF2-40B4-BE49-F238E27FC236}">
+                <a16:creationId xmlns:a16="http://schemas.microsoft.com/office/drawing/2014/main" id="{2897976E-A03D-81E8-C241-49843C9B18AF}"/>
+              </a:ext>
+            </a:extLst>
+          </p:cNvPr>
+          <p:cNvSpPr/>
+          <p:nvPr/>
+        </p:nvSpPr>
+        <p:spPr>
+          <a:xfrm>
+            <a:off x="7272302" y="1522862"/>
+            <a:ext cx="655495" cy="655495"/>
+          </a:xfrm>
+          <a:prstGeom prst="ellipse">
+            <a:avLst/>
+          </a:prstGeom>
+          <a:solidFill>
+            <a:schemeClr val="accent3">
+              <a:lumMod val="60000"/>
+              <a:lumOff val="40000"/>
+            </a:schemeClr>
+          </a:solidFill>
+        </p:spPr>
+        <p:style>
+          <a:lnRef idx="2">
+            <a:schemeClr val="accent1">
+              <a:shade val="15000"/>
+            </a:schemeClr>
+          </a:lnRef>
+          <a:fillRef idx="1">
+            <a:schemeClr val="accent1"/>
+          </a:fillRef>
+          <a:effectRef idx="0">
+            <a:schemeClr val="accent1"/>
+          </a:effectRef>
+          <a:fontRef idx="minor">
+            <a:schemeClr val="lt1"/>
+          </a:fontRef>
+        </p:style>
+        <p:txBody>
+          <a:bodyPr rtlCol="0" anchor="ctr"/>
+          <a:lstStyle/>
+          <a:p>
+            <a:pPr algn="ctr"/>
+            <a:r>
+              <a:rPr lang="en-CA" sz="1200" dirty="0"/>
+              <a:t>id: 2</a:t>
+            </a:r>
+          </a:p>
+        </p:txBody>
+      </p:sp>
+      <p:sp>
+        <p:nvSpPr>
+          <p:cNvPr id="48" name="Oval 47">
+            <a:extLst>
+              <a:ext uri="{FF2B5EF4-FFF2-40B4-BE49-F238E27FC236}">
+                <a16:creationId xmlns:a16="http://schemas.microsoft.com/office/drawing/2014/main" id="{DB987F8C-D0E7-2922-A134-DC0FD8227A79}"/>
+              </a:ext>
+            </a:extLst>
+          </p:cNvPr>
+          <p:cNvSpPr/>
+          <p:nvPr/>
+        </p:nvSpPr>
+        <p:spPr>
+          <a:xfrm>
+            <a:off x="2483449" y="3506632"/>
+            <a:ext cx="655495" cy="655495"/>
+          </a:xfrm>
+          <a:prstGeom prst="ellipse">
+            <a:avLst/>
+          </a:prstGeom>
+          <a:solidFill>
+            <a:schemeClr val="accent2">
+              <a:alpha val="50000"/>
+            </a:schemeClr>
+          </a:solidFill>
+        </p:spPr>
+        <p:style>
+          <a:lnRef idx="2">
+            <a:schemeClr val="accent1">
+              <a:shade val="15000"/>
+            </a:schemeClr>
+          </a:lnRef>
+          <a:fillRef idx="1">
+            <a:schemeClr val="accent1"/>
+          </a:fillRef>
+          <a:effectRef idx="0">
+            <a:schemeClr val="accent1"/>
+          </a:effectRef>
+          <a:fontRef idx="minor">
+            <a:schemeClr val="lt1"/>
+          </a:fontRef>
+        </p:style>
+        <p:txBody>
+          <a:bodyPr rtlCol="0" anchor="ctr"/>
+          <a:lstStyle/>
+          <a:p>
+            <a:pPr algn="ctr"/>
+            <a:r>
+              <a:rPr lang="en-CA" sz="1200"/>
+              <a:t>id: 1</a:t>
+            </a:r>
+            <a:endParaRPr lang="en-CA" sz="1200" dirty="0"/>
+          </a:p>
+        </p:txBody>
+      </p:sp>
+      <p:sp>
+        <p:nvSpPr>
+          <p:cNvPr id="64" name="TextBox 63">
+            <a:extLst>
+              <a:ext uri="{FF2B5EF4-FFF2-40B4-BE49-F238E27FC236}">
+                <a16:creationId xmlns:a16="http://schemas.microsoft.com/office/drawing/2014/main" id="{33D52A14-49C2-146E-C898-4F406B2B537A}"/>
+              </a:ext>
+            </a:extLst>
+          </p:cNvPr>
+          <p:cNvSpPr txBox="1"/>
+          <p:nvPr/>
+        </p:nvSpPr>
+        <p:spPr>
+          <a:xfrm>
+            <a:off x="5205859" y="3035641"/>
+            <a:ext cx="1381761" cy="369332"/>
+          </a:xfrm>
+          <a:prstGeom prst="rect">
+            <a:avLst/>
+          </a:prstGeom>
+          <a:solidFill>
+            <a:schemeClr val="bg1"/>
+          </a:solidFill>
+          <a:ln>
+            <a:solidFill>
+              <a:schemeClr val="accent1">
+                <a:shade val="15000"/>
+              </a:schemeClr>
+            </a:solidFill>
+          </a:ln>
+        </p:spPr>
+        <p:txBody>
+          <a:bodyPr wrap="square" rtlCol="0">
+            <a:spAutoFit/>
+          </a:bodyPr>
+          <a:lstStyle/>
+          <a:p>
+            <a:pPr algn="ctr"/>
+            <a:r>
+              <a:rPr lang="en-CA" dirty="0"/>
+              <a:t>dispatcher$</a:t>
+            </a:r>
+          </a:p>
+        </p:txBody>
+      </p:sp>
+      <p:sp>
+        <p:nvSpPr>
+          <p:cNvPr id="2" name="TextBox 1">
+            <a:extLst>
+              <a:ext uri="{FF2B5EF4-FFF2-40B4-BE49-F238E27FC236}">
+                <a16:creationId xmlns:a16="http://schemas.microsoft.com/office/drawing/2014/main" id="{A7D61732-33D3-88FD-B5EB-9CAA2308384B}"/>
+              </a:ext>
+            </a:extLst>
+          </p:cNvPr>
+          <p:cNvSpPr txBox="1"/>
+          <p:nvPr/>
+        </p:nvSpPr>
+        <p:spPr>
+          <a:xfrm>
+            <a:off x="925706" y="4727273"/>
+            <a:ext cx="1599411" cy="830997"/>
+          </a:xfrm>
+          <a:prstGeom prst="rect">
+            <a:avLst/>
+          </a:prstGeom>
+          <a:noFill/>
+        </p:spPr>
+        <p:txBody>
+          <a:bodyPr wrap="square" rtlCol="0">
+            <a:spAutoFit/>
+          </a:bodyPr>
+          <a:lstStyle/>
+          <a:p>
+            <a:r>
+              <a:rPr lang="en-CA" sz="2400" b="1" dirty="0"/>
+              <a:t>Scoped</a:t>
+            </a:r>
+            <a:r>
+              <a:rPr lang="en-CA" sz="2400" dirty="0"/>
+              <a:t> </a:t>
+            </a:r>
+            <a:r>
+              <a:rPr lang="en-CA" sz="2400" b="1" dirty="0"/>
+              <a:t>Effects</a:t>
+            </a:r>
+          </a:p>
+        </p:txBody>
+      </p:sp>
+      <p:cxnSp>
+        <p:nvCxnSpPr>
+          <p:cNvPr id="4" name="Straight Arrow Connector 3">
+            <a:extLst>
+              <a:ext uri="{FF2B5EF4-FFF2-40B4-BE49-F238E27FC236}">
+                <a16:creationId xmlns:a16="http://schemas.microsoft.com/office/drawing/2014/main" id="{958E179C-8F70-4823-BD02-E5CB52FB3800}"/>
+              </a:ext>
+            </a:extLst>
+          </p:cNvPr>
+          <p:cNvCxnSpPr>
+            <a:cxnSpLocks/>
+          </p:cNvCxnSpPr>
+          <p:nvPr/>
+        </p:nvCxnSpPr>
+        <p:spPr>
+          <a:xfrm flipV="1">
+            <a:off x="1991324" y="4533929"/>
+            <a:ext cx="1472463" cy="338613"/>
+          </a:xfrm>
+          <a:prstGeom prst="straightConnector1">
+            <a:avLst/>
+          </a:prstGeom>
+          <a:ln w="31750">
+            <a:solidFill>
+              <a:schemeClr val="tx1"/>
+            </a:solidFill>
+            <a:tailEnd type="triangle"/>
+          </a:ln>
+        </p:spPr>
+        <p:style>
+          <a:lnRef idx="1">
+            <a:schemeClr val="accent1"/>
+          </a:lnRef>
+          <a:fillRef idx="0">
+            <a:schemeClr val="accent1"/>
+          </a:fillRef>
+          <a:effectRef idx="0">
+            <a:schemeClr val="accent1"/>
+          </a:effectRef>
+          <a:fontRef idx="minor">
+            <a:schemeClr val="tx1"/>
+          </a:fontRef>
+        </p:style>
+      </p:cxnSp>
+      <p:cxnSp>
+        <p:nvCxnSpPr>
+          <p:cNvPr id="8" name="Straight Arrow Connector 7">
+            <a:extLst>
+              <a:ext uri="{FF2B5EF4-FFF2-40B4-BE49-F238E27FC236}">
+                <a16:creationId xmlns:a16="http://schemas.microsoft.com/office/drawing/2014/main" id="{1FD1B516-9FF4-D419-FC4D-9B5D062F11BA}"/>
+              </a:ext>
+            </a:extLst>
+          </p:cNvPr>
+          <p:cNvCxnSpPr>
+            <a:cxnSpLocks/>
+            <a:stCxn id="2" idx="0"/>
+          </p:cNvCxnSpPr>
+          <p:nvPr/>
+        </p:nvCxnSpPr>
+        <p:spPr>
+          <a:xfrm flipV="1">
+            <a:off x="1725412" y="2115090"/>
+            <a:ext cx="2573262" cy="2612183"/>
+          </a:xfrm>
+          <a:prstGeom prst="straightConnector1">
+            <a:avLst/>
+          </a:prstGeom>
+          <a:ln w="31750">
+            <a:solidFill>
+              <a:schemeClr val="tx1"/>
+            </a:solidFill>
+            <a:tailEnd type="triangle"/>
+          </a:ln>
+        </p:spPr>
+        <p:style>
+          <a:lnRef idx="1">
+            <a:schemeClr val="accent1"/>
+          </a:lnRef>
+          <a:fillRef idx="0">
+            <a:schemeClr val="accent1"/>
+          </a:fillRef>
+          <a:effectRef idx="0">
+            <a:schemeClr val="accent1"/>
+          </a:effectRef>
+          <a:fontRef idx="minor">
+            <a:schemeClr val="tx1"/>
+          </a:fontRef>
+        </p:style>
+      </p:cxnSp>
+      <p:sp>
+        <p:nvSpPr>
+          <p:cNvPr id="51" name="Oval 50">
+            <a:extLst>
+              <a:ext uri="{FF2B5EF4-FFF2-40B4-BE49-F238E27FC236}">
+                <a16:creationId xmlns:a16="http://schemas.microsoft.com/office/drawing/2014/main" id="{660D3C66-BD7B-081E-8232-73B6906D34D6}"/>
+              </a:ext>
+            </a:extLst>
+          </p:cNvPr>
+          <p:cNvSpPr/>
+          <p:nvPr/>
+        </p:nvSpPr>
+        <p:spPr>
+          <a:xfrm>
+            <a:off x="2666685" y="1834475"/>
+            <a:ext cx="655495" cy="655495"/>
+          </a:xfrm>
+          <a:prstGeom prst="ellipse">
+            <a:avLst/>
+          </a:prstGeom>
+          <a:solidFill>
+            <a:schemeClr val="accent2">
+              <a:alpha val="50000"/>
+            </a:schemeClr>
+          </a:solidFill>
+        </p:spPr>
+        <p:style>
+          <a:lnRef idx="2">
+            <a:schemeClr val="accent1">
+              <a:shade val="15000"/>
+            </a:schemeClr>
+          </a:lnRef>
+          <a:fillRef idx="1">
+            <a:schemeClr val="accent1"/>
+          </a:fillRef>
+          <a:effectRef idx="0">
+            <a:schemeClr val="accent1"/>
+          </a:effectRef>
+          <a:fontRef idx="minor">
+            <a:schemeClr val="lt1"/>
+          </a:fontRef>
+        </p:style>
+        <p:txBody>
+          <a:bodyPr rtlCol="0" anchor="ctr"/>
+          <a:lstStyle/>
+          <a:p>
+            <a:pPr algn="ctr"/>
+            <a:r>
+              <a:rPr lang="en-CA" sz="1200" dirty="0"/>
+              <a:t>id: 2</a:t>
+            </a:r>
+          </a:p>
+        </p:txBody>
+      </p:sp>
+      <p:sp>
+        <p:nvSpPr>
+          <p:cNvPr id="60" name="TextBox 59">
+            <a:extLst>
+              <a:ext uri="{FF2B5EF4-FFF2-40B4-BE49-F238E27FC236}">
+                <a16:creationId xmlns:a16="http://schemas.microsoft.com/office/drawing/2014/main" id="{B5E2890C-957D-7464-D965-99921E92C017}"/>
+              </a:ext>
+            </a:extLst>
+          </p:cNvPr>
+          <p:cNvSpPr txBox="1"/>
+          <p:nvPr/>
+        </p:nvSpPr>
+        <p:spPr>
+          <a:xfrm>
+            <a:off x="7389635" y="4972378"/>
+            <a:ext cx="3774177" cy="923330"/>
+          </a:xfrm>
+          <a:prstGeom prst="rect">
+            <a:avLst/>
+          </a:prstGeom>
+          <a:solidFill>
+            <a:schemeClr val="bg1"/>
+          </a:solidFill>
+          <a:ln>
+            <a:solidFill>
+              <a:schemeClr val="tx1"/>
+            </a:solidFill>
+          </a:ln>
+        </p:spPr>
+        <p:txBody>
+          <a:bodyPr wrap="square" rtlCol="0">
+            <a:spAutoFit/>
+          </a:bodyPr>
+          <a:lstStyle/>
+          <a:p>
+            <a:r>
+              <a:rPr lang="en-CA" b="1" u="sng" dirty="0">
+                <a:latin typeface="Menlo"/>
+              </a:rPr>
+              <a:t>ACTIONS:</a:t>
+            </a:r>
+          </a:p>
+          <a:p>
+            <a:r>
+              <a:rPr lang="en-CA" b="0" dirty="0">
+                <a:effectLst/>
+                <a:latin typeface="Menlo"/>
+              </a:rPr>
+              <a:t>SEND_TODO_STATUS_UPDATE</a:t>
+            </a:r>
+          </a:p>
+          <a:p>
+            <a:r>
+              <a:rPr lang="en-CA" b="0" dirty="0">
+                <a:effectLst/>
+                <a:latin typeface="Menlo"/>
+              </a:rPr>
+              <a:t>TODO_STATUS_UPDATE_SUCCESS</a:t>
+            </a:r>
+          </a:p>
+        </p:txBody>
+      </p:sp>
+      <p:sp>
+        <p:nvSpPr>
+          <p:cNvPr id="9" name="Oval 8">
+            <a:extLst>
+              <a:ext uri="{FF2B5EF4-FFF2-40B4-BE49-F238E27FC236}">
+                <a16:creationId xmlns:a16="http://schemas.microsoft.com/office/drawing/2014/main" id="{FD0112D8-3EE8-6323-DB30-45F8C325E88E}"/>
+              </a:ext>
+            </a:extLst>
+          </p:cNvPr>
+          <p:cNvSpPr/>
+          <p:nvPr/>
+        </p:nvSpPr>
+        <p:spPr>
+          <a:xfrm>
+            <a:off x="10772713" y="5307399"/>
+            <a:ext cx="200088" cy="200088"/>
+          </a:xfrm>
+          <a:prstGeom prst="ellipse">
+            <a:avLst/>
+          </a:prstGeom>
+          <a:solidFill>
+            <a:schemeClr val="accent2"/>
+          </a:solidFill>
+        </p:spPr>
+        <p:style>
+          <a:lnRef idx="2">
+            <a:schemeClr val="accent1">
+              <a:shade val="15000"/>
+            </a:schemeClr>
+          </a:lnRef>
+          <a:fillRef idx="1">
+            <a:schemeClr val="accent1"/>
+          </a:fillRef>
+          <a:effectRef idx="0">
+            <a:schemeClr val="accent1"/>
+          </a:effectRef>
+          <a:fontRef idx="minor">
+            <a:schemeClr val="lt1"/>
+          </a:fontRef>
+        </p:style>
+        <p:txBody>
+          <a:bodyPr rtlCol="0" anchor="ctr"/>
+          <a:lstStyle/>
+          <a:p>
+            <a:pPr algn="ctr"/>
+            <a:endParaRPr lang="en-CA" sz="1200" dirty="0"/>
+          </a:p>
+        </p:txBody>
+      </p:sp>
+      <p:sp>
+        <p:nvSpPr>
+          <p:cNvPr id="10" name="Oval 9">
+            <a:extLst>
+              <a:ext uri="{FF2B5EF4-FFF2-40B4-BE49-F238E27FC236}">
+                <a16:creationId xmlns:a16="http://schemas.microsoft.com/office/drawing/2014/main" id="{DFCBB72A-06CD-31DA-0874-F1CC80797C85}"/>
+              </a:ext>
+            </a:extLst>
+          </p:cNvPr>
+          <p:cNvSpPr/>
+          <p:nvPr/>
+        </p:nvSpPr>
+        <p:spPr>
+          <a:xfrm>
+            <a:off x="10772712" y="5601553"/>
+            <a:ext cx="200089" cy="200089"/>
+          </a:xfrm>
+          <a:prstGeom prst="ellipse">
+            <a:avLst/>
+          </a:prstGeom>
+          <a:solidFill>
+            <a:schemeClr val="accent3">
+              <a:lumMod val="60000"/>
+              <a:lumOff val="40000"/>
+            </a:schemeClr>
+          </a:solidFill>
+        </p:spPr>
+        <p:style>
+          <a:lnRef idx="2">
+            <a:schemeClr val="accent1">
+              <a:shade val="15000"/>
+            </a:schemeClr>
+          </a:lnRef>
+          <a:fillRef idx="1">
+            <a:schemeClr val="accent1"/>
+          </a:fillRef>
+          <a:effectRef idx="0">
+            <a:schemeClr val="accent1"/>
+          </a:effectRef>
+          <a:fontRef idx="minor">
+            <a:schemeClr val="lt1"/>
+          </a:fontRef>
+        </p:style>
+        <p:txBody>
+          <a:bodyPr rtlCol="0" anchor="ctr"/>
+          <a:lstStyle/>
+          <a:p>
+            <a:pPr algn="ctr"/>
+            <a:endParaRPr lang="en-CA" sz="1200" dirty="0"/>
+          </a:p>
+        </p:txBody>
+      </p:sp>
+      <p:sp>
+        <p:nvSpPr>
+          <p:cNvPr id="11" name="Rectangle 10">
+            <a:extLst>
+              <a:ext uri="{FF2B5EF4-FFF2-40B4-BE49-F238E27FC236}">
+                <a16:creationId xmlns:a16="http://schemas.microsoft.com/office/drawing/2014/main" id="{E9A4B9C8-593A-939A-36A1-98BFDF6AB8E9}"/>
+              </a:ext>
+            </a:extLst>
+          </p:cNvPr>
+          <p:cNvSpPr/>
+          <p:nvPr/>
+        </p:nvSpPr>
+        <p:spPr>
+          <a:xfrm>
+            <a:off x="3271321" y="203752"/>
+            <a:ext cx="5162031" cy="805556"/>
+          </a:xfrm>
+          <a:prstGeom prst="rect">
+            <a:avLst/>
+          </a:prstGeom>
+          <a:noFill/>
+          <a:ln>
+            <a:noFill/>
+          </a:ln>
+        </p:spPr>
+        <p:style>
+          <a:lnRef idx="2">
+            <a:schemeClr val="accent1">
+              <a:shade val="15000"/>
+            </a:schemeClr>
+          </a:lnRef>
+          <a:fillRef idx="1">
+            <a:schemeClr val="accent1"/>
+          </a:fillRef>
+          <a:effectRef idx="0">
+            <a:schemeClr val="accent1"/>
+          </a:effectRef>
+          <a:fontRef idx="minor">
+            <a:schemeClr val="lt1"/>
+          </a:fontRef>
+        </p:style>
+        <p:txBody>
+          <a:bodyPr rtlCol="0" anchor="ctr"/>
+          <a:lstStyle/>
+          <a:p>
+            <a:pPr algn="ctr"/>
+            <a:endParaRPr lang="en-CA"/>
+          </a:p>
+        </p:txBody>
+      </p:sp>
+      <p:sp>
+        <p:nvSpPr>
+          <p:cNvPr id="12" name="TextBox 11">
+            <a:extLst>
+              <a:ext uri="{FF2B5EF4-FFF2-40B4-BE49-F238E27FC236}">
+                <a16:creationId xmlns:a16="http://schemas.microsoft.com/office/drawing/2014/main" id="{CB738077-26B8-619E-BCCD-0F6F63CDC0A0}"/>
+              </a:ext>
+            </a:extLst>
+          </p:cNvPr>
+          <p:cNvSpPr txBox="1"/>
+          <p:nvPr/>
+        </p:nvSpPr>
+        <p:spPr>
+          <a:xfrm>
+            <a:off x="1982997" y="263257"/>
+            <a:ext cx="7091260" cy="523220"/>
+          </a:xfrm>
+          <a:prstGeom prst="rect">
+            <a:avLst/>
+          </a:prstGeom>
+          <a:noFill/>
+        </p:spPr>
+        <p:txBody>
+          <a:bodyPr wrap="square" rtlCol="0">
+            <a:spAutoFit/>
+          </a:bodyPr>
+          <a:lstStyle/>
+          <a:p>
+            <a:r>
+              <a:rPr lang="en-CA" sz="2800" dirty="0"/>
+              <a:t>Scoped Effects Example – Todo Status Updates</a:t>
+            </a:r>
+          </a:p>
+        </p:txBody>
+      </p:sp>
+    </p:spTree>
+    <p:extLst>
+      <p:ext uri="{BB962C8B-B14F-4D97-AF65-F5344CB8AC3E}">
+        <p14:creationId xmlns:p14="http://schemas.microsoft.com/office/powerpoint/2010/main" val="1060560496"/>
+      </p:ext>
+    </p:extLst>
+  </p:cSld>
+  <p:clrMapOvr>
+    <a:masterClrMapping/>
+  </p:clrMapOvr>
+</p:sld>
+</file>
+
+<file path=ppt/slides/slide13.xml><?xml version="1.0" encoding="utf-8"?>
+<p:sld xmlns:a="http://schemas.openxmlformats.org/drawingml/2006/main" xmlns:r="http://schemas.openxmlformats.org/officeDocument/2006/relationships" xmlns:p="http://schemas.openxmlformats.org/presentationml/2006/main">
+  <p:cSld>
+    <p:spTree>
+      <p:nvGrpSpPr>
+        <p:cNvPr id="1" name=""/>
+        <p:cNvGrpSpPr/>
+        <p:nvPr/>
+      </p:nvGrpSpPr>
+      <p:grpSpPr>
+        <a:xfrm>
+          <a:off x="0" y="0"/>
+          <a:ext cx="0" cy="0"/>
+          <a:chOff x="0" y="0"/>
+          <a:chExt cx="0" cy="0"/>
+        </a:xfrm>
+      </p:grpSpPr>
+      <p:sp>
+        <p:nvSpPr>
+          <p:cNvPr id="7" name="Rectangle: Rounded Corners 6">
+            <a:extLst>
+              <a:ext uri="{FF2B5EF4-FFF2-40B4-BE49-F238E27FC236}">
+                <a16:creationId xmlns:a16="http://schemas.microsoft.com/office/drawing/2014/main" id="{3356D45B-3EE1-591C-F3F7-9FF8420FF555}"/>
+              </a:ext>
+            </a:extLst>
+          </p:cNvPr>
+          <p:cNvSpPr/>
+          <p:nvPr/>
+        </p:nvSpPr>
+        <p:spPr>
+          <a:xfrm>
+            <a:off x="3266338" y="899179"/>
+            <a:ext cx="2684930" cy="4911626"/>
+          </a:xfrm>
+          <a:prstGeom prst="roundRect">
+            <a:avLst/>
+          </a:prstGeom>
+          <a:solidFill>
+            <a:schemeClr val="accent6">
+              <a:lumMod val="20000"/>
+              <a:lumOff val="80000"/>
+              <a:alpha val="50000"/>
+            </a:schemeClr>
+          </a:solidFill>
+        </p:spPr>
+        <p:style>
+          <a:lnRef idx="2">
+            <a:schemeClr val="accent1">
+              <a:shade val="15000"/>
+            </a:schemeClr>
+          </a:lnRef>
+          <a:fillRef idx="1">
+            <a:schemeClr val="accent1"/>
+          </a:fillRef>
+          <a:effectRef idx="0">
+            <a:schemeClr val="accent1"/>
+          </a:effectRef>
+          <a:fontRef idx="minor">
+            <a:schemeClr val="lt1"/>
+          </a:fontRef>
+        </p:style>
+        <p:txBody>
+          <a:bodyPr rtlCol="0" anchor="ctr"/>
+          <a:lstStyle/>
+          <a:p>
+            <a:endParaRPr lang="en-CA" dirty="0"/>
+          </a:p>
+        </p:txBody>
+      </p:sp>
+      <p:sp>
+        <p:nvSpPr>
+          <p:cNvPr id="106" name="Rectangle: Rounded Corners 105">
+            <a:extLst>
+              <a:ext uri="{FF2B5EF4-FFF2-40B4-BE49-F238E27FC236}">
+                <a16:creationId xmlns:a16="http://schemas.microsoft.com/office/drawing/2014/main" id="{522C20D7-71E7-4B9E-4B83-48DDC36B85DB}"/>
+              </a:ext>
+            </a:extLst>
+          </p:cNvPr>
+          <p:cNvSpPr/>
+          <p:nvPr/>
+        </p:nvSpPr>
+        <p:spPr>
+          <a:xfrm>
+            <a:off x="9310139" y="779969"/>
+            <a:ext cx="2684930" cy="4911626"/>
+          </a:xfrm>
+          <a:prstGeom prst="roundRect">
+            <a:avLst/>
+          </a:prstGeom>
+          <a:solidFill>
+            <a:schemeClr val="accent6">
+              <a:lumMod val="20000"/>
+              <a:lumOff val="80000"/>
+              <a:alpha val="50000"/>
+            </a:schemeClr>
+          </a:solidFill>
+        </p:spPr>
+        <p:style>
+          <a:lnRef idx="2">
+            <a:schemeClr val="accent1">
+              <a:shade val="15000"/>
+            </a:schemeClr>
+          </a:lnRef>
+          <a:fillRef idx="1">
+            <a:schemeClr val="accent1"/>
+          </a:fillRef>
+          <a:effectRef idx="0">
+            <a:schemeClr val="accent1"/>
+          </a:effectRef>
+          <a:fontRef idx="minor">
+            <a:schemeClr val="lt1"/>
+          </a:fontRef>
+        </p:style>
+        <p:txBody>
+          <a:bodyPr rtlCol="0" anchor="ctr"/>
+          <a:lstStyle/>
+          <a:p>
+            <a:endParaRPr lang="en-CA" dirty="0"/>
+          </a:p>
+        </p:txBody>
+      </p:sp>
+      <p:sp>
+        <p:nvSpPr>
+          <p:cNvPr id="40" name="Rectangle: Rounded Corners 39">
+            <a:extLst>
+              <a:ext uri="{FF2B5EF4-FFF2-40B4-BE49-F238E27FC236}">
+                <a16:creationId xmlns:a16="http://schemas.microsoft.com/office/drawing/2014/main" id="{8E086B6F-71B7-4D46-89D4-113CE772AAE6}"/>
+              </a:ext>
+            </a:extLst>
+          </p:cNvPr>
+          <p:cNvSpPr/>
+          <p:nvPr/>
+        </p:nvSpPr>
+        <p:spPr>
+          <a:xfrm>
+            <a:off x="9744394" y="2604021"/>
+            <a:ext cx="2106592" cy="1549542"/>
+          </a:xfrm>
+          <a:prstGeom prst="roundRect">
+            <a:avLst/>
+          </a:prstGeom>
+          <a:solidFill>
+            <a:schemeClr val="accent4">
+              <a:lumMod val="20000"/>
+              <a:lumOff val="80000"/>
+            </a:schemeClr>
+          </a:solidFill>
+        </p:spPr>
+        <p:style>
+          <a:lnRef idx="2">
+            <a:schemeClr val="accent1">
+              <a:shade val="15000"/>
+            </a:schemeClr>
+          </a:lnRef>
+          <a:fillRef idx="1">
+            <a:schemeClr val="accent1"/>
+          </a:fillRef>
+          <a:effectRef idx="0">
+            <a:schemeClr val="accent1"/>
+          </a:effectRef>
+          <a:fontRef idx="minor">
+            <a:schemeClr val="lt1"/>
+          </a:fontRef>
+        </p:style>
+        <p:txBody>
+          <a:bodyPr rtlCol="0" anchor="ctr"/>
+          <a:lstStyle/>
+          <a:p>
+            <a:pPr algn="ctr"/>
+            <a:r>
+              <a:rPr lang="en-CA" sz="2000" dirty="0">
+                <a:solidFill>
+                  <a:schemeClr val="tx1"/>
+                </a:solidFill>
+              </a:rPr>
+              <a:t>Store for Price Information</a:t>
+            </a:r>
+          </a:p>
+        </p:txBody>
+      </p:sp>
+      <p:sp>
+        <p:nvSpPr>
+          <p:cNvPr id="3" name="Rectangle: Rounded Corners 2">
+            <a:extLst>
+              <a:ext uri="{FF2B5EF4-FFF2-40B4-BE49-F238E27FC236}">
+                <a16:creationId xmlns:a16="http://schemas.microsoft.com/office/drawing/2014/main" id="{6E67614B-2C9E-2399-1C9E-308A7761CCA3}"/>
+              </a:ext>
+            </a:extLst>
+          </p:cNvPr>
+          <p:cNvSpPr/>
+          <p:nvPr/>
+        </p:nvSpPr>
+        <p:spPr>
+          <a:xfrm>
+            <a:off x="3358697" y="2604021"/>
+            <a:ext cx="2396672" cy="1549542"/>
+          </a:xfrm>
+          <a:prstGeom prst="roundRect">
+            <a:avLst/>
+          </a:prstGeom>
+          <a:solidFill>
+            <a:schemeClr val="accent4">
+              <a:lumMod val="20000"/>
+              <a:lumOff val="80000"/>
+            </a:schemeClr>
+          </a:solidFill>
+        </p:spPr>
+        <p:style>
+          <a:lnRef idx="2">
+            <a:schemeClr val="accent1">
+              <a:shade val="15000"/>
+            </a:schemeClr>
+          </a:lnRef>
+          <a:fillRef idx="1">
+            <a:schemeClr val="accent1"/>
+          </a:fillRef>
+          <a:effectRef idx="0">
+            <a:schemeClr val="accent1"/>
+          </a:effectRef>
+          <a:fontRef idx="minor">
+            <a:schemeClr val="lt1"/>
+          </a:fontRef>
+        </p:style>
+        <p:txBody>
+          <a:bodyPr rtlCol="0" anchor="ctr"/>
+          <a:lstStyle/>
+          <a:p>
+            <a:pPr algn="ctr"/>
+            <a:r>
+              <a:rPr lang="en-CA" sz="2000" dirty="0">
+                <a:solidFill>
+                  <a:schemeClr val="tx1"/>
+                </a:solidFill>
+              </a:rPr>
+              <a:t>Store for User Controls State</a:t>
+            </a:r>
+          </a:p>
+        </p:txBody>
+      </p:sp>
+      <p:cxnSp>
+        <p:nvCxnSpPr>
+          <p:cNvPr id="2" name="Straight Arrow Connector 1">
+            <a:extLst>
+              <a:ext uri="{FF2B5EF4-FFF2-40B4-BE49-F238E27FC236}">
+                <a16:creationId xmlns:a16="http://schemas.microsoft.com/office/drawing/2014/main" id="{3A085252-946F-A6D4-FB17-D3092B4BA9B8}"/>
+              </a:ext>
+            </a:extLst>
+          </p:cNvPr>
+          <p:cNvCxnSpPr>
+            <a:cxnSpLocks/>
+          </p:cNvCxnSpPr>
+          <p:nvPr/>
+        </p:nvCxnSpPr>
+        <p:spPr>
+          <a:xfrm>
+            <a:off x="297180" y="3378792"/>
+            <a:ext cx="3502660" cy="14329"/>
+          </a:xfrm>
+          <a:prstGeom prst="straightConnector1">
+            <a:avLst/>
+          </a:prstGeom>
+          <a:ln w="34925">
+            <a:tailEnd type="arrow"/>
+          </a:ln>
+        </p:spPr>
+        <p:style>
+          <a:lnRef idx="1">
+            <a:schemeClr val="accent1"/>
+          </a:lnRef>
+          <a:fillRef idx="0">
+            <a:schemeClr val="accent1"/>
+          </a:fillRef>
+          <a:effectRef idx="0">
+            <a:schemeClr val="accent1"/>
+          </a:effectRef>
+          <a:fontRef idx="minor">
+            <a:schemeClr val="tx1"/>
+          </a:fontRef>
+        </p:style>
+      </p:cxnSp>
+      <p:sp>
+        <p:nvSpPr>
+          <p:cNvPr id="4" name="Oval 3">
+            <a:extLst>
+              <a:ext uri="{FF2B5EF4-FFF2-40B4-BE49-F238E27FC236}">
+                <a16:creationId xmlns:a16="http://schemas.microsoft.com/office/drawing/2014/main" id="{1AC4A9FF-4ACA-E7BB-1510-75A2490F3132}"/>
+              </a:ext>
+            </a:extLst>
+          </p:cNvPr>
+          <p:cNvSpPr/>
+          <p:nvPr/>
+        </p:nvSpPr>
+        <p:spPr>
+          <a:xfrm>
+            <a:off x="2487276" y="3178224"/>
+            <a:ext cx="353536" cy="353536"/>
+          </a:xfrm>
+          <a:prstGeom prst="ellipse">
+            <a:avLst/>
+          </a:prstGeom>
+          <a:solidFill>
+            <a:schemeClr val="accent6">
+              <a:lumMod val="40000"/>
+              <a:lumOff val="60000"/>
+            </a:schemeClr>
+          </a:solidFill>
+        </p:spPr>
+        <p:style>
+          <a:lnRef idx="2">
+            <a:schemeClr val="accent1">
+              <a:shade val="15000"/>
+            </a:schemeClr>
+          </a:lnRef>
+          <a:fillRef idx="1">
+            <a:schemeClr val="accent1"/>
+          </a:fillRef>
+          <a:effectRef idx="0">
+            <a:schemeClr val="accent1"/>
+          </a:effectRef>
+          <a:fontRef idx="minor">
+            <a:schemeClr val="lt1"/>
+          </a:fontRef>
+        </p:style>
+        <p:txBody>
+          <a:bodyPr rtlCol="0" anchor="ctr"/>
+          <a:lstStyle/>
+          <a:p>
+            <a:pPr algn="ctr"/>
+            <a:endParaRPr lang="en-CA"/>
+          </a:p>
+        </p:txBody>
+      </p:sp>
+      <p:sp>
+        <p:nvSpPr>
+          <p:cNvPr id="5" name="TextBox 4">
+            <a:extLst>
+              <a:ext uri="{FF2B5EF4-FFF2-40B4-BE49-F238E27FC236}">
+                <a16:creationId xmlns:a16="http://schemas.microsoft.com/office/drawing/2014/main" id="{7E441CD8-4EF4-F3D2-CE95-D1348DBD1DF7}"/>
+              </a:ext>
+            </a:extLst>
+          </p:cNvPr>
+          <p:cNvSpPr txBox="1"/>
+          <p:nvPr/>
+        </p:nvSpPr>
+        <p:spPr>
+          <a:xfrm>
+            <a:off x="2523575" y="278885"/>
+            <a:ext cx="7770258" cy="523220"/>
+          </a:xfrm>
+          <a:prstGeom prst="rect">
+            <a:avLst/>
+          </a:prstGeom>
+          <a:noFill/>
+        </p:spPr>
+        <p:txBody>
+          <a:bodyPr wrap="square" rtlCol="0">
+            <a:spAutoFit/>
+          </a:bodyPr>
+          <a:lstStyle/>
+          <a:p>
+            <a:r>
+              <a:rPr lang="en-CA" sz="2800" dirty="0"/>
+              <a:t>Connecting Multiple Hubs Example – Event Prices</a:t>
+            </a:r>
+          </a:p>
+        </p:txBody>
+      </p:sp>
+      <p:sp>
+        <p:nvSpPr>
+          <p:cNvPr id="6" name="Oval 5">
+            <a:extLst>
+              <a:ext uri="{FF2B5EF4-FFF2-40B4-BE49-F238E27FC236}">
+                <a16:creationId xmlns:a16="http://schemas.microsoft.com/office/drawing/2014/main" id="{436EAF86-D283-1961-C89C-2D5F386D1E47}"/>
+              </a:ext>
+            </a:extLst>
+          </p:cNvPr>
+          <p:cNvSpPr/>
+          <p:nvPr/>
+        </p:nvSpPr>
+        <p:spPr>
+          <a:xfrm>
+            <a:off x="177452" y="2289946"/>
+            <a:ext cx="3113155" cy="2152036"/>
+          </a:xfrm>
+          <a:prstGeom prst="ellipse">
+            <a:avLst/>
+          </a:prstGeom>
+          <a:noFill/>
+          <a:ln w="38100">
+            <a:prstDash val="lgDash"/>
+          </a:ln>
+        </p:spPr>
+        <p:style>
+          <a:lnRef idx="2">
+            <a:schemeClr val="accent1">
+              <a:shade val="15000"/>
+            </a:schemeClr>
+          </a:lnRef>
+          <a:fillRef idx="1">
+            <a:schemeClr val="accent1"/>
+          </a:fillRef>
+          <a:effectRef idx="0">
+            <a:schemeClr val="accent1"/>
+          </a:effectRef>
+          <a:fontRef idx="minor">
+            <a:schemeClr val="lt1"/>
+          </a:fontRef>
+        </p:style>
+        <p:txBody>
+          <a:bodyPr rtlCol="0" anchor="ctr"/>
+          <a:lstStyle/>
+          <a:p>
+            <a:pPr algn="ctr"/>
+            <a:endParaRPr lang="en-CA"/>
+          </a:p>
+        </p:txBody>
+      </p:sp>
+      <p:sp>
+        <p:nvSpPr>
+          <p:cNvPr id="9" name="TextBox 8">
+            <a:extLst>
+              <a:ext uri="{FF2B5EF4-FFF2-40B4-BE49-F238E27FC236}">
+                <a16:creationId xmlns:a16="http://schemas.microsoft.com/office/drawing/2014/main" id="{B07FF30A-5260-F5B2-71A9-8AF2C7E14F6D}"/>
+              </a:ext>
+            </a:extLst>
+          </p:cNvPr>
+          <p:cNvSpPr txBox="1"/>
+          <p:nvPr/>
+        </p:nvSpPr>
+        <p:spPr>
+          <a:xfrm>
+            <a:off x="544126" y="4624233"/>
+            <a:ext cx="2558362" cy="800219"/>
+          </a:xfrm>
+          <a:prstGeom prst="rect">
+            <a:avLst/>
+          </a:prstGeom>
+          <a:solidFill>
+            <a:schemeClr val="bg1"/>
+          </a:solidFill>
+          <a:ln>
+            <a:solidFill>
+              <a:schemeClr val="accent1">
+                <a:shade val="15000"/>
+              </a:schemeClr>
+            </a:solidFill>
+          </a:ln>
+        </p:spPr>
+        <p:txBody>
+          <a:bodyPr wrap="square" rtlCol="0">
+            <a:spAutoFit/>
+          </a:bodyPr>
+          <a:lstStyle/>
+          <a:p>
+            <a:pPr algn="ctr"/>
+            <a:r>
+              <a:rPr lang="en-CA" dirty="0"/>
+              <a:t>Dispatcher (User) Actions</a:t>
+            </a:r>
+            <a:endParaRPr lang="en-CA" sz="1400" dirty="0"/>
+          </a:p>
+          <a:p>
+            <a:r>
+              <a:rPr lang="en-CA" sz="1400" dirty="0"/>
+              <a:t>SELECT_EVENT</a:t>
+            </a:r>
+          </a:p>
+          <a:p>
+            <a:r>
+              <a:rPr lang="en-CA" sz="1400" dirty="0"/>
+              <a:t>SET_QTY</a:t>
+            </a:r>
+          </a:p>
+        </p:txBody>
+      </p:sp>
+      <p:sp>
+        <p:nvSpPr>
+          <p:cNvPr id="12" name="Oval 11">
+            <a:extLst>
+              <a:ext uri="{FF2B5EF4-FFF2-40B4-BE49-F238E27FC236}">
+                <a16:creationId xmlns:a16="http://schemas.microsoft.com/office/drawing/2014/main" id="{98E8350D-B40F-136C-9B26-A5FF6B9CEFD3}"/>
+              </a:ext>
+            </a:extLst>
+          </p:cNvPr>
+          <p:cNvSpPr/>
+          <p:nvPr/>
+        </p:nvSpPr>
+        <p:spPr>
+          <a:xfrm>
+            <a:off x="563006" y="3178224"/>
+            <a:ext cx="355106" cy="355106"/>
+          </a:xfrm>
+          <a:prstGeom prst="ellipse">
+            <a:avLst/>
+          </a:prstGeom>
+          <a:solidFill>
+            <a:schemeClr val="bg2"/>
+          </a:solidFill>
+        </p:spPr>
+        <p:style>
+          <a:lnRef idx="2">
+            <a:schemeClr val="accent1">
+              <a:shade val="15000"/>
+            </a:schemeClr>
+          </a:lnRef>
+          <a:fillRef idx="1">
+            <a:schemeClr val="accent1"/>
+          </a:fillRef>
+          <a:effectRef idx="0">
+            <a:schemeClr val="accent1"/>
+          </a:effectRef>
+          <a:fontRef idx="minor">
+            <a:schemeClr val="lt1"/>
+          </a:fontRef>
+        </p:style>
+        <p:txBody>
+          <a:bodyPr rtlCol="0" anchor="ctr"/>
+          <a:lstStyle/>
+          <a:p>
+            <a:pPr algn="ctr"/>
+            <a:endParaRPr lang="en-CA"/>
+          </a:p>
+        </p:txBody>
+      </p:sp>
+      <p:cxnSp>
+        <p:nvCxnSpPr>
+          <p:cNvPr id="35" name="Straight Arrow Connector 34">
+            <a:extLst>
+              <a:ext uri="{FF2B5EF4-FFF2-40B4-BE49-F238E27FC236}">
+                <a16:creationId xmlns:a16="http://schemas.microsoft.com/office/drawing/2014/main" id="{F5770EE1-A1D0-3016-EBC2-8E30A07EA51A}"/>
+              </a:ext>
+            </a:extLst>
+          </p:cNvPr>
+          <p:cNvCxnSpPr>
+            <a:cxnSpLocks/>
+            <a:stCxn id="3" idx="3"/>
+          </p:cNvCxnSpPr>
+          <p:nvPr/>
+        </p:nvCxnSpPr>
+        <p:spPr>
+          <a:xfrm>
+            <a:off x="5755369" y="3378792"/>
+            <a:ext cx="4709431" cy="23860"/>
+          </a:xfrm>
+          <a:prstGeom prst="straightConnector1">
+            <a:avLst/>
+          </a:prstGeom>
+          <a:ln w="34925">
+            <a:solidFill>
+              <a:schemeClr val="accent6">
+                <a:lumMod val="60000"/>
+                <a:lumOff val="40000"/>
+              </a:schemeClr>
+            </a:solidFill>
+            <a:tailEnd type="arrow"/>
+          </a:ln>
+        </p:spPr>
+        <p:style>
+          <a:lnRef idx="1">
+            <a:schemeClr val="accent1"/>
+          </a:lnRef>
+          <a:fillRef idx="0">
+            <a:schemeClr val="accent1"/>
+          </a:fillRef>
+          <a:effectRef idx="0">
+            <a:schemeClr val="accent1"/>
+          </a:effectRef>
+          <a:fontRef idx="minor">
+            <a:schemeClr val="tx1"/>
+          </a:fontRef>
+        </p:style>
+      </p:cxnSp>
+      <p:sp>
+        <p:nvSpPr>
+          <p:cNvPr id="37" name="Oval 36">
+            <a:extLst>
+              <a:ext uri="{FF2B5EF4-FFF2-40B4-BE49-F238E27FC236}">
+                <a16:creationId xmlns:a16="http://schemas.microsoft.com/office/drawing/2014/main" id="{32A74E61-AAB7-331B-13A6-0FFC63FC63D6}"/>
+              </a:ext>
+            </a:extLst>
+          </p:cNvPr>
+          <p:cNvSpPr/>
+          <p:nvPr/>
+        </p:nvSpPr>
+        <p:spPr>
+          <a:xfrm>
+            <a:off x="6073829" y="2235200"/>
+            <a:ext cx="3168220" cy="2386029"/>
+          </a:xfrm>
+          <a:prstGeom prst="ellipse">
+            <a:avLst/>
+          </a:prstGeom>
+          <a:noFill/>
+          <a:ln w="38100">
+            <a:prstDash val="lgDash"/>
+          </a:ln>
+        </p:spPr>
+        <p:style>
+          <a:lnRef idx="2">
+            <a:schemeClr val="accent1">
+              <a:shade val="15000"/>
+            </a:schemeClr>
+          </a:lnRef>
+          <a:fillRef idx="1">
+            <a:schemeClr val="accent1"/>
+          </a:fillRef>
+          <a:effectRef idx="0">
+            <a:schemeClr val="accent1"/>
+          </a:effectRef>
+          <a:fontRef idx="minor">
+            <a:schemeClr val="lt1"/>
+          </a:fontRef>
+        </p:style>
+        <p:txBody>
+          <a:bodyPr rtlCol="0" anchor="ctr"/>
+          <a:lstStyle/>
+          <a:p>
+            <a:pPr algn="ctr"/>
+            <a:endParaRPr lang="en-CA"/>
+          </a:p>
+        </p:txBody>
+      </p:sp>
+      <p:sp>
+        <p:nvSpPr>
+          <p:cNvPr id="54" name="Oval 53">
+            <a:extLst>
+              <a:ext uri="{FF2B5EF4-FFF2-40B4-BE49-F238E27FC236}">
+                <a16:creationId xmlns:a16="http://schemas.microsoft.com/office/drawing/2014/main" id="{CE06762A-D69D-D849-D40D-FCB920C1E8D1}"/>
+              </a:ext>
+            </a:extLst>
+          </p:cNvPr>
+          <p:cNvSpPr/>
+          <p:nvPr/>
+        </p:nvSpPr>
+        <p:spPr>
+          <a:xfrm>
+            <a:off x="5911151" y="3217723"/>
+            <a:ext cx="350797" cy="350797"/>
+          </a:xfrm>
+          <a:prstGeom prst="ellipse">
+            <a:avLst/>
+          </a:prstGeom>
+          <a:solidFill>
+            <a:schemeClr val="accent1">
+              <a:lumMod val="60000"/>
+              <a:lumOff val="40000"/>
+              <a:alpha val="50000"/>
+            </a:schemeClr>
+          </a:solidFill>
+        </p:spPr>
+        <p:style>
+          <a:lnRef idx="2">
+            <a:schemeClr val="accent1">
+              <a:shade val="15000"/>
+            </a:schemeClr>
+          </a:lnRef>
+          <a:fillRef idx="1">
+            <a:schemeClr val="accent1"/>
+          </a:fillRef>
+          <a:effectRef idx="0">
+            <a:schemeClr val="accent1"/>
+          </a:effectRef>
+          <a:fontRef idx="minor">
+            <a:schemeClr val="lt1"/>
+          </a:fontRef>
+        </p:style>
+        <p:txBody>
+          <a:bodyPr rtlCol="0" anchor="ctr"/>
+          <a:lstStyle/>
+          <a:p>
+            <a:pPr algn="ctr"/>
+            <a:endParaRPr lang="en-CA"/>
+          </a:p>
+        </p:txBody>
+      </p:sp>
+      <p:sp>
+        <p:nvSpPr>
+          <p:cNvPr id="60" name="TextBox 59">
+            <a:extLst>
+              <a:ext uri="{FF2B5EF4-FFF2-40B4-BE49-F238E27FC236}">
+                <a16:creationId xmlns:a16="http://schemas.microsoft.com/office/drawing/2014/main" id="{CE614C56-C033-600E-FCF9-11D9B8C46C63}"/>
+              </a:ext>
+            </a:extLst>
+          </p:cNvPr>
+          <p:cNvSpPr txBox="1"/>
+          <p:nvPr/>
+        </p:nvSpPr>
+        <p:spPr>
+          <a:xfrm>
+            <a:off x="1198669" y="3205727"/>
+            <a:ext cx="1117812" cy="307777"/>
+          </a:xfrm>
+          <a:prstGeom prst="rect">
+            <a:avLst/>
+          </a:prstGeom>
+          <a:solidFill>
+            <a:schemeClr val="bg1"/>
+          </a:solidFill>
+          <a:ln>
+            <a:solidFill>
+              <a:schemeClr val="accent1">
+                <a:shade val="15000"/>
+              </a:schemeClr>
+            </a:solidFill>
+          </a:ln>
+        </p:spPr>
+        <p:txBody>
+          <a:bodyPr wrap="square" rtlCol="0">
+            <a:spAutoFit/>
+          </a:bodyPr>
+          <a:lstStyle/>
+          <a:p>
+            <a:pPr algn="ctr"/>
+            <a:r>
+              <a:rPr lang="en-CA" sz="1400" dirty="0"/>
+              <a:t>dispatcher$</a:t>
+            </a:r>
+          </a:p>
+        </p:txBody>
+      </p:sp>
+      <p:sp>
+        <p:nvSpPr>
+          <p:cNvPr id="63" name="TextBox 62">
+            <a:extLst>
+              <a:ext uri="{FF2B5EF4-FFF2-40B4-BE49-F238E27FC236}">
+                <a16:creationId xmlns:a16="http://schemas.microsoft.com/office/drawing/2014/main" id="{4C8DF126-D70D-8E4D-5899-6C2301DB73B6}"/>
+              </a:ext>
+            </a:extLst>
+          </p:cNvPr>
+          <p:cNvSpPr txBox="1"/>
+          <p:nvPr/>
+        </p:nvSpPr>
+        <p:spPr>
+          <a:xfrm>
+            <a:off x="6842720" y="3216827"/>
+            <a:ext cx="2051386" cy="307777"/>
+          </a:xfrm>
+          <a:prstGeom prst="rect">
+            <a:avLst/>
+          </a:prstGeom>
+          <a:solidFill>
+            <a:schemeClr val="bg1"/>
+          </a:solidFill>
+          <a:ln>
+            <a:solidFill>
+              <a:schemeClr val="accent1">
+                <a:shade val="15000"/>
+              </a:schemeClr>
+            </a:solidFill>
+          </a:ln>
+        </p:spPr>
+        <p:txBody>
+          <a:bodyPr wrap="square" rtlCol="0">
+            <a:spAutoFit/>
+          </a:bodyPr>
+          <a:lstStyle/>
+          <a:p>
+            <a:pPr algn="ctr"/>
+            <a:r>
+              <a:rPr lang="en-CA" sz="1400" dirty="0" err="1"/>
+              <a:t>sourceForPriceInfoHub</a:t>
+            </a:r>
+            <a:r>
+              <a:rPr lang="en-CA" sz="1400" dirty="0"/>
+              <a:t>$</a:t>
+            </a:r>
+          </a:p>
+        </p:txBody>
+      </p:sp>
+      <p:sp>
+        <p:nvSpPr>
+          <p:cNvPr id="65" name="TextBox 64">
+            <a:extLst>
+              <a:ext uri="{FF2B5EF4-FFF2-40B4-BE49-F238E27FC236}">
+                <a16:creationId xmlns:a16="http://schemas.microsoft.com/office/drawing/2014/main" id="{A72DD2CC-A92D-90EB-3CC1-EB6AFC05D83A}"/>
+              </a:ext>
+            </a:extLst>
+          </p:cNvPr>
+          <p:cNvSpPr txBox="1"/>
+          <p:nvPr/>
+        </p:nvSpPr>
+        <p:spPr>
+          <a:xfrm>
+            <a:off x="5990817" y="1722972"/>
+            <a:ext cx="3069863" cy="369332"/>
+          </a:xfrm>
+          <a:prstGeom prst="rect">
+            <a:avLst/>
+          </a:prstGeom>
+          <a:noFill/>
+        </p:spPr>
+        <p:txBody>
+          <a:bodyPr wrap="square" rtlCol="0">
+            <a:spAutoFit/>
+          </a:bodyPr>
+          <a:lstStyle/>
+          <a:p>
+            <a:r>
+              <a:rPr lang="en-CA" dirty="0"/>
+              <a:t>Hub 2 – Fetch Price for Event</a:t>
+            </a:r>
+          </a:p>
+        </p:txBody>
+      </p:sp>
+      <p:sp>
+        <p:nvSpPr>
+          <p:cNvPr id="66" name="TextBox 65">
+            <a:extLst>
+              <a:ext uri="{FF2B5EF4-FFF2-40B4-BE49-F238E27FC236}">
+                <a16:creationId xmlns:a16="http://schemas.microsoft.com/office/drawing/2014/main" id="{A0FE41AB-6FF8-F3EA-DDAC-BE7405DFE942}"/>
+              </a:ext>
+            </a:extLst>
+          </p:cNvPr>
+          <p:cNvSpPr txBox="1"/>
+          <p:nvPr/>
+        </p:nvSpPr>
+        <p:spPr>
+          <a:xfrm>
+            <a:off x="496177" y="1196246"/>
+            <a:ext cx="2910052" cy="923330"/>
+          </a:xfrm>
+          <a:prstGeom prst="rect">
+            <a:avLst/>
+          </a:prstGeom>
+          <a:noFill/>
+        </p:spPr>
+        <p:txBody>
+          <a:bodyPr wrap="square" rtlCol="0">
+            <a:spAutoFit/>
+          </a:bodyPr>
+          <a:lstStyle/>
+          <a:p>
+            <a:r>
+              <a:rPr lang="en-CA" dirty="0"/>
+              <a:t>Hub 1 – User Controls </a:t>
+            </a:r>
+          </a:p>
+          <a:p>
+            <a:r>
+              <a:rPr lang="en-CA" dirty="0"/>
+              <a:t>Event Selection </a:t>
+            </a:r>
+          </a:p>
+          <a:p>
+            <a:r>
+              <a:rPr lang="en-CA" dirty="0"/>
+              <a:t>Ticket Quantity</a:t>
+            </a:r>
+          </a:p>
+        </p:txBody>
+      </p:sp>
+      <p:sp>
+        <p:nvSpPr>
+          <p:cNvPr id="68" name="Arc 67">
+            <a:extLst>
+              <a:ext uri="{FF2B5EF4-FFF2-40B4-BE49-F238E27FC236}">
+                <a16:creationId xmlns:a16="http://schemas.microsoft.com/office/drawing/2014/main" id="{42C32F68-CA99-AFD5-7EF4-F87048816E7E}"/>
+              </a:ext>
+            </a:extLst>
+          </p:cNvPr>
+          <p:cNvSpPr/>
+          <p:nvPr/>
+        </p:nvSpPr>
+        <p:spPr>
+          <a:xfrm>
+            <a:off x="6194061" y="2738000"/>
+            <a:ext cx="3523791" cy="1086710"/>
+          </a:xfrm>
+          <a:prstGeom prst="arc">
+            <a:avLst>
+              <a:gd name="adj1" fmla="val 10769572"/>
+              <a:gd name="adj2" fmla="val 21448792"/>
+            </a:avLst>
+          </a:prstGeom>
+          <a:ln w="34925">
+            <a:solidFill>
+              <a:schemeClr val="accent2"/>
+            </a:solidFill>
+            <a:tailEnd type="arrow"/>
+          </a:ln>
+        </p:spPr>
+        <p:style>
+          <a:lnRef idx="1">
+            <a:schemeClr val="accent1"/>
+          </a:lnRef>
+          <a:fillRef idx="0">
+            <a:schemeClr val="accent1"/>
+          </a:fillRef>
+          <a:effectRef idx="0">
+            <a:schemeClr val="accent1"/>
+          </a:effectRef>
+          <a:fontRef idx="minor">
+            <a:schemeClr val="tx1"/>
+          </a:fontRef>
+        </p:style>
+        <p:txBody>
+          <a:bodyPr rtlCol="0" anchor="ctr"/>
+          <a:lstStyle/>
+          <a:p>
+            <a:pPr algn="ctr"/>
+            <a:endParaRPr lang="en-CA"/>
+          </a:p>
+        </p:txBody>
+      </p:sp>
+      <p:sp>
+        <p:nvSpPr>
+          <p:cNvPr id="71" name="TextBox 70">
+            <a:extLst>
+              <a:ext uri="{FF2B5EF4-FFF2-40B4-BE49-F238E27FC236}">
+                <a16:creationId xmlns:a16="http://schemas.microsoft.com/office/drawing/2014/main" id="{C579B0D2-2BD0-E83C-9123-C28538FCAEB5}"/>
+              </a:ext>
+            </a:extLst>
+          </p:cNvPr>
+          <p:cNvSpPr txBox="1"/>
+          <p:nvPr/>
+        </p:nvSpPr>
+        <p:spPr>
+          <a:xfrm>
+            <a:off x="6833895" y="2643235"/>
+            <a:ext cx="2051387" cy="307777"/>
+          </a:xfrm>
+          <a:prstGeom prst="rect">
+            <a:avLst/>
+          </a:prstGeom>
+          <a:solidFill>
+            <a:schemeClr val="bg1"/>
+          </a:solidFill>
+          <a:ln>
+            <a:solidFill>
+              <a:schemeClr val="accent1">
+                <a:shade val="15000"/>
+              </a:schemeClr>
+            </a:solidFill>
+          </a:ln>
+        </p:spPr>
+        <p:txBody>
+          <a:bodyPr wrap="square" rtlCol="0">
+            <a:spAutoFit/>
+          </a:bodyPr>
+          <a:lstStyle/>
+          <a:p>
+            <a:pPr algn="ctr"/>
+            <a:r>
+              <a:rPr lang="en-CA" sz="1400" dirty="0" err="1"/>
+              <a:t>getPriceEffect</a:t>
+            </a:r>
+            <a:r>
+              <a:rPr lang="en-CA" sz="1400" dirty="0"/>
+              <a:t>$</a:t>
+            </a:r>
+          </a:p>
+        </p:txBody>
+      </p:sp>
+      <p:sp>
+        <p:nvSpPr>
+          <p:cNvPr id="76" name="Oval 75">
+            <a:extLst>
+              <a:ext uri="{FF2B5EF4-FFF2-40B4-BE49-F238E27FC236}">
+                <a16:creationId xmlns:a16="http://schemas.microsoft.com/office/drawing/2014/main" id="{6E4A664F-40FB-2CE2-04D7-454257BF1103}"/>
+              </a:ext>
+            </a:extLst>
+          </p:cNvPr>
+          <p:cNvSpPr/>
+          <p:nvPr/>
+        </p:nvSpPr>
+        <p:spPr>
+          <a:xfrm>
+            <a:off x="8938753" y="2662976"/>
+            <a:ext cx="350797" cy="350797"/>
+          </a:xfrm>
+          <a:prstGeom prst="ellipse">
+            <a:avLst/>
+          </a:prstGeom>
+          <a:solidFill>
+            <a:srgbClr val="92D050"/>
+          </a:solidFill>
+        </p:spPr>
+        <p:style>
+          <a:lnRef idx="2">
+            <a:schemeClr val="accent1">
+              <a:shade val="15000"/>
+            </a:schemeClr>
+          </a:lnRef>
+          <a:fillRef idx="1">
+            <a:schemeClr val="accent1"/>
+          </a:fillRef>
+          <a:effectRef idx="0">
+            <a:schemeClr val="accent1"/>
+          </a:effectRef>
+          <a:fontRef idx="minor">
+            <a:schemeClr val="lt1"/>
+          </a:fontRef>
+        </p:style>
+        <p:txBody>
+          <a:bodyPr rtlCol="0" anchor="ctr"/>
+          <a:lstStyle/>
+          <a:p>
+            <a:pPr algn="ctr"/>
+            <a:endParaRPr lang="en-CA"/>
+          </a:p>
+        </p:txBody>
+      </p:sp>
+      <p:sp>
+        <p:nvSpPr>
+          <p:cNvPr id="64" name="Oval 63">
+            <a:extLst>
+              <a:ext uri="{FF2B5EF4-FFF2-40B4-BE49-F238E27FC236}">
+                <a16:creationId xmlns:a16="http://schemas.microsoft.com/office/drawing/2014/main" id="{4373DEC7-662F-A21D-0B7C-865151BBD5A6}"/>
+              </a:ext>
+            </a:extLst>
+          </p:cNvPr>
+          <p:cNvSpPr/>
+          <p:nvPr/>
+        </p:nvSpPr>
+        <p:spPr>
+          <a:xfrm>
+            <a:off x="9743847" y="3241595"/>
+            <a:ext cx="350797" cy="350797"/>
+          </a:xfrm>
+          <a:prstGeom prst="ellipse">
+            <a:avLst/>
+          </a:prstGeom>
+          <a:solidFill>
+            <a:schemeClr val="accent1">
+              <a:lumMod val="60000"/>
+              <a:lumOff val="40000"/>
+            </a:schemeClr>
+          </a:solidFill>
+        </p:spPr>
+        <p:style>
+          <a:lnRef idx="2">
+            <a:schemeClr val="accent1">
+              <a:shade val="15000"/>
+            </a:schemeClr>
+          </a:lnRef>
+          <a:fillRef idx="1">
+            <a:schemeClr val="accent1"/>
+          </a:fillRef>
+          <a:effectRef idx="0">
+            <a:schemeClr val="accent1"/>
+          </a:effectRef>
+          <a:fontRef idx="minor">
+            <a:schemeClr val="lt1"/>
+          </a:fontRef>
+        </p:style>
+        <p:txBody>
+          <a:bodyPr rtlCol="0" anchor="ctr"/>
+          <a:lstStyle/>
+          <a:p>
+            <a:pPr algn="ctr"/>
+            <a:endParaRPr lang="en-CA"/>
+          </a:p>
+        </p:txBody>
+      </p:sp>
+      <p:sp>
+        <p:nvSpPr>
+          <p:cNvPr id="100" name="TextBox 99">
+            <a:extLst>
+              <a:ext uri="{FF2B5EF4-FFF2-40B4-BE49-F238E27FC236}">
+                <a16:creationId xmlns:a16="http://schemas.microsoft.com/office/drawing/2014/main" id="{A8AE2161-5D45-3218-CE95-260C443B8A74}"/>
+              </a:ext>
+            </a:extLst>
+          </p:cNvPr>
+          <p:cNvSpPr txBox="1"/>
+          <p:nvPr/>
+        </p:nvSpPr>
+        <p:spPr>
+          <a:xfrm>
+            <a:off x="5299843" y="4758426"/>
+            <a:ext cx="3881203" cy="800219"/>
+          </a:xfrm>
+          <a:prstGeom prst="rect">
+            <a:avLst/>
+          </a:prstGeom>
+          <a:solidFill>
+            <a:schemeClr val="bg1"/>
+          </a:solidFill>
+          <a:ln>
+            <a:solidFill>
+              <a:schemeClr val="accent1">
+                <a:shade val="15000"/>
+              </a:schemeClr>
+            </a:solidFill>
+          </a:ln>
+        </p:spPr>
+        <p:txBody>
+          <a:bodyPr wrap="square" rtlCol="0">
+            <a:spAutoFit/>
+          </a:bodyPr>
+          <a:lstStyle/>
+          <a:p>
+            <a:pPr algn="ctr"/>
+            <a:r>
+              <a:rPr lang="en-CA" dirty="0"/>
+              <a:t>Source For Hub 2 Actions</a:t>
+            </a:r>
+          </a:p>
+          <a:p>
+            <a:r>
+              <a:rPr lang="en-CA" sz="1400" dirty="0"/>
+              <a:t>FETCH_PRICE</a:t>
+            </a:r>
+          </a:p>
+          <a:p>
+            <a:r>
+              <a:rPr lang="en-CA" sz="1400" dirty="0"/>
+              <a:t>FETCH_PRICE SUCCESS</a:t>
+            </a:r>
+          </a:p>
+        </p:txBody>
+      </p:sp>
+      <p:sp>
+        <p:nvSpPr>
+          <p:cNvPr id="101" name="Oval 100">
+            <a:extLst>
+              <a:ext uri="{FF2B5EF4-FFF2-40B4-BE49-F238E27FC236}">
+                <a16:creationId xmlns:a16="http://schemas.microsoft.com/office/drawing/2014/main" id="{72684D0B-F2B2-EBDD-1D6C-9FA485818925}"/>
+              </a:ext>
+            </a:extLst>
+          </p:cNvPr>
+          <p:cNvSpPr/>
+          <p:nvPr/>
+        </p:nvSpPr>
+        <p:spPr>
+          <a:xfrm>
+            <a:off x="2834870" y="5201106"/>
+            <a:ext cx="179850" cy="177553"/>
+          </a:xfrm>
+          <a:prstGeom prst="ellipse">
+            <a:avLst/>
+          </a:prstGeom>
+          <a:solidFill>
+            <a:schemeClr val="bg2"/>
+          </a:solidFill>
+        </p:spPr>
+        <p:style>
+          <a:lnRef idx="2">
+            <a:schemeClr val="accent1">
+              <a:shade val="15000"/>
+            </a:schemeClr>
+          </a:lnRef>
+          <a:fillRef idx="1">
+            <a:schemeClr val="accent1"/>
+          </a:fillRef>
+          <a:effectRef idx="0">
+            <a:schemeClr val="accent1"/>
+          </a:effectRef>
+          <a:fontRef idx="minor">
+            <a:schemeClr val="lt1"/>
+          </a:fontRef>
+        </p:style>
+        <p:txBody>
+          <a:bodyPr rtlCol="0" anchor="ctr"/>
+          <a:lstStyle/>
+          <a:p>
+            <a:pPr algn="ctr"/>
+            <a:endParaRPr lang="en-CA"/>
+          </a:p>
+        </p:txBody>
+      </p:sp>
+      <p:sp>
+        <p:nvSpPr>
+          <p:cNvPr id="102" name="Oval 101">
+            <a:extLst>
+              <a:ext uri="{FF2B5EF4-FFF2-40B4-BE49-F238E27FC236}">
+                <a16:creationId xmlns:a16="http://schemas.microsoft.com/office/drawing/2014/main" id="{81D6EC26-8AB9-7F3A-2935-C3BCF43BB796}"/>
+              </a:ext>
+            </a:extLst>
+          </p:cNvPr>
+          <p:cNvSpPr/>
+          <p:nvPr/>
+        </p:nvSpPr>
+        <p:spPr>
+          <a:xfrm flipH="1" flipV="1">
+            <a:off x="2840812" y="4958748"/>
+            <a:ext cx="173908" cy="173908"/>
+          </a:xfrm>
+          <a:prstGeom prst="ellipse">
+            <a:avLst/>
+          </a:prstGeom>
+          <a:solidFill>
+            <a:schemeClr val="accent6">
+              <a:lumMod val="40000"/>
+              <a:lumOff val="60000"/>
+            </a:schemeClr>
+          </a:solidFill>
+        </p:spPr>
+        <p:style>
+          <a:lnRef idx="2">
+            <a:schemeClr val="accent1">
+              <a:shade val="15000"/>
+            </a:schemeClr>
+          </a:lnRef>
+          <a:fillRef idx="1">
+            <a:schemeClr val="accent1"/>
+          </a:fillRef>
+          <a:effectRef idx="0">
+            <a:schemeClr val="accent1"/>
+          </a:effectRef>
+          <a:fontRef idx="minor">
+            <a:schemeClr val="lt1"/>
+          </a:fontRef>
+        </p:style>
+        <p:txBody>
+          <a:bodyPr rtlCol="0" anchor="ctr"/>
+          <a:lstStyle/>
+          <a:p>
+            <a:pPr algn="ctr"/>
+            <a:endParaRPr lang="en-CA"/>
+          </a:p>
+        </p:txBody>
+      </p:sp>
+      <p:sp>
+        <p:nvSpPr>
+          <p:cNvPr id="103" name="Oval 102">
+            <a:extLst>
+              <a:ext uri="{FF2B5EF4-FFF2-40B4-BE49-F238E27FC236}">
+                <a16:creationId xmlns:a16="http://schemas.microsoft.com/office/drawing/2014/main" id="{D2983791-687E-10D4-C378-F850E7694B18}"/>
+              </a:ext>
+            </a:extLst>
+          </p:cNvPr>
+          <p:cNvSpPr/>
+          <p:nvPr/>
+        </p:nvSpPr>
+        <p:spPr>
+          <a:xfrm>
+            <a:off x="8891131" y="5304085"/>
+            <a:ext cx="169549" cy="169549"/>
+          </a:xfrm>
+          <a:prstGeom prst="ellipse">
+            <a:avLst/>
+          </a:prstGeom>
+          <a:solidFill>
+            <a:srgbClr val="92D050"/>
+          </a:solidFill>
+        </p:spPr>
+        <p:style>
+          <a:lnRef idx="2">
+            <a:schemeClr val="accent1">
+              <a:shade val="15000"/>
+            </a:schemeClr>
+          </a:lnRef>
+          <a:fillRef idx="1">
+            <a:schemeClr val="accent1"/>
+          </a:fillRef>
+          <a:effectRef idx="0">
+            <a:schemeClr val="accent1"/>
+          </a:effectRef>
+          <a:fontRef idx="minor">
+            <a:schemeClr val="lt1"/>
+          </a:fontRef>
+        </p:style>
+        <p:txBody>
+          <a:bodyPr rtlCol="0" anchor="ctr"/>
+          <a:lstStyle/>
+          <a:p>
+            <a:pPr algn="ctr"/>
+            <a:endParaRPr lang="en-CA"/>
+          </a:p>
+        </p:txBody>
+      </p:sp>
+      <p:sp>
+        <p:nvSpPr>
+          <p:cNvPr id="105" name="Oval 104">
+            <a:extLst>
+              <a:ext uri="{FF2B5EF4-FFF2-40B4-BE49-F238E27FC236}">
+                <a16:creationId xmlns:a16="http://schemas.microsoft.com/office/drawing/2014/main" id="{5BA2E242-00C5-D801-8A26-6DEF84C7509B}"/>
+              </a:ext>
+            </a:extLst>
+          </p:cNvPr>
+          <p:cNvSpPr/>
+          <p:nvPr/>
+        </p:nvSpPr>
+        <p:spPr>
+          <a:xfrm>
+            <a:off x="8894106" y="5065797"/>
+            <a:ext cx="171597" cy="171597"/>
+          </a:xfrm>
+          <a:prstGeom prst="ellipse">
+            <a:avLst/>
+          </a:prstGeom>
+          <a:solidFill>
+            <a:schemeClr val="accent1">
+              <a:lumMod val="60000"/>
+              <a:lumOff val="40000"/>
+            </a:schemeClr>
+          </a:solidFill>
+        </p:spPr>
+        <p:style>
+          <a:lnRef idx="2">
+            <a:schemeClr val="accent1">
+              <a:shade val="15000"/>
+            </a:schemeClr>
+          </a:lnRef>
+          <a:fillRef idx="1">
+            <a:schemeClr val="accent1"/>
+          </a:fillRef>
+          <a:effectRef idx="0">
+            <a:schemeClr val="accent1"/>
+          </a:effectRef>
+          <a:fontRef idx="minor">
+            <a:schemeClr val="lt1"/>
+          </a:fontRef>
+        </p:style>
+        <p:txBody>
+          <a:bodyPr rtlCol="0" anchor="ctr"/>
+          <a:lstStyle/>
+          <a:p>
+            <a:pPr algn="ctr"/>
+            <a:endParaRPr lang="en-CA"/>
+          </a:p>
+        </p:txBody>
+      </p:sp>
+      <p:sp>
+        <p:nvSpPr>
+          <p:cNvPr id="107" name="TextBox 106">
+            <a:extLst>
+              <a:ext uri="{FF2B5EF4-FFF2-40B4-BE49-F238E27FC236}">
+                <a16:creationId xmlns:a16="http://schemas.microsoft.com/office/drawing/2014/main" id="{CDB304A9-0ECB-5393-7F16-F3B9E68DF367}"/>
+              </a:ext>
+            </a:extLst>
+          </p:cNvPr>
+          <p:cNvSpPr txBox="1"/>
+          <p:nvPr/>
+        </p:nvSpPr>
+        <p:spPr>
+          <a:xfrm>
+            <a:off x="9743847" y="1079820"/>
+            <a:ext cx="1915281" cy="707886"/>
+          </a:xfrm>
+          <a:prstGeom prst="rect">
+            <a:avLst/>
+          </a:prstGeom>
+          <a:noFill/>
+        </p:spPr>
+        <p:txBody>
+          <a:bodyPr wrap="square" rtlCol="0">
+            <a:spAutoFit/>
+          </a:bodyPr>
+          <a:lstStyle/>
+          <a:p>
+            <a:pPr algn="ctr"/>
+            <a:r>
+              <a:rPr lang="en-CA" sz="2000" dirty="0"/>
+              <a:t>Price Info Display</a:t>
+            </a:r>
+          </a:p>
+        </p:txBody>
+      </p:sp>
+      <p:sp>
+        <p:nvSpPr>
+          <p:cNvPr id="109" name="Rectangle: Rounded Corners 108">
+            <a:extLst>
+              <a:ext uri="{FF2B5EF4-FFF2-40B4-BE49-F238E27FC236}">
+                <a16:creationId xmlns:a16="http://schemas.microsoft.com/office/drawing/2014/main" id="{A13AA74E-1F9D-FA33-8D2B-D7796AB14A28}"/>
+              </a:ext>
+            </a:extLst>
+          </p:cNvPr>
+          <p:cNvSpPr/>
+          <p:nvPr/>
+        </p:nvSpPr>
+        <p:spPr>
+          <a:xfrm>
+            <a:off x="3867433" y="1629547"/>
+            <a:ext cx="1329625" cy="280894"/>
+          </a:xfrm>
+          <a:prstGeom prst="roundRect">
+            <a:avLst/>
+          </a:prstGeom>
+          <a:noFill/>
+        </p:spPr>
+        <p:style>
+          <a:lnRef idx="2">
+            <a:schemeClr val="accent1">
+              <a:shade val="15000"/>
+            </a:schemeClr>
+          </a:lnRef>
+          <a:fillRef idx="1">
+            <a:schemeClr val="accent1"/>
+          </a:fillRef>
+          <a:effectRef idx="0">
+            <a:schemeClr val="accent1"/>
+          </a:effectRef>
+          <a:fontRef idx="minor">
+            <a:schemeClr val="lt1"/>
+          </a:fontRef>
+        </p:style>
+        <p:txBody>
+          <a:bodyPr rtlCol="0" anchor="ctr"/>
+          <a:lstStyle/>
+          <a:p>
+            <a:r>
+              <a:rPr lang="en-CA" sz="1400" dirty="0">
+                <a:solidFill>
+                  <a:schemeClr val="tx1"/>
+                </a:solidFill>
+              </a:rPr>
+              <a:t>Select Event</a:t>
+            </a:r>
+          </a:p>
+        </p:txBody>
+      </p:sp>
+      <p:sp>
+        <p:nvSpPr>
+          <p:cNvPr id="110" name="Arc 109">
+            <a:extLst>
+              <a:ext uri="{FF2B5EF4-FFF2-40B4-BE49-F238E27FC236}">
+                <a16:creationId xmlns:a16="http://schemas.microsoft.com/office/drawing/2014/main" id="{DBED7460-5777-4FBF-195C-BC0A319CAAD8}"/>
+              </a:ext>
+            </a:extLst>
+          </p:cNvPr>
+          <p:cNvSpPr/>
+          <p:nvPr/>
+        </p:nvSpPr>
+        <p:spPr>
+          <a:xfrm flipV="1">
+            <a:off x="291740" y="1660571"/>
+            <a:ext cx="10427612" cy="3420288"/>
+          </a:xfrm>
+          <a:prstGeom prst="arc">
+            <a:avLst>
+              <a:gd name="adj1" fmla="val 8148048"/>
+              <a:gd name="adj2" fmla="val 10800727"/>
+            </a:avLst>
+          </a:prstGeom>
+          <a:ln w="34925">
+            <a:solidFill>
+              <a:schemeClr val="accent6">
+                <a:lumMod val="40000"/>
+                <a:lumOff val="60000"/>
+              </a:schemeClr>
+            </a:solidFill>
+            <a:tailEnd type="arrow"/>
+          </a:ln>
+        </p:spPr>
+        <p:style>
+          <a:lnRef idx="1">
+            <a:schemeClr val="accent1"/>
+          </a:lnRef>
+          <a:fillRef idx="0">
+            <a:schemeClr val="accent1"/>
+          </a:fillRef>
+          <a:effectRef idx="0">
+            <a:schemeClr val="accent1"/>
+          </a:effectRef>
+          <a:fontRef idx="minor">
+            <a:schemeClr val="tx1"/>
+          </a:fontRef>
+        </p:style>
+        <p:txBody>
+          <a:bodyPr rtlCol="0" anchor="ctr"/>
+          <a:lstStyle/>
+          <a:p>
+            <a:pPr algn="ctr"/>
+            <a:endParaRPr lang="en-CA"/>
+          </a:p>
+        </p:txBody>
+      </p:sp>
+      <p:sp>
+        <p:nvSpPr>
+          <p:cNvPr id="10" name="TextBox 9">
+            <a:extLst>
+              <a:ext uri="{FF2B5EF4-FFF2-40B4-BE49-F238E27FC236}">
+                <a16:creationId xmlns:a16="http://schemas.microsoft.com/office/drawing/2014/main" id="{E23DD095-7E12-E09A-102A-880CD346AE46}"/>
+              </a:ext>
+            </a:extLst>
+          </p:cNvPr>
+          <p:cNvSpPr txBox="1"/>
+          <p:nvPr/>
+        </p:nvSpPr>
+        <p:spPr>
+          <a:xfrm>
+            <a:off x="3172921" y="1145358"/>
+            <a:ext cx="2738230" cy="400110"/>
+          </a:xfrm>
+          <a:prstGeom prst="rect">
+            <a:avLst/>
+          </a:prstGeom>
+          <a:noFill/>
+        </p:spPr>
+        <p:txBody>
+          <a:bodyPr wrap="square" rtlCol="0">
+            <a:spAutoFit/>
+          </a:bodyPr>
+          <a:lstStyle/>
+          <a:p>
+            <a:pPr algn="ctr"/>
+            <a:r>
+              <a:rPr lang="en-CA" sz="2000" dirty="0"/>
+              <a:t>User Controls</a:t>
+            </a:r>
+          </a:p>
+        </p:txBody>
+      </p:sp>
+      <p:sp>
+        <p:nvSpPr>
+          <p:cNvPr id="11" name="Oval 10">
+            <a:extLst>
+              <a:ext uri="{FF2B5EF4-FFF2-40B4-BE49-F238E27FC236}">
+                <a16:creationId xmlns:a16="http://schemas.microsoft.com/office/drawing/2014/main" id="{8F47BE55-760D-0884-D768-373A4B7E4955}"/>
+              </a:ext>
+            </a:extLst>
+          </p:cNvPr>
+          <p:cNvSpPr/>
+          <p:nvPr/>
+        </p:nvSpPr>
+        <p:spPr>
+          <a:xfrm>
+            <a:off x="6408704" y="2822698"/>
+            <a:ext cx="350797" cy="350797"/>
+          </a:xfrm>
+          <a:prstGeom prst="ellipse">
+            <a:avLst/>
+          </a:prstGeom>
+          <a:solidFill>
+            <a:schemeClr val="accent1">
+              <a:lumMod val="60000"/>
+              <a:lumOff val="40000"/>
+              <a:alpha val="50000"/>
+            </a:schemeClr>
+          </a:solidFill>
+        </p:spPr>
+        <p:style>
+          <a:lnRef idx="2">
+            <a:schemeClr val="accent1">
+              <a:shade val="15000"/>
+            </a:schemeClr>
+          </a:lnRef>
+          <a:fillRef idx="1">
+            <a:schemeClr val="accent1"/>
+          </a:fillRef>
+          <a:effectRef idx="0">
+            <a:schemeClr val="accent1"/>
+          </a:effectRef>
+          <a:fontRef idx="minor">
+            <a:schemeClr val="lt1"/>
+          </a:fontRef>
+        </p:style>
+        <p:txBody>
+          <a:bodyPr rtlCol="0" anchor="ctr"/>
+          <a:lstStyle/>
+          <a:p>
+            <a:pPr algn="ctr"/>
+            <a:endParaRPr lang="en-CA"/>
+          </a:p>
+        </p:txBody>
+      </p:sp>
+      <p:sp>
+        <p:nvSpPr>
+          <p:cNvPr id="14" name="Rectangle: Rounded Corners 13">
+            <a:extLst>
+              <a:ext uri="{FF2B5EF4-FFF2-40B4-BE49-F238E27FC236}">
+                <a16:creationId xmlns:a16="http://schemas.microsoft.com/office/drawing/2014/main" id="{057D6040-83A4-A92B-E6ED-6B158CFD85AE}"/>
+              </a:ext>
+            </a:extLst>
+          </p:cNvPr>
+          <p:cNvSpPr/>
+          <p:nvPr/>
+        </p:nvSpPr>
+        <p:spPr>
+          <a:xfrm>
+            <a:off x="3855048" y="2090965"/>
+            <a:ext cx="1546869" cy="260896"/>
+          </a:xfrm>
+          <a:prstGeom prst="roundRect">
+            <a:avLst/>
+          </a:prstGeom>
+          <a:noFill/>
+        </p:spPr>
+        <p:style>
+          <a:lnRef idx="2">
+            <a:schemeClr val="accent1">
+              <a:shade val="15000"/>
+            </a:schemeClr>
+          </a:lnRef>
+          <a:fillRef idx="1">
+            <a:schemeClr val="accent1"/>
+          </a:fillRef>
+          <a:effectRef idx="0">
+            <a:schemeClr val="accent1"/>
+          </a:effectRef>
+          <a:fontRef idx="minor">
+            <a:schemeClr val="lt1"/>
+          </a:fontRef>
+        </p:style>
+        <p:txBody>
+          <a:bodyPr rtlCol="0" anchor="ctr"/>
+          <a:lstStyle/>
+          <a:p>
+            <a:r>
+              <a:rPr lang="en-CA" sz="1400" dirty="0">
+                <a:solidFill>
+                  <a:schemeClr val="tx1"/>
+                </a:solidFill>
+              </a:rPr>
+              <a:t>Choose Quantity</a:t>
+            </a:r>
+          </a:p>
+        </p:txBody>
+      </p:sp>
+      <p:sp>
+        <p:nvSpPr>
+          <p:cNvPr id="15" name="Arc 14">
+            <a:extLst>
+              <a:ext uri="{FF2B5EF4-FFF2-40B4-BE49-F238E27FC236}">
+                <a16:creationId xmlns:a16="http://schemas.microsoft.com/office/drawing/2014/main" id="{6883EC33-97A3-079F-3C23-A001E0A73F83}"/>
+              </a:ext>
+            </a:extLst>
+          </p:cNvPr>
+          <p:cNvSpPr/>
+          <p:nvPr/>
+        </p:nvSpPr>
+        <p:spPr>
+          <a:xfrm flipV="1">
+            <a:off x="129209" y="2158995"/>
+            <a:ext cx="10291969" cy="3074264"/>
+          </a:xfrm>
+          <a:prstGeom prst="arc">
+            <a:avLst>
+              <a:gd name="adj1" fmla="val 8148048"/>
+              <a:gd name="adj2" fmla="val 10591869"/>
+            </a:avLst>
+          </a:prstGeom>
+          <a:ln w="34925">
+            <a:solidFill>
+              <a:schemeClr val="bg2"/>
+            </a:solidFill>
+            <a:tailEnd type="arrow"/>
+          </a:ln>
+        </p:spPr>
+        <p:style>
+          <a:lnRef idx="1">
+            <a:schemeClr val="accent1"/>
+          </a:lnRef>
+          <a:fillRef idx="0">
+            <a:schemeClr val="accent1"/>
+          </a:fillRef>
+          <a:effectRef idx="0">
+            <a:schemeClr val="accent1"/>
+          </a:effectRef>
+          <a:fontRef idx="minor">
+            <a:schemeClr val="tx1"/>
+          </a:fontRef>
+        </p:style>
+        <p:txBody>
+          <a:bodyPr rtlCol="0" anchor="ctr"/>
+          <a:lstStyle/>
+          <a:p>
+            <a:pPr algn="ctr"/>
+            <a:endParaRPr lang="en-CA"/>
+          </a:p>
+        </p:txBody>
+      </p:sp>
+    </p:spTree>
+    <p:extLst>
+      <p:ext uri="{BB962C8B-B14F-4D97-AF65-F5344CB8AC3E}">
+        <p14:creationId xmlns:p14="http://schemas.microsoft.com/office/powerpoint/2010/main" val="1433618258"/>
       </p:ext>
     </p:extLst>
   </p:cSld>

</xml_diff>

<commit_message>
[17] Rx Builder and reduce boiler plate and update docs
</commit_message>
<xml_diff>
--- a/documentation/Hubfx Presentation.pptx
+++ b/documentation/Hubfx Presentation.pptx
@@ -1799,7 +1799,7 @@
           <a:p>
             <a:fld id="{154F4BC5-C275-4A59-82DC-6AFC02DFC54D}" type="datetimeFigureOut">
               <a:rPr lang="en-CA" smtClean="0"/>
-              <a:t>2023-10-10</a:t>
+              <a:t>2023-11-16</a:t>
             </a:fld>
             <a:endParaRPr lang="en-CA"/>
           </a:p>
@@ -1999,7 +1999,7 @@
           <a:p>
             <a:fld id="{154F4BC5-C275-4A59-82DC-6AFC02DFC54D}" type="datetimeFigureOut">
               <a:rPr lang="en-CA" smtClean="0"/>
-              <a:t>2023-10-10</a:t>
+              <a:t>2023-11-16</a:t>
             </a:fld>
             <a:endParaRPr lang="en-CA"/>
           </a:p>
@@ -2209,7 +2209,7 @@
           <a:p>
             <a:fld id="{154F4BC5-C275-4A59-82DC-6AFC02DFC54D}" type="datetimeFigureOut">
               <a:rPr lang="en-CA" smtClean="0"/>
-              <a:t>2023-10-10</a:t>
+              <a:t>2023-11-16</a:t>
             </a:fld>
             <a:endParaRPr lang="en-CA"/>
           </a:p>
@@ -2409,7 +2409,7 @@
           <a:p>
             <a:fld id="{154F4BC5-C275-4A59-82DC-6AFC02DFC54D}" type="datetimeFigureOut">
               <a:rPr lang="en-CA" smtClean="0"/>
-              <a:t>2023-10-10</a:t>
+              <a:t>2023-11-16</a:t>
             </a:fld>
             <a:endParaRPr lang="en-CA"/>
           </a:p>
@@ -2685,7 +2685,7 @@
           <a:p>
             <a:fld id="{154F4BC5-C275-4A59-82DC-6AFC02DFC54D}" type="datetimeFigureOut">
               <a:rPr lang="en-CA" smtClean="0"/>
-              <a:t>2023-10-10</a:t>
+              <a:t>2023-11-16</a:t>
             </a:fld>
             <a:endParaRPr lang="en-CA"/>
           </a:p>
@@ -2953,7 +2953,7 @@
           <a:p>
             <a:fld id="{154F4BC5-C275-4A59-82DC-6AFC02DFC54D}" type="datetimeFigureOut">
               <a:rPr lang="en-CA" smtClean="0"/>
-              <a:t>2023-10-10</a:t>
+              <a:t>2023-11-16</a:t>
             </a:fld>
             <a:endParaRPr lang="en-CA"/>
           </a:p>
@@ -3368,7 +3368,7 @@
           <a:p>
             <a:fld id="{154F4BC5-C275-4A59-82DC-6AFC02DFC54D}" type="datetimeFigureOut">
               <a:rPr lang="en-CA" smtClean="0"/>
-              <a:t>2023-10-10</a:t>
+              <a:t>2023-11-16</a:t>
             </a:fld>
             <a:endParaRPr lang="en-CA"/>
           </a:p>
@@ -3510,7 +3510,7 @@
           <a:p>
             <a:fld id="{154F4BC5-C275-4A59-82DC-6AFC02DFC54D}" type="datetimeFigureOut">
               <a:rPr lang="en-CA" smtClean="0"/>
-              <a:t>2023-10-10</a:t>
+              <a:t>2023-11-16</a:t>
             </a:fld>
             <a:endParaRPr lang="en-CA"/>
           </a:p>
@@ -3623,7 +3623,7 @@
           <a:p>
             <a:fld id="{154F4BC5-C275-4A59-82DC-6AFC02DFC54D}" type="datetimeFigureOut">
               <a:rPr lang="en-CA" smtClean="0"/>
-              <a:t>2023-10-10</a:t>
+              <a:t>2023-11-16</a:t>
             </a:fld>
             <a:endParaRPr lang="en-CA"/>
           </a:p>
@@ -3936,7 +3936,7 @@
           <a:p>
             <a:fld id="{154F4BC5-C275-4A59-82DC-6AFC02DFC54D}" type="datetimeFigureOut">
               <a:rPr lang="en-CA" smtClean="0"/>
-              <a:t>2023-10-10</a:t>
+              <a:t>2023-11-16</a:t>
             </a:fld>
             <a:endParaRPr lang="en-CA"/>
           </a:p>
@@ -4225,7 +4225,7 @@
           <a:p>
             <a:fld id="{154F4BC5-C275-4A59-82DC-6AFC02DFC54D}" type="datetimeFigureOut">
               <a:rPr lang="en-CA" smtClean="0"/>
-              <a:t>2023-10-10</a:t>
+              <a:t>2023-11-16</a:t>
             </a:fld>
             <a:endParaRPr lang="en-CA"/>
           </a:p>
@@ -4468,7 +4468,7 @@
           <a:p>
             <a:fld id="{154F4BC5-C275-4A59-82DC-6AFC02DFC54D}" type="datetimeFigureOut">
               <a:rPr lang="en-CA" smtClean="0"/>
-              <a:t>2023-10-10</a:t>
+              <a:t>2023-11-16</a:t>
             </a:fld>
             <a:endParaRPr lang="en-CA"/>
           </a:p>
@@ -9078,10 +9078,10 @@
       </p:grpSpPr>
       <p:sp>
         <p:nvSpPr>
-          <p:cNvPr id="7" name="Rectangle: Rounded Corners 6">
-            <a:extLst>
-              <a:ext uri="{FF2B5EF4-FFF2-40B4-BE49-F238E27FC236}">
-                <a16:creationId xmlns:a16="http://schemas.microsoft.com/office/drawing/2014/main" id="{3356D45B-3EE1-591C-F3F7-9FF8420FF555}"/>
+          <p:cNvPr id="106" name="Rectangle: Rounded Corners 105">
+            <a:extLst>
+              <a:ext uri="{FF2B5EF4-FFF2-40B4-BE49-F238E27FC236}">
+                <a16:creationId xmlns:a16="http://schemas.microsoft.com/office/drawing/2014/main" id="{522C20D7-71E7-4B9E-4B83-48DDC36B85DB}"/>
               </a:ext>
             </a:extLst>
           </p:cNvPr>
@@ -9090,7 +9090,7 @@
         </p:nvSpPr>
         <p:spPr>
           <a:xfrm>
-            <a:off x="3266338" y="899179"/>
+            <a:off x="9310139" y="779969"/>
             <a:ext cx="2684930" cy="4911626"/>
           </a:xfrm>
           <a:prstGeom prst="roundRect">
@@ -9130,58 +9130,6 @@
       </p:sp>
       <p:sp>
         <p:nvSpPr>
-          <p:cNvPr id="106" name="Rectangle: Rounded Corners 105">
-            <a:extLst>
-              <a:ext uri="{FF2B5EF4-FFF2-40B4-BE49-F238E27FC236}">
-                <a16:creationId xmlns:a16="http://schemas.microsoft.com/office/drawing/2014/main" id="{522C20D7-71E7-4B9E-4B83-48DDC36B85DB}"/>
-              </a:ext>
-            </a:extLst>
-          </p:cNvPr>
-          <p:cNvSpPr/>
-          <p:nvPr/>
-        </p:nvSpPr>
-        <p:spPr>
-          <a:xfrm>
-            <a:off x="9310139" y="779969"/>
-            <a:ext cx="2684930" cy="4911626"/>
-          </a:xfrm>
-          <a:prstGeom prst="roundRect">
-            <a:avLst/>
-          </a:prstGeom>
-          <a:solidFill>
-            <a:schemeClr val="accent6">
-              <a:lumMod val="20000"/>
-              <a:lumOff val="80000"/>
-              <a:alpha val="50000"/>
-            </a:schemeClr>
-          </a:solidFill>
-        </p:spPr>
-        <p:style>
-          <a:lnRef idx="2">
-            <a:schemeClr val="accent1">
-              <a:shade val="15000"/>
-            </a:schemeClr>
-          </a:lnRef>
-          <a:fillRef idx="1">
-            <a:schemeClr val="accent1"/>
-          </a:fillRef>
-          <a:effectRef idx="0">
-            <a:schemeClr val="accent1"/>
-          </a:effectRef>
-          <a:fontRef idx="minor">
-            <a:schemeClr val="lt1"/>
-          </a:fontRef>
-        </p:style>
-        <p:txBody>
-          <a:bodyPr rtlCol="0" anchor="ctr"/>
-          <a:lstStyle/>
-          <a:p>
-            <a:endParaRPr lang="en-CA" dirty="0"/>
-          </a:p>
-        </p:txBody>
-      </p:sp>
-      <p:sp>
-        <p:nvSpPr>
           <p:cNvPr id="40" name="Rectangle: Rounded Corners 39">
             <a:extLst>
               <a:ext uri="{FF2B5EF4-FFF2-40B4-BE49-F238E27FC236}">
@@ -9234,7 +9182,7 @@
                   <a:schemeClr val="tx1"/>
                 </a:solidFill>
               </a:rPr>
-              <a:t>Store for Price Information</a:t>
+              <a:t>Store Event Tickets State</a:t>
             </a:r>
           </a:p>
         </p:txBody>
@@ -9818,12 +9766,8 @@
           <a:p>
             <a:pPr algn="ctr"/>
             <a:r>
-              <a:rPr lang="en-CA" sz="1400" dirty="0" err="1"/>
-              <a:t>sourceForPriceInfoHub</a:t>
-            </a:r>
-            <a:r>
               <a:rPr lang="en-CA" sz="1400" dirty="0"/>
-              <a:t>$</a:t>
+              <a:t>sourceForHub2$</a:t>
             </a:r>
           </a:p>
         </p:txBody>
@@ -10159,7 +10103,7 @@
           <a:p>
             <a:r>
               <a:rPr lang="en-CA" sz="1400" dirty="0"/>
-              <a:t>FETCH_PRICE</a:t>
+              <a:t>CONTROL_CHANGE</a:t>
             </a:r>
           </a:p>
           <a:p>
@@ -10387,7 +10331,7 @@
         <p:spPr>
           <a:xfrm>
             <a:off x="9743847" y="1079820"/>
-            <a:ext cx="1915281" cy="707886"/>
+            <a:ext cx="1915281" cy="400110"/>
           </a:xfrm>
           <a:prstGeom prst="rect">
             <a:avLst/>
@@ -10403,7 +10347,7 @@
             <a:pPr algn="ctr"/>
             <a:r>
               <a:rPr lang="en-CA" sz="2000" dirty="0"/>
-              <a:t>Price Info Display</a:t>
+              <a:t>Event Tickets</a:t>
             </a:r>
           </a:p>
         </p:txBody>
@@ -10422,7 +10366,7 @@
         </p:nvSpPr>
         <p:spPr>
           <a:xfrm>
-            <a:off x="3867433" y="1629547"/>
+            <a:off x="10017208" y="1519349"/>
             <a:ext cx="1329625" cy="280894"/>
           </a:xfrm>
           <a:prstGeom prst="roundRect">
@@ -10463,98 +10407,6 @@
       </p:sp>
       <p:sp>
         <p:nvSpPr>
-          <p:cNvPr id="110" name="Arc 109">
-            <a:extLst>
-              <a:ext uri="{FF2B5EF4-FFF2-40B4-BE49-F238E27FC236}">
-                <a16:creationId xmlns:a16="http://schemas.microsoft.com/office/drawing/2014/main" id="{DBED7460-5777-4FBF-195C-BC0A319CAAD8}"/>
-              </a:ext>
-            </a:extLst>
-          </p:cNvPr>
-          <p:cNvSpPr/>
-          <p:nvPr/>
-        </p:nvSpPr>
-        <p:spPr>
-          <a:xfrm flipV="1">
-            <a:off x="291740" y="1660571"/>
-            <a:ext cx="10427612" cy="3420288"/>
-          </a:xfrm>
-          <a:prstGeom prst="arc">
-            <a:avLst>
-              <a:gd name="adj1" fmla="val 8148048"/>
-              <a:gd name="adj2" fmla="val 10800727"/>
-            </a:avLst>
-          </a:prstGeom>
-          <a:ln w="34925">
-            <a:solidFill>
-              <a:schemeClr val="accent6">
-                <a:lumMod val="40000"/>
-                <a:lumOff val="60000"/>
-              </a:schemeClr>
-            </a:solidFill>
-            <a:tailEnd type="arrow"/>
-          </a:ln>
-        </p:spPr>
-        <p:style>
-          <a:lnRef idx="1">
-            <a:schemeClr val="accent1"/>
-          </a:lnRef>
-          <a:fillRef idx="0">
-            <a:schemeClr val="accent1"/>
-          </a:fillRef>
-          <a:effectRef idx="0">
-            <a:schemeClr val="accent1"/>
-          </a:effectRef>
-          <a:fontRef idx="minor">
-            <a:schemeClr val="tx1"/>
-          </a:fontRef>
-        </p:style>
-        <p:txBody>
-          <a:bodyPr rtlCol="0" anchor="ctr"/>
-          <a:lstStyle/>
-          <a:p>
-            <a:pPr algn="ctr"/>
-            <a:endParaRPr lang="en-CA"/>
-          </a:p>
-        </p:txBody>
-      </p:sp>
-      <p:sp>
-        <p:nvSpPr>
-          <p:cNvPr id="10" name="TextBox 9">
-            <a:extLst>
-              <a:ext uri="{FF2B5EF4-FFF2-40B4-BE49-F238E27FC236}">
-                <a16:creationId xmlns:a16="http://schemas.microsoft.com/office/drawing/2014/main" id="{E23DD095-7E12-E09A-102A-880CD346AE46}"/>
-              </a:ext>
-            </a:extLst>
-          </p:cNvPr>
-          <p:cNvSpPr txBox="1"/>
-          <p:nvPr/>
-        </p:nvSpPr>
-        <p:spPr>
-          <a:xfrm>
-            <a:off x="3172921" y="1145358"/>
-            <a:ext cx="2738230" cy="400110"/>
-          </a:xfrm>
-          <a:prstGeom prst="rect">
-            <a:avLst/>
-          </a:prstGeom>
-          <a:noFill/>
-        </p:spPr>
-        <p:txBody>
-          <a:bodyPr wrap="square" rtlCol="0">
-            <a:spAutoFit/>
-          </a:bodyPr>
-          <a:lstStyle/>
-          <a:p>
-            <a:pPr algn="ctr"/>
-            <a:r>
-              <a:rPr lang="en-CA" sz="2000" dirty="0"/>
-              <a:t>User Controls</a:t>
-            </a:r>
-          </a:p>
-        </p:txBody>
-      </p:sp>
-      <p:sp>
-        <p:nvSpPr>
           <p:cNvPr id="11" name="Oval 10">
             <a:extLst>
               <a:ext uri="{FF2B5EF4-FFF2-40B4-BE49-F238E27FC236}">
@@ -10620,7 +10472,7 @@
         </p:nvSpPr>
         <p:spPr>
           <a:xfrm>
-            <a:off x="3855048" y="2090965"/>
+            <a:off x="10017208" y="1919303"/>
             <a:ext cx="1546869" cy="260896"/>
           </a:xfrm>
           <a:prstGeom prst="roundRect">
@@ -10661,10 +10513,10 @@
       </p:sp>
       <p:sp>
         <p:nvSpPr>
-          <p:cNvPr id="15" name="Arc 14">
-            <a:extLst>
-              <a:ext uri="{FF2B5EF4-FFF2-40B4-BE49-F238E27FC236}">
-                <a16:creationId xmlns:a16="http://schemas.microsoft.com/office/drawing/2014/main" id="{6883EC33-97A3-079F-3C23-A001E0A73F83}"/>
+          <p:cNvPr id="8" name="Rectangle: Rounded Corners 7">
+            <a:extLst>
+              <a:ext uri="{FF2B5EF4-FFF2-40B4-BE49-F238E27FC236}">
+                <a16:creationId xmlns:a16="http://schemas.microsoft.com/office/drawing/2014/main" id="{8092EBFC-8A22-5D45-E8AA-66C4063D836A}"/>
               </a:ext>
             </a:extLst>
           </p:cNvPr>
@@ -10672,21 +10524,79 @@
           <p:nvPr/>
         </p:nvSpPr>
         <p:spPr>
-          <a:xfrm flipV="1">
-            <a:off x="129209" y="2158995"/>
-            <a:ext cx="10291969" cy="3074264"/>
-          </a:xfrm>
-          <a:prstGeom prst="arc">
-            <a:avLst>
-              <a:gd name="adj1" fmla="val 8148048"/>
-              <a:gd name="adj2" fmla="val 10591869"/>
-            </a:avLst>
-          </a:prstGeom>
-          <a:ln w="34925">
+          <a:xfrm>
+            <a:off x="9743847" y="4532288"/>
+            <a:ext cx="1546869" cy="260896"/>
+          </a:xfrm>
+          <a:prstGeom prst="roundRect">
+            <a:avLst/>
+          </a:prstGeom>
+          <a:noFill/>
+          <a:ln>
+            <a:noFill/>
+          </a:ln>
+        </p:spPr>
+        <p:style>
+          <a:lnRef idx="2">
+            <a:schemeClr val="accent1">
+              <a:shade val="15000"/>
+            </a:schemeClr>
+          </a:lnRef>
+          <a:fillRef idx="1">
+            <a:schemeClr val="accent1"/>
+          </a:fillRef>
+          <a:effectRef idx="0">
+            <a:schemeClr val="accent1"/>
+          </a:effectRef>
+          <a:fontRef idx="minor">
+            <a:schemeClr val="lt1"/>
+          </a:fontRef>
+        </p:style>
+        <p:txBody>
+          <a:bodyPr rtlCol="0" anchor="ctr"/>
+          <a:lstStyle/>
+          <a:p>
+            <a:r>
+              <a:rPr lang="en-CA" sz="1400" dirty="0">
+                <a:solidFill>
+                  <a:schemeClr val="tx1"/>
+                </a:solidFill>
+              </a:rPr>
+              <a:t>Price: $100</a:t>
+            </a:r>
+          </a:p>
+        </p:txBody>
+      </p:sp>
+      <p:cxnSp>
+        <p:nvCxnSpPr>
+          <p:cNvPr id="18" name="Connector: Curved 17">
+            <a:extLst>
+              <a:ext uri="{FF2B5EF4-FFF2-40B4-BE49-F238E27FC236}">
+                <a16:creationId xmlns:a16="http://schemas.microsoft.com/office/drawing/2014/main" id="{FC6D197E-7BFE-55CA-D51B-CB7F172FA6CF}"/>
+              </a:ext>
+            </a:extLst>
+          </p:cNvPr>
+          <p:cNvCxnSpPr>
+            <a:cxnSpLocks/>
+            <a:endCxn id="12" idx="0"/>
+          </p:cNvCxnSpPr>
+          <p:nvPr/>
+        </p:nvCxnSpPr>
+        <p:spPr>
+          <a:xfrm rot="10800000" flipV="1">
+            <a:off x="740559" y="1640160"/>
+            <a:ext cx="9030764" cy="1538064"/>
+          </a:xfrm>
+          <a:prstGeom prst="curvedConnector2">
+            <a:avLst/>
+          </a:prstGeom>
+          <a:ln w="31750">
             <a:solidFill>
-              <a:schemeClr val="bg2"/>
+              <a:schemeClr val="bg1">
+                <a:lumMod val="75000"/>
+              </a:schemeClr>
             </a:solidFill>
-            <a:tailEnd type="arrow"/>
+            <a:tailEnd type="triangle"/>
           </a:ln>
         </p:spPr>
         <p:style>
@@ -10703,15 +10613,55 @@
             <a:schemeClr val="tx1"/>
           </a:fontRef>
         </p:style>
-        <p:txBody>
-          <a:bodyPr rtlCol="0" anchor="ctr"/>
-          <a:lstStyle/>
-          <a:p>
-            <a:pPr algn="ctr"/>
-            <a:endParaRPr lang="en-CA"/>
-          </a:p>
-        </p:txBody>
-      </p:sp>
+      </p:cxnSp>
+      <p:cxnSp>
+        <p:nvCxnSpPr>
+          <p:cNvPr id="30" name="Connector: Curved 29">
+            <a:extLst>
+              <a:ext uri="{FF2B5EF4-FFF2-40B4-BE49-F238E27FC236}">
+                <a16:creationId xmlns:a16="http://schemas.microsoft.com/office/drawing/2014/main" id="{4BC0DDE2-A39F-88F6-6B50-2B174A9A29B3}"/>
+              </a:ext>
+            </a:extLst>
+          </p:cNvPr>
+          <p:cNvCxnSpPr>
+            <a:cxnSpLocks/>
+            <a:endCxn id="4" idx="7"/>
+          </p:cNvCxnSpPr>
+          <p:nvPr/>
+        </p:nvCxnSpPr>
+        <p:spPr>
+          <a:xfrm rot="10800000" flipV="1">
+            <a:off x="2789038" y="2034302"/>
+            <a:ext cx="7019432" cy="1195696"/>
+          </a:xfrm>
+          <a:prstGeom prst="curvedConnector2">
+            <a:avLst/>
+          </a:prstGeom>
+          <a:ln w="31750">
+            <a:solidFill>
+              <a:schemeClr val="accent6">
+                <a:lumMod val="60000"/>
+                <a:lumOff val="40000"/>
+              </a:schemeClr>
+            </a:solidFill>
+            <a:tailEnd type="triangle"/>
+          </a:ln>
+        </p:spPr>
+        <p:style>
+          <a:lnRef idx="1">
+            <a:schemeClr val="accent1"/>
+          </a:lnRef>
+          <a:fillRef idx="0">
+            <a:schemeClr val="accent1"/>
+          </a:fillRef>
+          <a:effectRef idx="0">
+            <a:schemeClr val="accent1"/>
+          </a:effectRef>
+          <a:fontRef idx="minor">
+            <a:schemeClr val="tx1"/>
+          </a:fontRef>
+        </p:style>
+      </p:cxnSp>
     </p:spTree>
     <p:extLst>
       <p:ext uri="{BB962C8B-B14F-4D97-AF65-F5344CB8AC3E}">

</xml_diff>

<commit_message>
rename files and update image
</commit_message>
<xml_diff>
--- a/documentation/Hubfx Presentation.pptx
+++ b/documentation/Hubfx Presentation.pptx
@@ -1799,7 +1799,7 @@
           <a:p>
             <a:fld id="{154F4BC5-C275-4A59-82DC-6AFC02DFC54D}" type="datetimeFigureOut">
               <a:rPr lang="en-CA" smtClean="0"/>
-              <a:t>2023-10-10</a:t>
+              <a:t>2023-11-16</a:t>
             </a:fld>
             <a:endParaRPr lang="en-CA"/>
           </a:p>
@@ -1999,7 +1999,7 @@
           <a:p>
             <a:fld id="{154F4BC5-C275-4A59-82DC-6AFC02DFC54D}" type="datetimeFigureOut">
               <a:rPr lang="en-CA" smtClean="0"/>
-              <a:t>2023-10-10</a:t>
+              <a:t>2023-11-16</a:t>
             </a:fld>
             <a:endParaRPr lang="en-CA"/>
           </a:p>
@@ -2209,7 +2209,7 @@
           <a:p>
             <a:fld id="{154F4BC5-C275-4A59-82DC-6AFC02DFC54D}" type="datetimeFigureOut">
               <a:rPr lang="en-CA" smtClean="0"/>
-              <a:t>2023-10-10</a:t>
+              <a:t>2023-11-16</a:t>
             </a:fld>
             <a:endParaRPr lang="en-CA"/>
           </a:p>
@@ -2409,7 +2409,7 @@
           <a:p>
             <a:fld id="{154F4BC5-C275-4A59-82DC-6AFC02DFC54D}" type="datetimeFigureOut">
               <a:rPr lang="en-CA" smtClean="0"/>
-              <a:t>2023-10-10</a:t>
+              <a:t>2023-11-16</a:t>
             </a:fld>
             <a:endParaRPr lang="en-CA"/>
           </a:p>
@@ -2685,7 +2685,7 @@
           <a:p>
             <a:fld id="{154F4BC5-C275-4A59-82DC-6AFC02DFC54D}" type="datetimeFigureOut">
               <a:rPr lang="en-CA" smtClean="0"/>
-              <a:t>2023-10-10</a:t>
+              <a:t>2023-11-16</a:t>
             </a:fld>
             <a:endParaRPr lang="en-CA"/>
           </a:p>
@@ -2953,7 +2953,7 @@
           <a:p>
             <a:fld id="{154F4BC5-C275-4A59-82DC-6AFC02DFC54D}" type="datetimeFigureOut">
               <a:rPr lang="en-CA" smtClean="0"/>
-              <a:t>2023-10-10</a:t>
+              <a:t>2023-11-16</a:t>
             </a:fld>
             <a:endParaRPr lang="en-CA"/>
           </a:p>
@@ -3368,7 +3368,7 @@
           <a:p>
             <a:fld id="{154F4BC5-C275-4A59-82DC-6AFC02DFC54D}" type="datetimeFigureOut">
               <a:rPr lang="en-CA" smtClean="0"/>
-              <a:t>2023-10-10</a:t>
+              <a:t>2023-11-16</a:t>
             </a:fld>
             <a:endParaRPr lang="en-CA"/>
           </a:p>
@@ -3510,7 +3510,7 @@
           <a:p>
             <a:fld id="{154F4BC5-C275-4A59-82DC-6AFC02DFC54D}" type="datetimeFigureOut">
               <a:rPr lang="en-CA" smtClean="0"/>
-              <a:t>2023-10-10</a:t>
+              <a:t>2023-11-16</a:t>
             </a:fld>
             <a:endParaRPr lang="en-CA"/>
           </a:p>
@@ -3623,7 +3623,7 @@
           <a:p>
             <a:fld id="{154F4BC5-C275-4A59-82DC-6AFC02DFC54D}" type="datetimeFigureOut">
               <a:rPr lang="en-CA" smtClean="0"/>
-              <a:t>2023-10-10</a:t>
+              <a:t>2023-11-16</a:t>
             </a:fld>
             <a:endParaRPr lang="en-CA"/>
           </a:p>
@@ -3936,7 +3936,7 @@
           <a:p>
             <a:fld id="{154F4BC5-C275-4A59-82DC-6AFC02DFC54D}" type="datetimeFigureOut">
               <a:rPr lang="en-CA" smtClean="0"/>
-              <a:t>2023-10-10</a:t>
+              <a:t>2023-11-16</a:t>
             </a:fld>
             <a:endParaRPr lang="en-CA"/>
           </a:p>
@@ -4225,7 +4225,7 @@
           <a:p>
             <a:fld id="{154F4BC5-C275-4A59-82DC-6AFC02DFC54D}" type="datetimeFigureOut">
               <a:rPr lang="en-CA" smtClean="0"/>
-              <a:t>2023-10-10</a:t>
+              <a:t>2023-11-16</a:t>
             </a:fld>
             <a:endParaRPr lang="en-CA"/>
           </a:p>
@@ -4468,7 +4468,7 @@
           <a:p>
             <a:fld id="{154F4BC5-C275-4A59-82DC-6AFC02DFC54D}" type="datetimeFigureOut">
               <a:rPr lang="en-CA" smtClean="0"/>
-              <a:t>2023-10-10</a:t>
+              <a:t>2023-11-16</a:t>
             </a:fld>
             <a:endParaRPr lang="en-CA"/>
           </a:p>
@@ -9078,10 +9078,10 @@
       </p:grpSpPr>
       <p:sp>
         <p:nvSpPr>
-          <p:cNvPr id="7" name="Rectangle: Rounded Corners 6">
-            <a:extLst>
-              <a:ext uri="{FF2B5EF4-FFF2-40B4-BE49-F238E27FC236}">
-                <a16:creationId xmlns:a16="http://schemas.microsoft.com/office/drawing/2014/main" id="{3356D45B-3EE1-591C-F3F7-9FF8420FF555}"/>
+          <p:cNvPr id="106" name="Rectangle: Rounded Corners 105">
+            <a:extLst>
+              <a:ext uri="{FF2B5EF4-FFF2-40B4-BE49-F238E27FC236}">
+                <a16:creationId xmlns:a16="http://schemas.microsoft.com/office/drawing/2014/main" id="{522C20D7-71E7-4B9E-4B83-48DDC36B85DB}"/>
               </a:ext>
             </a:extLst>
           </p:cNvPr>
@@ -9090,7 +9090,7 @@
         </p:nvSpPr>
         <p:spPr>
           <a:xfrm>
-            <a:off x="3266338" y="899179"/>
+            <a:off x="9310139" y="779969"/>
             <a:ext cx="2684930" cy="4911626"/>
           </a:xfrm>
           <a:prstGeom prst="roundRect">
@@ -9130,58 +9130,6 @@
       </p:sp>
       <p:sp>
         <p:nvSpPr>
-          <p:cNvPr id="106" name="Rectangle: Rounded Corners 105">
-            <a:extLst>
-              <a:ext uri="{FF2B5EF4-FFF2-40B4-BE49-F238E27FC236}">
-                <a16:creationId xmlns:a16="http://schemas.microsoft.com/office/drawing/2014/main" id="{522C20D7-71E7-4B9E-4B83-48DDC36B85DB}"/>
-              </a:ext>
-            </a:extLst>
-          </p:cNvPr>
-          <p:cNvSpPr/>
-          <p:nvPr/>
-        </p:nvSpPr>
-        <p:spPr>
-          <a:xfrm>
-            <a:off x="9310139" y="779969"/>
-            <a:ext cx="2684930" cy="4911626"/>
-          </a:xfrm>
-          <a:prstGeom prst="roundRect">
-            <a:avLst/>
-          </a:prstGeom>
-          <a:solidFill>
-            <a:schemeClr val="accent6">
-              <a:lumMod val="20000"/>
-              <a:lumOff val="80000"/>
-              <a:alpha val="50000"/>
-            </a:schemeClr>
-          </a:solidFill>
-        </p:spPr>
-        <p:style>
-          <a:lnRef idx="2">
-            <a:schemeClr val="accent1">
-              <a:shade val="15000"/>
-            </a:schemeClr>
-          </a:lnRef>
-          <a:fillRef idx="1">
-            <a:schemeClr val="accent1"/>
-          </a:fillRef>
-          <a:effectRef idx="0">
-            <a:schemeClr val="accent1"/>
-          </a:effectRef>
-          <a:fontRef idx="minor">
-            <a:schemeClr val="lt1"/>
-          </a:fontRef>
-        </p:style>
-        <p:txBody>
-          <a:bodyPr rtlCol="0" anchor="ctr"/>
-          <a:lstStyle/>
-          <a:p>
-            <a:endParaRPr lang="en-CA" dirty="0"/>
-          </a:p>
-        </p:txBody>
-      </p:sp>
-      <p:sp>
-        <p:nvSpPr>
           <p:cNvPr id="40" name="Rectangle: Rounded Corners 39">
             <a:extLst>
               <a:ext uri="{FF2B5EF4-FFF2-40B4-BE49-F238E27FC236}">
@@ -9234,7 +9182,7 @@
                   <a:schemeClr val="tx1"/>
                 </a:solidFill>
               </a:rPr>
-              <a:t>Store for Price Information</a:t>
+              <a:t>Store Event Tickets State</a:t>
             </a:r>
           </a:p>
         </p:txBody>
@@ -9818,12 +9766,8 @@
           <a:p>
             <a:pPr algn="ctr"/>
             <a:r>
-              <a:rPr lang="en-CA" sz="1400" dirty="0" err="1"/>
-              <a:t>sourceForPriceInfoHub</a:t>
-            </a:r>
-            <a:r>
               <a:rPr lang="en-CA" sz="1400" dirty="0"/>
-              <a:t>$</a:t>
+              <a:t>sourceForHub2$</a:t>
             </a:r>
           </a:p>
         </p:txBody>
@@ -10159,7 +10103,7 @@
           <a:p>
             <a:r>
               <a:rPr lang="en-CA" sz="1400" dirty="0"/>
-              <a:t>FETCH_PRICE</a:t>
+              <a:t>CONTROL_CHANGE</a:t>
             </a:r>
           </a:p>
           <a:p>
@@ -10387,7 +10331,7 @@
         <p:spPr>
           <a:xfrm>
             <a:off x="9743847" y="1079820"/>
-            <a:ext cx="1915281" cy="707886"/>
+            <a:ext cx="1915281" cy="400110"/>
           </a:xfrm>
           <a:prstGeom prst="rect">
             <a:avLst/>
@@ -10403,7 +10347,7 @@
             <a:pPr algn="ctr"/>
             <a:r>
               <a:rPr lang="en-CA" sz="2000" dirty="0"/>
-              <a:t>Price Info Display</a:t>
+              <a:t>Event Tickets</a:t>
             </a:r>
           </a:p>
         </p:txBody>
@@ -10422,7 +10366,7 @@
         </p:nvSpPr>
         <p:spPr>
           <a:xfrm>
-            <a:off x="3867433" y="1629547"/>
+            <a:off x="10017208" y="1519349"/>
             <a:ext cx="1329625" cy="280894"/>
           </a:xfrm>
           <a:prstGeom prst="roundRect">
@@ -10463,98 +10407,6 @@
       </p:sp>
       <p:sp>
         <p:nvSpPr>
-          <p:cNvPr id="110" name="Arc 109">
-            <a:extLst>
-              <a:ext uri="{FF2B5EF4-FFF2-40B4-BE49-F238E27FC236}">
-                <a16:creationId xmlns:a16="http://schemas.microsoft.com/office/drawing/2014/main" id="{DBED7460-5777-4FBF-195C-BC0A319CAAD8}"/>
-              </a:ext>
-            </a:extLst>
-          </p:cNvPr>
-          <p:cNvSpPr/>
-          <p:nvPr/>
-        </p:nvSpPr>
-        <p:spPr>
-          <a:xfrm flipV="1">
-            <a:off x="291740" y="1660571"/>
-            <a:ext cx="10427612" cy="3420288"/>
-          </a:xfrm>
-          <a:prstGeom prst="arc">
-            <a:avLst>
-              <a:gd name="adj1" fmla="val 8148048"/>
-              <a:gd name="adj2" fmla="val 10800727"/>
-            </a:avLst>
-          </a:prstGeom>
-          <a:ln w="34925">
-            <a:solidFill>
-              <a:schemeClr val="accent6">
-                <a:lumMod val="40000"/>
-                <a:lumOff val="60000"/>
-              </a:schemeClr>
-            </a:solidFill>
-            <a:tailEnd type="arrow"/>
-          </a:ln>
-        </p:spPr>
-        <p:style>
-          <a:lnRef idx="1">
-            <a:schemeClr val="accent1"/>
-          </a:lnRef>
-          <a:fillRef idx="0">
-            <a:schemeClr val="accent1"/>
-          </a:fillRef>
-          <a:effectRef idx="0">
-            <a:schemeClr val="accent1"/>
-          </a:effectRef>
-          <a:fontRef idx="minor">
-            <a:schemeClr val="tx1"/>
-          </a:fontRef>
-        </p:style>
-        <p:txBody>
-          <a:bodyPr rtlCol="0" anchor="ctr"/>
-          <a:lstStyle/>
-          <a:p>
-            <a:pPr algn="ctr"/>
-            <a:endParaRPr lang="en-CA"/>
-          </a:p>
-        </p:txBody>
-      </p:sp>
-      <p:sp>
-        <p:nvSpPr>
-          <p:cNvPr id="10" name="TextBox 9">
-            <a:extLst>
-              <a:ext uri="{FF2B5EF4-FFF2-40B4-BE49-F238E27FC236}">
-                <a16:creationId xmlns:a16="http://schemas.microsoft.com/office/drawing/2014/main" id="{E23DD095-7E12-E09A-102A-880CD346AE46}"/>
-              </a:ext>
-            </a:extLst>
-          </p:cNvPr>
-          <p:cNvSpPr txBox="1"/>
-          <p:nvPr/>
-        </p:nvSpPr>
-        <p:spPr>
-          <a:xfrm>
-            <a:off x="3172921" y="1145358"/>
-            <a:ext cx="2738230" cy="400110"/>
-          </a:xfrm>
-          <a:prstGeom prst="rect">
-            <a:avLst/>
-          </a:prstGeom>
-          <a:noFill/>
-        </p:spPr>
-        <p:txBody>
-          <a:bodyPr wrap="square" rtlCol="0">
-            <a:spAutoFit/>
-          </a:bodyPr>
-          <a:lstStyle/>
-          <a:p>
-            <a:pPr algn="ctr"/>
-            <a:r>
-              <a:rPr lang="en-CA" sz="2000" dirty="0"/>
-              <a:t>User Controls</a:t>
-            </a:r>
-          </a:p>
-        </p:txBody>
-      </p:sp>
-      <p:sp>
-        <p:nvSpPr>
           <p:cNvPr id="11" name="Oval 10">
             <a:extLst>
               <a:ext uri="{FF2B5EF4-FFF2-40B4-BE49-F238E27FC236}">
@@ -10620,7 +10472,7 @@
         </p:nvSpPr>
         <p:spPr>
           <a:xfrm>
-            <a:off x="3855048" y="2090965"/>
+            <a:off x="10017208" y="1919303"/>
             <a:ext cx="1546869" cy="260896"/>
           </a:xfrm>
           <a:prstGeom prst="roundRect">
@@ -10661,10 +10513,10 @@
       </p:sp>
       <p:sp>
         <p:nvSpPr>
-          <p:cNvPr id="15" name="Arc 14">
-            <a:extLst>
-              <a:ext uri="{FF2B5EF4-FFF2-40B4-BE49-F238E27FC236}">
-                <a16:creationId xmlns:a16="http://schemas.microsoft.com/office/drawing/2014/main" id="{6883EC33-97A3-079F-3C23-A001E0A73F83}"/>
+          <p:cNvPr id="8" name="Rectangle: Rounded Corners 7">
+            <a:extLst>
+              <a:ext uri="{FF2B5EF4-FFF2-40B4-BE49-F238E27FC236}">
+                <a16:creationId xmlns:a16="http://schemas.microsoft.com/office/drawing/2014/main" id="{8092EBFC-8A22-5D45-E8AA-66C4063D836A}"/>
               </a:ext>
             </a:extLst>
           </p:cNvPr>
@@ -10672,21 +10524,79 @@
           <p:nvPr/>
         </p:nvSpPr>
         <p:spPr>
-          <a:xfrm flipV="1">
-            <a:off x="129209" y="2158995"/>
-            <a:ext cx="10291969" cy="3074264"/>
-          </a:xfrm>
-          <a:prstGeom prst="arc">
-            <a:avLst>
-              <a:gd name="adj1" fmla="val 8148048"/>
-              <a:gd name="adj2" fmla="val 10591869"/>
-            </a:avLst>
-          </a:prstGeom>
-          <a:ln w="34925">
+          <a:xfrm>
+            <a:off x="9743847" y="4532288"/>
+            <a:ext cx="1546869" cy="260896"/>
+          </a:xfrm>
+          <a:prstGeom prst="roundRect">
+            <a:avLst/>
+          </a:prstGeom>
+          <a:noFill/>
+          <a:ln>
+            <a:noFill/>
+          </a:ln>
+        </p:spPr>
+        <p:style>
+          <a:lnRef idx="2">
+            <a:schemeClr val="accent1">
+              <a:shade val="15000"/>
+            </a:schemeClr>
+          </a:lnRef>
+          <a:fillRef idx="1">
+            <a:schemeClr val="accent1"/>
+          </a:fillRef>
+          <a:effectRef idx="0">
+            <a:schemeClr val="accent1"/>
+          </a:effectRef>
+          <a:fontRef idx="minor">
+            <a:schemeClr val="lt1"/>
+          </a:fontRef>
+        </p:style>
+        <p:txBody>
+          <a:bodyPr rtlCol="0" anchor="ctr"/>
+          <a:lstStyle/>
+          <a:p>
+            <a:r>
+              <a:rPr lang="en-CA" sz="1400" dirty="0">
+                <a:solidFill>
+                  <a:schemeClr val="tx1"/>
+                </a:solidFill>
+              </a:rPr>
+              <a:t>Price: $100</a:t>
+            </a:r>
+          </a:p>
+        </p:txBody>
+      </p:sp>
+      <p:cxnSp>
+        <p:nvCxnSpPr>
+          <p:cNvPr id="18" name="Connector: Curved 17">
+            <a:extLst>
+              <a:ext uri="{FF2B5EF4-FFF2-40B4-BE49-F238E27FC236}">
+                <a16:creationId xmlns:a16="http://schemas.microsoft.com/office/drawing/2014/main" id="{FC6D197E-7BFE-55CA-D51B-CB7F172FA6CF}"/>
+              </a:ext>
+            </a:extLst>
+          </p:cNvPr>
+          <p:cNvCxnSpPr>
+            <a:cxnSpLocks/>
+            <a:endCxn id="12" idx="0"/>
+          </p:cNvCxnSpPr>
+          <p:nvPr/>
+        </p:nvCxnSpPr>
+        <p:spPr>
+          <a:xfrm rot="10800000" flipV="1">
+            <a:off x="740559" y="1640160"/>
+            <a:ext cx="9030764" cy="1538064"/>
+          </a:xfrm>
+          <a:prstGeom prst="curvedConnector2">
+            <a:avLst/>
+          </a:prstGeom>
+          <a:ln w="31750">
             <a:solidFill>
-              <a:schemeClr val="bg2"/>
+              <a:schemeClr val="bg1">
+                <a:lumMod val="75000"/>
+              </a:schemeClr>
             </a:solidFill>
-            <a:tailEnd type="arrow"/>
+            <a:tailEnd type="triangle"/>
           </a:ln>
         </p:spPr>
         <p:style>
@@ -10703,15 +10613,55 @@
             <a:schemeClr val="tx1"/>
           </a:fontRef>
         </p:style>
-        <p:txBody>
-          <a:bodyPr rtlCol="0" anchor="ctr"/>
-          <a:lstStyle/>
-          <a:p>
-            <a:pPr algn="ctr"/>
-            <a:endParaRPr lang="en-CA"/>
-          </a:p>
-        </p:txBody>
-      </p:sp>
+      </p:cxnSp>
+      <p:cxnSp>
+        <p:nvCxnSpPr>
+          <p:cNvPr id="30" name="Connector: Curved 29">
+            <a:extLst>
+              <a:ext uri="{FF2B5EF4-FFF2-40B4-BE49-F238E27FC236}">
+                <a16:creationId xmlns:a16="http://schemas.microsoft.com/office/drawing/2014/main" id="{4BC0DDE2-A39F-88F6-6B50-2B174A9A29B3}"/>
+              </a:ext>
+            </a:extLst>
+          </p:cNvPr>
+          <p:cNvCxnSpPr>
+            <a:cxnSpLocks/>
+            <a:endCxn id="4" idx="7"/>
+          </p:cNvCxnSpPr>
+          <p:nvPr/>
+        </p:nvCxnSpPr>
+        <p:spPr>
+          <a:xfrm rot="10800000" flipV="1">
+            <a:off x="2789038" y="2034302"/>
+            <a:ext cx="7019432" cy="1195696"/>
+          </a:xfrm>
+          <a:prstGeom prst="curvedConnector2">
+            <a:avLst/>
+          </a:prstGeom>
+          <a:ln w="31750">
+            <a:solidFill>
+              <a:schemeClr val="accent6">
+                <a:lumMod val="60000"/>
+                <a:lumOff val="40000"/>
+              </a:schemeClr>
+            </a:solidFill>
+            <a:tailEnd type="triangle"/>
+          </a:ln>
+        </p:spPr>
+        <p:style>
+          <a:lnRef idx="1">
+            <a:schemeClr val="accent1"/>
+          </a:lnRef>
+          <a:fillRef idx="0">
+            <a:schemeClr val="accent1"/>
+          </a:fillRef>
+          <a:effectRef idx="0">
+            <a:schemeClr val="accent1"/>
+          </a:effectRef>
+          <a:fontRef idx="minor">
+            <a:schemeClr val="tx1"/>
+          </a:fontRef>
+        </p:style>
+      </p:cxnSp>
     </p:spTree>
     <p:extLst>
       <p:ext uri="{BB962C8B-B14F-4D97-AF65-F5344CB8AC3E}">

</xml_diff>

<commit_message>
[33] update package names to reactable
</commit_message>
<xml_diff>
--- a/documentation/Hubfx Presentation.pptx
+++ b/documentation/Hubfx Presentation.pptx
@@ -1799,7 +1799,7 @@
           <a:p>
             <a:fld id="{154F4BC5-C275-4A59-82DC-6AFC02DFC54D}" type="datetimeFigureOut">
               <a:rPr lang="en-CA" smtClean="0"/>
-              <a:t>2023-11-16</a:t>
+              <a:t>2023-11-29</a:t>
             </a:fld>
             <a:endParaRPr lang="en-CA"/>
           </a:p>
@@ -1999,7 +1999,7 @@
           <a:p>
             <a:fld id="{154F4BC5-C275-4A59-82DC-6AFC02DFC54D}" type="datetimeFigureOut">
               <a:rPr lang="en-CA" smtClean="0"/>
-              <a:t>2023-11-16</a:t>
+              <a:t>2023-11-29</a:t>
             </a:fld>
             <a:endParaRPr lang="en-CA"/>
           </a:p>
@@ -2209,7 +2209,7 @@
           <a:p>
             <a:fld id="{154F4BC5-C275-4A59-82DC-6AFC02DFC54D}" type="datetimeFigureOut">
               <a:rPr lang="en-CA" smtClean="0"/>
-              <a:t>2023-11-16</a:t>
+              <a:t>2023-11-29</a:t>
             </a:fld>
             <a:endParaRPr lang="en-CA"/>
           </a:p>
@@ -2409,7 +2409,7 @@
           <a:p>
             <a:fld id="{154F4BC5-C275-4A59-82DC-6AFC02DFC54D}" type="datetimeFigureOut">
               <a:rPr lang="en-CA" smtClean="0"/>
-              <a:t>2023-11-16</a:t>
+              <a:t>2023-11-29</a:t>
             </a:fld>
             <a:endParaRPr lang="en-CA"/>
           </a:p>
@@ -2685,7 +2685,7 @@
           <a:p>
             <a:fld id="{154F4BC5-C275-4A59-82DC-6AFC02DFC54D}" type="datetimeFigureOut">
               <a:rPr lang="en-CA" smtClean="0"/>
-              <a:t>2023-11-16</a:t>
+              <a:t>2023-11-29</a:t>
             </a:fld>
             <a:endParaRPr lang="en-CA"/>
           </a:p>
@@ -2953,7 +2953,7 @@
           <a:p>
             <a:fld id="{154F4BC5-C275-4A59-82DC-6AFC02DFC54D}" type="datetimeFigureOut">
               <a:rPr lang="en-CA" smtClean="0"/>
-              <a:t>2023-11-16</a:t>
+              <a:t>2023-11-29</a:t>
             </a:fld>
             <a:endParaRPr lang="en-CA"/>
           </a:p>
@@ -3368,7 +3368,7 @@
           <a:p>
             <a:fld id="{154F4BC5-C275-4A59-82DC-6AFC02DFC54D}" type="datetimeFigureOut">
               <a:rPr lang="en-CA" smtClean="0"/>
-              <a:t>2023-11-16</a:t>
+              <a:t>2023-11-29</a:t>
             </a:fld>
             <a:endParaRPr lang="en-CA"/>
           </a:p>
@@ -3510,7 +3510,7 @@
           <a:p>
             <a:fld id="{154F4BC5-C275-4A59-82DC-6AFC02DFC54D}" type="datetimeFigureOut">
               <a:rPr lang="en-CA" smtClean="0"/>
-              <a:t>2023-11-16</a:t>
+              <a:t>2023-11-29</a:t>
             </a:fld>
             <a:endParaRPr lang="en-CA"/>
           </a:p>
@@ -3623,7 +3623,7 @@
           <a:p>
             <a:fld id="{154F4BC5-C275-4A59-82DC-6AFC02DFC54D}" type="datetimeFigureOut">
               <a:rPr lang="en-CA" smtClean="0"/>
-              <a:t>2023-11-16</a:t>
+              <a:t>2023-11-29</a:t>
             </a:fld>
             <a:endParaRPr lang="en-CA"/>
           </a:p>
@@ -3936,7 +3936,7 @@
           <a:p>
             <a:fld id="{154F4BC5-C275-4A59-82DC-6AFC02DFC54D}" type="datetimeFigureOut">
               <a:rPr lang="en-CA" smtClean="0"/>
-              <a:t>2023-11-16</a:t>
+              <a:t>2023-11-29</a:t>
             </a:fld>
             <a:endParaRPr lang="en-CA"/>
           </a:p>
@@ -4225,7 +4225,7 @@
           <a:p>
             <a:fld id="{154F4BC5-C275-4A59-82DC-6AFC02DFC54D}" type="datetimeFigureOut">
               <a:rPr lang="en-CA" smtClean="0"/>
-              <a:t>2023-11-16</a:t>
+              <a:t>2023-11-29</a:t>
             </a:fld>
             <a:endParaRPr lang="en-CA"/>
           </a:p>
@@ -4468,7 +4468,7 @@
           <a:p>
             <a:fld id="{154F4BC5-C275-4A59-82DC-6AFC02DFC54D}" type="datetimeFigureOut">
               <a:rPr lang="en-CA" smtClean="0"/>
-              <a:t>2023-11-16</a:t>
+              <a:t>2023-11-29</a:t>
             </a:fld>
             <a:endParaRPr lang="en-CA"/>
           </a:p>
@@ -5759,8 +5759,8 @@
         </p:nvSpPr>
         <p:spPr>
           <a:xfrm>
-            <a:off x="4585284" y="438368"/>
-            <a:ext cx="2092279" cy="523220"/>
+            <a:off x="3992634" y="438368"/>
+            <a:ext cx="2684930" cy="523220"/>
           </a:xfrm>
           <a:prstGeom prst="rect">
             <a:avLst/>
@@ -5775,7 +5775,7 @@
           <a:p>
             <a:r>
               <a:rPr lang="en-CA" sz="2800" dirty="0"/>
-              <a:t>Hubfx Forms</a:t>
+              <a:t>Reactable Forms</a:t>
             </a:r>
           </a:p>
         </p:txBody>
@@ -21876,7 +21876,7 @@
           <p:nvPr>
             <p:extLst>
               <p:ext uri="{D42A27DB-BD31-4B8C-83A1-F6EECF244321}">
-                <p14:modId xmlns:p14="http://schemas.microsoft.com/office/powerpoint/2010/main" val="3927356613"/>
+                <p14:modId xmlns:p14="http://schemas.microsoft.com/office/powerpoint/2010/main" val="2468263626"/>
               </p:ext>
             </p:extLst>
           </p:nvPr>
@@ -21981,9 +21981,10 @@
                     <a:p>
                       <a:pPr algn="ctr"/>
                       <a:r>
-                        <a:rPr lang="en-CA" sz="3600" dirty="0"/>
-                        <a:t>Hubfx</a:t>
+                        <a:rPr lang="en-CA" sz="3600" dirty="0" err="1"/>
+                        <a:t>Reactables</a:t>
                       </a:r>
+                      <a:endParaRPr lang="en-CA" sz="3600" dirty="0"/>
                     </a:p>
                   </a:txBody>
                   <a:tcPr anchor="ctr"/>

</xml_diff>